<commit_message>
Slide titles have been added.
</commit_message>
<xml_diff>
--- a/My Note and Practice/Text to Numerical Data Conversion/Categorical(Text to Numeric) data conversion-CTtN/Categorical Data.pptx
+++ b/My Note and Practice/Text to Numerical Data Conversion/Categorical(Text to Numeric) data conversion-CTtN/Categorical Data.pptx
@@ -5,31 +5,18 @@
     <p:sldMasterId id="2147483648" r:id="rId1"/>
   </p:sldMasterIdLst>
   <p:sldIdLst>
-    <p:sldId id="271" r:id="rId2"/>
-    <p:sldId id="295" r:id="rId3"/>
-    <p:sldId id="287" r:id="rId4"/>
-    <p:sldId id="292" r:id="rId5"/>
-    <p:sldId id="293" r:id="rId6"/>
-    <p:sldId id="294" r:id="rId7"/>
-    <p:sldId id="289" r:id="rId8"/>
-    <p:sldId id="290" r:id="rId9"/>
-    <p:sldId id="291" r:id="rId10"/>
-    <p:sldId id="296" r:id="rId11"/>
-    <p:sldId id="257" r:id="rId12"/>
-    <p:sldId id="273" r:id="rId13"/>
-    <p:sldId id="274" r:id="rId14"/>
-    <p:sldId id="275" r:id="rId15"/>
-    <p:sldId id="276" r:id="rId16"/>
-    <p:sldId id="277" r:id="rId17"/>
-    <p:sldId id="278" r:id="rId18"/>
-    <p:sldId id="279" r:id="rId19"/>
-    <p:sldId id="280" r:id="rId20"/>
-    <p:sldId id="281" r:id="rId21"/>
-    <p:sldId id="282" r:id="rId22"/>
-    <p:sldId id="283" r:id="rId23"/>
-    <p:sldId id="284" r:id="rId24"/>
-    <p:sldId id="285" r:id="rId25"/>
-    <p:sldId id="286" r:id="rId26"/>
+    <p:sldId id="300" r:id="rId2"/>
+    <p:sldId id="301" r:id="rId3"/>
+    <p:sldId id="311" r:id="rId4"/>
+    <p:sldId id="302" r:id="rId5"/>
+    <p:sldId id="303" r:id="rId6"/>
+    <p:sldId id="304" r:id="rId7"/>
+    <p:sldId id="305" r:id="rId8"/>
+    <p:sldId id="306" r:id="rId9"/>
+    <p:sldId id="307" r:id="rId10"/>
+    <p:sldId id="310" r:id="rId11"/>
+    <p:sldId id="308" r:id="rId12"/>
+    <p:sldId id="309" r:id="rId13"/>
   </p:sldIdLst>
   <p:sldSz cx="12192000" cy="6858000"/>
   <p:notesSz cx="6858000" cy="9144000"/>
@@ -283,7 +270,7 @@
           <a:p>
             <a:fld id="{9470F815-C135-485A-BD08-28298AAD7E25}" type="datetimeFigureOut">
               <a:rPr lang="en-US" smtClean="0"/>
-              <a:t>10/30/2025</a:t>
+              <a:t>11/8/2025</a:t>
             </a:fld>
             <a:endParaRPr lang="en-US"/>
           </a:p>
@@ -481,7 +468,7 @@
           <a:p>
             <a:fld id="{9470F815-C135-485A-BD08-28298AAD7E25}" type="datetimeFigureOut">
               <a:rPr lang="en-US" smtClean="0"/>
-              <a:t>10/30/2025</a:t>
+              <a:t>11/8/2025</a:t>
             </a:fld>
             <a:endParaRPr lang="en-US"/>
           </a:p>
@@ -689,7 +676,7 @@
           <a:p>
             <a:fld id="{9470F815-C135-485A-BD08-28298AAD7E25}" type="datetimeFigureOut">
               <a:rPr lang="en-US" smtClean="0"/>
-              <a:t>10/30/2025</a:t>
+              <a:t>11/8/2025</a:t>
             </a:fld>
             <a:endParaRPr lang="en-US"/>
           </a:p>
@@ -887,7 +874,7 @@
           <a:p>
             <a:fld id="{9470F815-C135-485A-BD08-28298AAD7E25}" type="datetimeFigureOut">
               <a:rPr lang="en-US" smtClean="0"/>
-              <a:t>10/30/2025</a:t>
+              <a:t>11/8/2025</a:t>
             </a:fld>
             <a:endParaRPr lang="en-US"/>
           </a:p>
@@ -1162,7 +1149,7 @@
           <a:p>
             <a:fld id="{9470F815-C135-485A-BD08-28298AAD7E25}" type="datetimeFigureOut">
               <a:rPr lang="en-US" smtClean="0"/>
-              <a:t>10/30/2025</a:t>
+              <a:t>11/8/2025</a:t>
             </a:fld>
             <a:endParaRPr lang="en-US"/>
           </a:p>
@@ -1427,7 +1414,7 @@
           <a:p>
             <a:fld id="{9470F815-C135-485A-BD08-28298AAD7E25}" type="datetimeFigureOut">
               <a:rPr lang="en-US" smtClean="0"/>
-              <a:t>10/30/2025</a:t>
+              <a:t>11/8/2025</a:t>
             </a:fld>
             <a:endParaRPr lang="en-US"/>
           </a:p>
@@ -1839,7 +1826,7 @@
           <a:p>
             <a:fld id="{9470F815-C135-485A-BD08-28298AAD7E25}" type="datetimeFigureOut">
               <a:rPr lang="en-US" smtClean="0"/>
-              <a:t>10/30/2025</a:t>
+              <a:t>11/8/2025</a:t>
             </a:fld>
             <a:endParaRPr lang="en-US"/>
           </a:p>
@@ -1980,7 +1967,7 @@
           <a:p>
             <a:fld id="{9470F815-C135-485A-BD08-28298AAD7E25}" type="datetimeFigureOut">
               <a:rPr lang="en-US" smtClean="0"/>
-              <a:t>10/30/2025</a:t>
+              <a:t>11/8/2025</a:t>
             </a:fld>
             <a:endParaRPr lang="en-US"/>
           </a:p>
@@ -2093,7 +2080,7 @@
           <a:p>
             <a:fld id="{9470F815-C135-485A-BD08-28298AAD7E25}" type="datetimeFigureOut">
               <a:rPr lang="en-US" smtClean="0"/>
-              <a:t>10/30/2025</a:t>
+              <a:t>11/8/2025</a:t>
             </a:fld>
             <a:endParaRPr lang="en-US"/>
           </a:p>
@@ -2404,7 +2391,7 @@
           <a:p>
             <a:fld id="{9470F815-C135-485A-BD08-28298AAD7E25}" type="datetimeFigureOut">
               <a:rPr lang="en-US" smtClean="0"/>
-              <a:t>10/30/2025</a:t>
+              <a:t>11/8/2025</a:t>
             </a:fld>
             <a:endParaRPr lang="en-US"/>
           </a:p>
@@ -2692,7 +2679,7 @@
           <a:p>
             <a:fld id="{9470F815-C135-485A-BD08-28298AAD7E25}" type="datetimeFigureOut">
               <a:rPr lang="en-US" smtClean="0"/>
-              <a:t>10/30/2025</a:t>
+              <a:t>11/8/2025</a:t>
             </a:fld>
             <a:endParaRPr lang="en-US"/>
           </a:p>
@@ -2933,7 +2920,7 @@
           <a:p>
             <a:fld id="{9470F815-C135-485A-BD08-28298AAD7E25}" type="datetimeFigureOut">
               <a:rPr lang="en-US" smtClean="0"/>
-              <a:t>10/30/2025</a:t>
+              <a:t>11/8/2025</a:t>
             </a:fld>
             <a:endParaRPr lang="en-US"/>
           </a:p>
@@ -3338,13 +3325,7 @@
   <p:cSld>
     <p:spTree>
       <p:nvGrpSpPr>
-        <p:cNvPr id="1" name="">
-          <a:extLst>
-            <a:ext uri="{FF2B5EF4-FFF2-40B4-BE49-F238E27FC236}">
-              <a16:creationId xmlns:a16="http://schemas.microsoft.com/office/drawing/2014/main" id="{12F84CA6-3997-C523-79EA-A21598E53E67}"/>
-            </a:ext>
-          </a:extLst>
-        </p:cNvPr>
+        <p:cNvPr id="1" name=""/>
         <p:cNvGrpSpPr/>
         <p:nvPr/>
       </p:nvGrpSpPr>
@@ -3358,29 +3339,29 @@
       </p:grpSpPr>
       <p:sp>
         <p:nvSpPr>
-          <p:cNvPr id="5" name="TextBox 4">
-            <a:extLst>
-              <a:ext uri="{FF2B5EF4-FFF2-40B4-BE49-F238E27FC236}">
-                <a16:creationId xmlns:a16="http://schemas.microsoft.com/office/drawing/2014/main" id="{B7E247F3-616F-D6B9-3BEF-D1CBC9AA6E06}"/>
-              </a:ext>
-            </a:extLst>
-          </p:cNvPr>
-          <p:cNvSpPr txBox="1"/>
-          <p:nvPr/>
+          <p:cNvPr id="2" name="Title 1">
+            <a:extLst>
+              <a:ext uri="{FF2B5EF4-FFF2-40B4-BE49-F238E27FC236}">
+                <a16:creationId xmlns:a16="http://schemas.microsoft.com/office/drawing/2014/main" id="{D30BC83B-E0D4-3077-EC77-2318FB0DD86E}"/>
+              </a:ext>
+            </a:extLst>
+          </p:cNvPr>
+          <p:cNvSpPr>
+            <a:spLocks noGrp="1"/>
+          </p:cNvSpPr>
+          <p:nvPr>
+            <p:ph type="title"/>
+          </p:nvPr>
         </p:nvSpPr>
         <p:spPr>
           <a:xfrm>
-            <a:off x="1597742" y="403123"/>
-            <a:ext cx="8996516" cy="646331"/>
+            <a:off x="838200" y="365125"/>
+            <a:ext cx="10515600" cy="640080"/>
           </a:xfrm>
-          <a:prstGeom prst="rect">
-            <a:avLst/>
-          </a:prstGeom>
-          <a:noFill/>
         </p:spPr>
         <p:txBody>
-          <a:bodyPr wrap="square" rtlCol="0">
-            <a:spAutoFit/>
+          <a:bodyPr>
+            <a:normAutofit/>
           </a:bodyPr>
           <a:lstStyle/>
           <a:p>
@@ -3396,29 +3377,29 @@
       </p:sp>
       <p:sp>
         <p:nvSpPr>
-          <p:cNvPr id="7" name="TextBox 6">
-            <a:extLst>
-              <a:ext uri="{FF2B5EF4-FFF2-40B4-BE49-F238E27FC236}">
-                <a16:creationId xmlns:a16="http://schemas.microsoft.com/office/drawing/2014/main" id="{F850007F-EAA8-7BDA-1B7B-7F1857719150}"/>
-              </a:ext>
-            </a:extLst>
-          </p:cNvPr>
-          <p:cNvSpPr txBox="1"/>
-          <p:nvPr/>
+          <p:cNvPr id="3" name="Content Placeholder 2">
+            <a:extLst>
+              <a:ext uri="{FF2B5EF4-FFF2-40B4-BE49-F238E27FC236}">
+                <a16:creationId xmlns:a16="http://schemas.microsoft.com/office/drawing/2014/main" id="{04E57E68-81A6-BB4D-AABC-54363AD21BF5}"/>
+              </a:ext>
+            </a:extLst>
+          </p:cNvPr>
+          <p:cNvSpPr>
+            <a:spLocks noGrp="1"/>
+          </p:cNvSpPr>
+          <p:nvPr>
+            <p:ph idx="1"/>
+          </p:nvPr>
         </p:nvSpPr>
         <p:spPr>
           <a:xfrm>
-            <a:off x="1597742" y="1049454"/>
-            <a:ext cx="8996516" cy="830997"/>
+            <a:off x="838200" y="1091381"/>
+            <a:ext cx="10515600" cy="5085582"/>
           </a:xfrm>
-          <a:prstGeom prst="rect">
-            <a:avLst/>
-          </a:prstGeom>
-          <a:noFill/>
         </p:spPr>
         <p:txBody>
-          <a:bodyPr wrap="square" rtlCol="0">
-            <a:spAutoFit/>
+          <a:bodyPr>
+            <a:normAutofit/>
           </a:bodyPr>
           <a:lstStyle/>
           <a:p>
@@ -3459,7 +3440,7 @@
       </p:sp>
       <p:graphicFrame>
         <p:nvGraphicFramePr>
-          <p:cNvPr id="3" name="Table 2">
+          <p:cNvPr id="4" name="Table 3">
             <a:extLst>
               <a:ext uri="{FF2B5EF4-FFF2-40B4-BE49-F238E27FC236}">
                 <a16:creationId xmlns:a16="http://schemas.microsoft.com/office/drawing/2014/main" id="{5AEC8EE0-509C-CF9D-4AFD-81513AFD81A6}"/>
@@ -3472,7 +3453,7 @@
           <p:nvPr>
             <p:extLst>
               <p:ext uri="{D42A27DB-BD31-4B8C-83A1-F6EECF244321}">
-                <p14:modId xmlns:p14="http://schemas.microsoft.com/office/powerpoint/2010/main" val="3247456053"/>
+                <p14:modId xmlns:p14="http://schemas.microsoft.com/office/powerpoint/2010/main" val="1095024568"/>
               </p:ext>
             </p:extLst>
           </p:nvPr>
@@ -3587,7 +3568,7 @@
                         <a:buNone/>
                       </a:pPr>
                       <a:r>
-                        <a:rPr lang="en-US" sz="2400">
+                        <a:rPr lang="en-US" sz="2400" dirty="0">
                           <a:latin typeface="Open Sans" pitchFamily="2" charset="0"/>
                           <a:ea typeface="Open Sans" pitchFamily="2" charset="0"/>
                           <a:cs typeface="Open Sans" pitchFamily="2" charset="0"/>
@@ -3852,7 +3833,7 @@
     </p:spTree>
     <p:extLst>
       <p:ext uri="{BB962C8B-B14F-4D97-AF65-F5344CB8AC3E}">
-        <p14:creationId xmlns:p14="http://schemas.microsoft.com/office/powerpoint/2010/main" val="6586757"/>
+        <p14:creationId xmlns:p14="http://schemas.microsoft.com/office/powerpoint/2010/main" val="3044049890"/>
       </p:ext>
     </p:extLst>
   </p:cSld>
@@ -3870,7 +3851,7 @@
         <p:cNvPr id="1" name="">
           <a:extLst>
             <a:ext uri="{FF2B5EF4-FFF2-40B4-BE49-F238E27FC236}">
-              <a16:creationId xmlns:a16="http://schemas.microsoft.com/office/drawing/2014/main" id="{731FC6E7-9BED-88F6-F9AF-A8CB16600870}"/>
+              <a16:creationId xmlns:a16="http://schemas.microsoft.com/office/drawing/2014/main" id="{203CF690-8F92-C0A7-4DEA-A741262E5FCF}"/>
             </a:ext>
           </a:extLst>
         </p:cNvPr>
@@ -3887,29 +3868,29 @@
       </p:grpSpPr>
       <p:sp>
         <p:nvSpPr>
-          <p:cNvPr id="5" name="TextBox 4">
-            <a:extLst>
-              <a:ext uri="{FF2B5EF4-FFF2-40B4-BE49-F238E27FC236}">
-                <a16:creationId xmlns:a16="http://schemas.microsoft.com/office/drawing/2014/main" id="{4B34AB5D-919D-E6ED-8E29-2B9E02A293C8}"/>
-              </a:ext>
-            </a:extLst>
-          </p:cNvPr>
-          <p:cNvSpPr txBox="1"/>
-          <p:nvPr/>
+          <p:cNvPr id="2" name="Title 1">
+            <a:extLst>
+              <a:ext uri="{FF2B5EF4-FFF2-40B4-BE49-F238E27FC236}">
+                <a16:creationId xmlns:a16="http://schemas.microsoft.com/office/drawing/2014/main" id="{850F863B-6BCD-4FA4-6EEF-4B2EF91AC46C}"/>
+              </a:ext>
+            </a:extLst>
+          </p:cNvPr>
+          <p:cNvSpPr>
+            <a:spLocks noGrp="1"/>
+          </p:cNvSpPr>
+          <p:nvPr>
+            <p:ph type="title"/>
+          </p:nvPr>
         </p:nvSpPr>
         <p:spPr>
           <a:xfrm>
-            <a:off x="1597742" y="403123"/>
-            <a:ext cx="8996516" cy="646331"/>
+            <a:off x="838200" y="365125"/>
+            <a:ext cx="10515600" cy="640080"/>
           </a:xfrm>
-          <a:prstGeom prst="rect">
-            <a:avLst/>
-          </a:prstGeom>
-          <a:noFill/>
         </p:spPr>
         <p:txBody>
-          <a:bodyPr wrap="square" rtlCol="0">
-            <a:spAutoFit/>
+          <a:bodyPr>
+            <a:normAutofit/>
           </a:bodyPr>
           <a:lstStyle/>
           <a:p>
@@ -3918,144 +3899,49 @@
               <a:rPr lang="en-US" sz="3600" dirty="0">
                 <a:latin typeface="Bebas Neue" panose="020B0606020202050201" pitchFamily="34" charset="0"/>
               </a:rPr>
-              <a:t>Why Encoding</a:t>
-            </a:r>
-          </a:p>
-        </p:txBody>
-      </p:sp>
-      <p:sp>
-        <p:nvSpPr>
-          <p:cNvPr id="7" name="TextBox 6">
-            <a:extLst>
-              <a:ext uri="{FF2B5EF4-FFF2-40B4-BE49-F238E27FC236}">
-                <a16:creationId xmlns:a16="http://schemas.microsoft.com/office/drawing/2014/main" id="{0103D177-9F61-DFAC-D68E-AF35E27F4551}"/>
-              </a:ext>
-            </a:extLst>
-          </p:cNvPr>
-          <p:cNvSpPr txBox="1"/>
-          <p:nvPr/>
+              <a:t>Mixed Data</a:t>
+            </a:r>
+          </a:p>
+        </p:txBody>
+      </p:sp>
+      <p:sp>
+        <p:nvSpPr>
+          <p:cNvPr id="3" name="Content Placeholder 2">
+            <a:extLst>
+              <a:ext uri="{FF2B5EF4-FFF2-40B4-BE49-F238E27FC236}">
+                <a16:creationId xmlns:a16="http://schemas.microsoft.com/office/drawing/2014/main" id="{2A352223-9946-C378-E33F-F40EF501C1BD}"/>
+              </a:ext>
+            </a:extLst>
+          </p:cNvPr>
+          <p:cNvSpPr>
+            <a:spLocks noGrp="1"/>
+          </p:cNvSpPr>
+          <p:nvPr>
+            <p:ph idx="1"/>
+          </p:nvPr>
         </p:nvSpPr>
         <p:spPr>
           <a:xfrm>
-            <a:off x="1597742" y="1049454"/>
-            <a:ext cx="8996516" cy="3046988"/>
+            <a:off x="838200" y="1091381"/>
+            <a:ext cx="10515600" cy="5085582"/>
           </a:xfrm>
-          <a:prstGeom prst="rect">
-            <a:avLst/>
-          </a:prstGeom>
-          <a:noFill/>
         </p:spPr>
         <p:txBody>
-          <a:bodyPr wrap="square" rtlCol="0">
-            <a:spAutoFit/>
+          <a:bodyPr>
+            <a:normAutofit/>
           </a:bodyPr>
           <a:lstStyle/>
           <a:p>
+            <a:pPr marL="0" indent="0" algn="just">
+              <a:buNone/>
+            </a:pPr>
             <a:r>
               <a:rPr lang="en-US" sz="2400" dirty="0">
                 <a:latin typeface="Open Sans" pitchFamily="2" charset="0"/>
                 <a:ea typeface="Open Sans" pitchFamily="2" charset="0"/>
                 <a:cs typeface="Open Sans" pitchFamily="2" charset="0"/>
               </a:rPr>
-              <a:t>So categorical data = </a:t>
-            </a:r>
-            <a:r>
-              <a:rPr lang="en-US" sz="2400" b="1" dirty="0">
-                <a:latin typeface="Open Sans" pitchFamily="2" charset="0"/>
-                <a:ea typeface="Open Sans" pitchFamily="2" charset="0"/>
-                <a:cs typeface="Open Sans" pitchFamily="2" charset="0"/>
-              </a:rPr>
-              <a:t>textual or symbolic values</a:t>
-            </a:r>
-            <a:r>
-              <a:rPr lang="en-US" sz="2400" dirty="0">
-                <a:latin typeface="Open Sans" pitchFamily="2" charset="0"/>
-                <a:ea typeface="Open Sans" pitchFamily="2" charset="0"/>
-                <a:cs typeface="Open Sans" pitchFamily="2" charset="0"/>
-              </a:rPr>
-              <a:t> that describe qualities or groups.</a:t>
-            </a:r>
-          </a:p>
-          <a:p>
-            <a:endParaRPr lang="en-US" sz="2400" dirty="0">
-              <a:latin typeface="Open Sans" pitchFamily="2" charset="0"/>
-              <a:ea typeface="Open Sans" pitchFamily="2" charset="0"/>
-              <a:cs typeface="Open Sans" pitchFamily="2" charset="0"/>
-            </a:endParaRPr>
-          </a:p>
-          <a:p>
-            <a:r>
-              <a:rPr lang="en-US" sz="2400" dirty="0">
-                <a:latin typeface="Open Sans" pitchFamily="2" charset="0"/>
-                <a:ea typeface="Open Sans" pitchFamily="2" charset="0"/>
-                <a:cs typeface="Open Sans" pitchFamily="2" charset="0"/>
-              </a:rPr>
-              <a:t>But machine learning models (like neural networks, decision trees, etc.) only understand </a:t>
-            </a:r>
-            <a:r>
-              <a:rPr lang="en-US" sz="2400" b="1" dirty="0">
-                <a:latin typeface="Open Sans" pitchFamily="2" charset="0"/>
-                <a:ea typeface="Open Sans" pitchFamily="2" charset="0"/>
-                <a:cs typeface="Open Sans" pitchFamily="2" charset="0"/>
-              </a:rPr>
-              <a:t>numbers</a:t>
-            </a:r>
-            <a:r>
-              <a:rPr lang="en-US" sz="2400" dirty="0">
-                <a:latin typeface="Open Sans" pitchFamily="2" charset="0"/>
-                <a:ea typeface="Open Sans" pitchFamily="2" charset="0"/>
-                <a:cs typeface="Open Sans" pitchFamily="2" charset="0"/>
-              </a:rPr>
-              <a:t>, not words.</a:t>
-            </a:r>
-          </a:p>
-          <a:p>
-            <a:br>
-              <a:rPr lang="en-US" sz="2400" dirty="0">
-                <a:latin typeface="Open Sans" pitchFamily="2" charset="0"/>
-                <a:ea typeface="Open Sans" pitchFamily="2" charset="0"/>
-                <a:cs typeface="Open Sans" pitchFamily="2" charset="0"/>
-              </a:rPr>
-            </a:br>
-            <a:r>
-              <a:rPr lang="en-US" sz="2400" dirty="0">
-                <a:latin typeface="Open Sans" pitchFamily="2" charset="0"/>
-                <a:ea typeface="Open Sans" pitchFamily="2" charset="0"/>
-                <a:cs typeface="Open Sans" pitchFamily="2" charset="0"/>
-              </a:rPr>
-              <a:t>That’s why we need to </a:t>
-            </a:r>
-            <a:r>
-              <a:rPr lang="en-US" sz="2400" b="1" dirty="0">
-                <a:latin typeface="Open Sans" pitchFamily="2" charset="0"/>
-                <a:ea typeface="Open Sans" pitchFamily="2" charset="0"/>
-                <a:cs typeface="Open Sans" pitchFamily="2" charset="0"/>
-              </a:rPr>
-              <a:t>convert text categories into numbers</a:t>
-            </a:r>
-            <a:r>
-              <a:rPr lang="en-US" sz="2400" dirty="0">
-                <a:latin typeface="Open Sans" pitchFamily="2" charset="0"/>
-                <a:ea typeface="Open Sans" pitchFamily="2" charset="0"/>
-                <a:cs typeface="Open Sans" pitchFamily="2" charset="0"/>
-              </a:rPr>
-              <a:t> — this process is called </a:t>
-            </a:r>
-            <a:r>
-              <a:rPr lang="en-US" sz="2400" b="1" dirty="0">
-                <a:latin typeface="Open Sans" pitchFamily="2" charset="0"/>
-                <a:ea typeface="Open Sans" pitchFamily="2" charset="0"/>
-                <a:cs typeface="Open Sans" pitchFamily="2" charset="0"/>
-              </a:rPr>
-              <a:t>encoding</a:t>
-            </a:r>
-            <a:r>
-              <a:rPr lang="en-US" sz="2400" dirty="0">
-                <a:latin typeface="Open Sans" pitchFamily="2" charset="0"/>
-                <a:ea typeface="Open Sans" pitchFamily="2" charset="0"/>
-                <a:cs typeface="Open Sans" pitchFamily="2" charset="0"/>
-              </a:rPr>
-              <a:t>.</a:t>
+              <a:t>H</a:t>
             </a:r>
           </a:p>
         </p:txBody>
@@ -4063,7 +3949,7 @@
     </p:spTree>
     <p:extLst>
       <p:ext uri="{BB962C8B-B14F-4D97-AF65-F5344CB8AC3E}">
-        <p14:creationId xmlns:p14="http://schemas.microsoft.com/office/powerpoint/2010/main" val="3208724268"/>
+        <p14:creationId xmlns:p14="http://schemas.microsoft.com/office/powerpoint/2010/main" val="1999150635"/>
       </p:ext>
     </p:extLst>
   </p:cSld>
@@ -4081,7 +3967,7 @@
         <p:cNvPr id="1" name="">
           <a:extLst>
             <a:ext uri="{FF2B5EF4-FFF2-40B4-BE49-F238E27FC236}">
-              <a16:creationId xmlns:a16="http://schemas.microsoft.com/office/drawing/2014/main" id="{3B17C9D0-ECF2-E25C-56DE-6ED7D061C988}"/>
+              <a16:creationId xmlns:a16="http://schemas.microsoft.com/office/drawing/2014/main" id="{55EF7857-E10B-7F57-CEB9-BA6AD9048599}"/>
             </a:ext>
           </a:extLst>
         </p:cNvPr>
@@ -4098,29 +3984,29 @@
       </p:grpSpPr>
       <p:sp>
         <p:nvSpPr>
-          <p:cNvPr id="5" name="TextBox 4">
-            <a:extLst>
-              <a:ext uri="{FF2B5EF4-FFF2-40B4-BE49-F238E27FC236}">
-                <a16:creationId xmlns:a16="http://schemas.microsoft.com/office/drawing/2014/main" id="{25770F3C-3FB2-75C3-398F-E311217EDDDA}"/>
-              </a:ext>
-            </a:extLst>
-          </p:cNvPr>
-          <p:cNvSpPr txBox="1"/>
-          <p:nvPr/>
+          <p:cNvPr id="2" name="Title 1">
+            <a:extLst>
+              <a:ext uri="{FF2B5EF4-FFF2-40B4-BE49-F238E27FC236}">
+                <a16:creationId xmlns:a16="http://schemas.microsoft.com/office/drawing/2014/main" id="{89F1D8FA-81DD-6842-BDE2-0B64F5F30269}"/>
+              </a:ext>
+            </a:extLst>
+          </p:cNvPr>
+          <p:cNvSpPr>
+            <a:spLocks noGrp="1"/>
+          </p:cNvSpPr>
+          <p:nvPr>
+            <p:ph type="title"/>
+          </p:nvPr>
         </p:nvSpPr>
         <p:spPr>
           <a:xfrm>
-            <a:off x="1597742" y="403123"/>
-            <a:ext cx="8996516" cy="1200329"/>
+            <a:off x="838200" y="365125"/>
+            <a:ext cx="10515600" cy="640080"/>
           </a:xfrm>
-          <a:prstGeom prst="rect">
-            <a:avLst/>
-          </a:prstGeom>
-          <a:noFill/>
         </p:spPr>
         <p:txBody>
-          <a:bodyPr wrap="square" rtlCol="0">
-            <a:spAutoFit/>
+          <a:bodyPr>
+            <a:normAutofit/>
           </a:bodyPr>
           <a:lstStyle/>
           <a:p>
@@ -4129,162 +4015,144 @@
               <a:rPr lang="en-US" sz="3600" dirty="0">
                 <a:latin typeface="Bebas Neue" panose="020B0606020202050201" pitchFamily="34" charset="0"/>
               </a:rPr>
-              <a:t>Methods to Convert Categorical / Text Data to Numerical Data</a:t>
-            </a:r>
-          </a:p>
-        </p:txBody>
-      </p:sp>
-      <p:sp>
-        <p:nvSpPr>
-          <p:cNvPr id="7" name="TextBox 6">
-            <a:extLst>
-              <a:ext uri="{FF2B5EF4-FFF2-40B4-BE49-F238E27FC236}">
-                <a16:creationId xmlns:a16="http://schemas.microsoft.com/office/drawing/2014/main" id="{F3A4A480-DD37-C314-2B4D-199D828D4881}"/>
-              </a:ext>
-            </a:extLst>
-          </p:cNvPr>
-          <p:cNvSpPr txBox="1"/>
-          <p:nvPr/>
+              <a:t>Why Encoding</a:t>
+            </a:r>
+          </a:p>
+        </p:txBody>
+      </p:sp>
+      <p:sp>
+        <p:nvSpPr>
+          <p:cNvPr id="3" name="Content Placeholder 2">
+            <a:extLst>
+              <a:ext uri="{FF2B5EF4-FFF2-40B4-BE49-F238E27FC236}">
+                <a16:creationId xmlns:a16="http://schemas.microsoft.com/office/drawing/2014/main" id="{939575DB-2633-BE15-A03C-FACAAACE4F0C}"/>
+              </a:ext>
+            </a:extLst>
+          </p:cNvPr>
+          <p:cNvSpPr>
+            <a:spLocks noGrp="1"/>
+          </p:cNvSpPr>
+          <p:nvPr>
+            <p:ph idx="1"/>
+          </p:nvPr>
         </p:nvSpPr>
         <p:spPr>
           <a:xfrm>
-            <a:off x="1597742" y="1603452"/>
-            <a:ext cx="8996516" cy="3416320"/>
+            <a:off x="838200" y="1091381"/>
+            <a:ext cx="10515600" cy="5085582"/>
           </a:xfrm>
-          <a:prstGeom prst="rect">
-            <a:avLst/>
-          </a:prstGeom>
-          <a:noFill/>
         </p:spPr>
         <p:txBody>
-          <a:bodyPr wrap="square" rtlCol="0">
-            <a:spAutoFit/>
+          <a:bodyPr>
+            <a:normAutofit/>
           </a:bodyPr>
           <a:lstStyle/>
           <a:p>
-            <a:pPr marL="342900" indent="-342900">
-              <a:buFont typeface="+mj-lt"/>
-              <a:buAutoNum type="arabicPeriod"/>
-            </a:pPr>
             <a:r>
               <a:rPr lang="en-US" sz="2400" dirty="0">
                 <a:latin typeface="Open Sans" pitchFamily="2" charset="0"/>
                 <a:ea typeface="Open Sans" pitchFamily="2" charset="0"/>
                 <a:cs typeface="Open Sans" pitchFamily="2" charset="0"/>
               </a:rPr>
-              <a:t>Label</a:t>
-            </a:r>
-          </a:p>
-          <a:p>
-            <a:pPr marL="342900" indent="-342900">
-              <a:buFont typeface="+mj-lt"/>
-              <a:buAutoNum type="arabicPeriod"/>
-            </a:pPr>
+              <a:t>So categorical data = </a:t>
+            </a:r>
+            <a:r>
+              <a:rPr lang="en-US" sz="2400" b="1" dirty="0">
+                <a:latin typeface="Open Sans" pitchFamily="2" charset="0"/>
+                <a:ea typeface="Open Sans" pitchFamily="2" charset="0"/>
+                <a:cs typeface="Open Sans" pitchFamily="2" charset="0"/>
+              </a:rPr>
+              <a:t>textual or symbolic values</a:t>
+            </a:r>
             <a:r>
               <a:rPr lang="en-US" sz="2400" dirty="0">
                 <a:latin typeface="Open Sans" pitchFamily="2" charset="0"/>
                 <a:ea typeface="Open Sans" pitchFamily="2" charset="0"/>
                 <a:cs typeface="Open Sans" pitchFamily="2" charset="0"/>
               </a:rPr>
-              <a:t>One-Hot</a:t>
-            </a:r>
-          </a:p>
-          <a:p>
-            <a:pPr marL="342900" indent="-342900">
-              <a:buFont typeface="+mj-lt"/>
-              <a:buAutoNum type="arabicPeriod"/>
-            </a:pPr>
+              <a:t> that describe qualities or groups.</a:t>
+            </a:r>
+          </a:p>
+          <a:p>
+            <a:endParaRPr lang="en-US" sz="2400" dirty="0">
+              <a:latin typeface="Open Sans" pitchFamily="2" charset="0"/>
+              <a:ea typeface="Open Sans" pitchFamily="2" charset="0"/>
+              <a:cs typeface="Open Sans" pitchFamily="2" charset="0"/>
+            </a:endParaRPr>
+          </a:p>
+          <a:p>
             <a:r>
               <a:rPr lang="en-US" sz="2400" dirty="0">
                 <a:latin typeface="Open Sans" pitchFamily="2" charset="0"/>
                 <a:ea typeface="Open Sans" pitchFamily="2" charset="0"/>
                 <a:cs typeface="Open Sans" pitchFamily="2" charset="0"/>
               </a:rPr>
-              <a:t>Dummy Variable</a:t>
-            </a:r>
-          </a:p>
-          <a:p>
-            <a:pPr marL="342900" indent="-342900">
-              <a:buFont typeface="+mj-lt"/>
-              <a:buAutoNum type="arabicPeriod"/>
-            </a:pPr>
+              <a:t>But machine learning models (like neural networks, decision trees, etc.) only understand </a:t>
+            </a:r>
+            <a:r>
+              <a:rPr lang="en-US" sz="2400" b="1" dirty="0">
+                <a:latin typeface="Open Sans" pitchFamily="2" charset="0"/>
+                <a:ea typeface="Open Sans" pitchFamily="2" charset="0"/>
+                <a:cs typeface="Open Sans" pitchFamily="2" charset="0"/>
+              </a:rPr>
+              <a:t>numbers</a:t>
+            </a:r>
             <a:r>
               <a:rPr lang="en-US" sz="2400" dirty="0">
                 <a:latin typeface="Open Sans" pitchFamily="2" charset="0"/>
                 <a:ea typeface="Open Sans" pitchFamily="2" charset="0"/>
                 <a:cs typeface="Open Sans" pitchFamily="2" charset="0"/>
               </a:rPr>
-              <a:t>Ordinal</a:t>
-            </a:r>
-          </a:p>
-          <a:p>
-            <a:pPr marL="342900" indent="-342900">
-              <a:buFont typeface="+mj-lt"/>
-              <a:buAutoNum type="arabicPeriod"/>
-            </a:pPr>
-            <a:r>
+              <a:t>, not words.</a:t>
+            </a:r>
+          </a:p>
+          <a:p>
+            <a:br>
               <a:rPr lang="en-US" sz="2400" dirty="0">
                 <a:latin typeface="Open Sans" pitchFamily="2" charset="0"/>
                 <a:ea typeface="Open Sans" pitchFamily="2" charset="0"/>
                 <a:cs typeface="Open Sans" pitchFamily="2" charset="0"/>
               </a:rPr>
-              <a:t>Binary</a:t>
-            </a:r>
-          </a:p>
-          <a:p>
-            <a:pPr marL="342900" indent="-342900">
-              <a:buFont typeface="+mj-lt"/>
-              <a:buAutoNum type="arabicPeriod"/>
-            </a:pPr>
+            </a:br>
             <a:r>
               <a:rPr lang="en-US" sz="2400" dirty="0">
                 <a:latin typeface="Open Sans" pitchFamily="2" charset="0"/>
                 <a:ea typeface="Open Sans" pitchFamily="2" charset="0"/>
                 <a:cs typeface="Open Sans" pitchFamily="2" charset="0"/>
               </a:rPr>
-              <a:t>Frequency / Count</a:t>
-            </a:r>
-          </a:p>
-          <a:p>
-            <a:pPr marL="342900" indent="-342900">
-              <a:buFont typeface="+mj-lt"/>
-              <a:buAutoNum type="arabicPeriod"/>
-            </a:pPr>
+              <a:t>That’s why we need to </a:t>
+            </a:r>
+            <a:r>
+              <a:rPr lang="en-US" sz="2400" b="1" dirty="0">
+                <a:latin typeface="Open Sans" pitchFamily="2" charset="0"/>
+                <a:ea typeface="Open Sans" pitchFamily="2" charset="0"/>
+                <a:cs typeface="Open Sans" pitchFamily="2" charset="0"/>
+              </a:rPr>
+              <a:t>convert text categories into numbers</a:t>
+            </a:r>
             <a:r>
               <a:rPr lang="en-US" sz="2400" dirty="0">
                 <a:latin typeface="Open Sans" pitchFamily="2" charset="0"/>
                 <a:ea typeface="Open Sans" pitchFamily="2" charset="0"/>
                 <a:cs typeface="Open Sans" pitchFamily="2" charset="0"/>
               </a:rPr>
-              <a:t>Target</a:t>
-            </a:r>
-          </a:p>
-          <a:p>
-            <a:pPr marL="342900" indent="-342900">
-              <a:buFont typeface="+mj-lt"/>
-              <a:buAutoNum type="arabicPeriod"/>
-            </a:pPr>
+              <a:t> — this process is called </a:t>
+            </a:r>
+            <a:r>
+              <a:rPr lang="en-US" sz="2400" b="1" dirty="0">
+                <a:latin typeface="Open Sans" pitchFamily="2" charset="0"/>
+                <a:ea typeface="Open Sans" pitchFamily="2" charset="0"/>
+                <a:cs typeface="Open Sans" pitchFamily="2" charset="0"/>
+              </a:rPr>
+              <a:t>encoding</a:t>
+            </a:r>
             <a:r>
               <a:rPr lang="en-US" sz="2400" dirty="0">
                 <a:latin typeface="Open Sans" pitchFamily="2" charset="0"/>
                 <a:ea typeface="Open Sans" pitchFamily="2" charset="0"/>
                 <a:cs typeface="Open Sans" pitchFamily="2" charset="0"/>
               </a:rPr>
-              <a:t>Hash (Feature Hashing)</a:t>
-            </a:r>
-          </a:p>
-          <a:p>
-            <a:pPr marL="342900" indent="-342900">
-              <a:buFont typeface="+mj-lt"/>
-              <a:buAutoNum type="arabicPeriod"/>
-            </a:pPr>
-            <a:r>
-              <a:rPr lang="en-US" sz="2400" dirty="0">
-                <a:latin typeface="Open Sans" pitchFamily="2" charset="0"/>
-                <a:ea typeface="Open Sans" pitchFamily="2" charset="0"/>
-                <a:cs typeface="Open Sans" pitchFamily="2" charset="0"/>
-              </a:rPr>
-              <a:t>Custom Mapping</a:t>
+              <a:t>.</a:t>
             </a:r>
           </a:p>
         </p:txBody>
@@ -4292,7 +4160,7 @@
     </p:spTree>
     <p:extLst>
       <p:ext uri="{BB962C8B-B14F-4D97-AF65-F5344CB8AC3E}">
-        <p14:creationId xmlns:p14="http://schemas.microsoft.com/office/powerpoint/2010/main" val="2738787431"/>
+        <p14:creationId xmlns:p14="http://schemas.microsoft.com/office/powerpoint/2010/main" val="145090833"/>
       </p:ext>
     </p:extLst>
   </p:cSld>
@@ -4310,7 +4178,7 @@
         <p:cNvPr id="1" name="">
           <a:extLst>
             <a:ext uri="{FF2B5EF4-FFF2-40B4-BE49-F238E27FC236}">
-              <a16:creationId xmlns:a16="http://schemas.microsoft.com/office/drawing/2014/main" id="{6D19EDEA-1A05-C8E8-FBA0-49CE6002CDCA}"/>
+              <a16:creationId xmlns:a16="http://schemas.microsoft.com/office/drawing/2014/main" id="{8CA822CF-61E7-D4A4-E048-D296A45421F7}"/>
             </a:ext>
           </a:extLst>
         </p:cNvPr>
@@ -4327,76 +4195,81 @@
       </p:grpSpPr>
       <p:sp>
         <p:nvSpPr>
-          <p:cNvPr id="5" name="TextBox 4">
-            <a:extLst>
-              <a:ext uri="{FF2B5EF4-FFF2-40B4-BE49-F238E27FC236}">
-                <a16:creationId xmlns:a16="http://schemas.microsoft.com/office/drawing/2014/main" id="{C58DC8EB-BC48-D049-FCBD-598AFD196913}"/>
-              </a:ext>
-            </a:extLst>
-          </p:cNvPr>
-          <p:cNvSpPr txBox="1"/>
-          <p:nvPr/>
+          <p:cNvPr id="2" name="Title 1">
+            <a:extLst>
+              <a:ext uri="{FF2B5EF4-FFF2-40B4-BE49-F238E27FC236}">
+                <a16:creationId xmlns:a16="http://schemas.microsoft.com/office/drawing/2014/main" id="{B0117384-56C5-24B5-624E-767F3168840B}"/>
+              </a:ext>
+            </a:extLst>
+          </p:cNvPr>
+          <p:cNvSpPr>
+            <a:spLocks noGrp="1"/>
+          </p:cNvSpPr>
+          <p:nvPr>
+            <p:ph type="title"/>
+          </p:nvPr>
         </p:nvSpPr>
         <p:spPr>
           <a:xfrm>
-            <a:off x="1597742" y="403123"/>
-            <a:ext cx="8996516" cy="646331"/>
+            <a:off x="838200" y="365125"/>
+            <a:ext cx="10515600" cy="640080"/>
           </a:xfrm>
-          <a:prstGeom prst="rect">
-            <a:avLst/>
-          </a:prstGeom>
-          <a:noFill/>
         </p:spPr>
         <p:txBody>
-          <a:bodyPr wrap="square" rtlCol="0">
-            <a:spAutoFit/>
+          <a:bodyPr>
+            <a:normAutofit/>
           </a:bodyPr>
           <a:lstStyle/>
           <a:p>
+            <a:pPr algn="ctr"/>
             <a:r>
               <a:rPr lang="en-US" sz="3600" dirty="0">
                 <a:latin typeface="Bebas Neue" panose="020B0606020202050201" pitchFamily="34" charset="0"/>
               </a:rPr>
-              <a:t>Heading</a:t>
-            </a:r>
-          </a:p>
-        </p:txBody>
-      </p:sp>
-      <p:sp>
-        <p:nvSpPr>
-          <p:cNvPr id="7" name="TextBox 6">
-            <a:extLst>
-              <a:ext uri="{FF2B5EF4-FFF2-40B4-BE49-F238E27FC236}">
-                <a16:creationId xmlns:a16="http://schemas.microsoft.com/office/drawing/2014/main" id="{1A8BBFC4-26AF-2BD5-B5DB-5EBC10022B56}"/>
-              </a:ext>
-            </a:extLst>
-          </p:cNvPr>
-          <p:cNvSpPr txBox="1"/>
-          <p:nvPr/>
+              <a:t>T</a:t>
+            </a:r>
+            <a:endParaRPr lang="en-US" sz="3600" dirty="0"/>
+          </a:p>
+        </p:txBody>
+      </p:sp>
+      <p:sp>
+        <p:nvSpPr>
+          <p:cNvPr id="3" name="Content Placeholder 2">
+            <a:extLst>
+              <a:ext uri="{FF2B5EF4-FFF2-40B4-BE49-F238E27FC236}">
+                <a16:creationId xmlns:a16="http://schemas.microsoft.com/office/drawing/2014/main" id="{F56ACDEB-9BE6-9E8C-F3F3-47CC1816FE9C}"/>
+              </a:ext>
+            </a:extLst>
+          </p:cNvPr>
+          <p:cNvSpPr>
+            <a:spLocks noGrp="1"/>
+          </p:cNvSpPr>
+          <p:nvPr>
+            <p:ph idx="1"/>
+          </p:nvPr>
         </p:nvSpPr>
         <p:spPr>
           <a:xfrm>
-            <a:off x="1597742" y="1894401"/>
-            <a:ext cx="8996516" cy="461665"/>
+            <a:off x="838200" y="1091381"/>
+            <a:ext cx="10515600" cy="5085582"/>
           </a:xfrm>
-          <a:prstGeom prst="rect">
-            <a:avLst/>
-          </a:prstGeom>
-          <a:noFill/>
         </p:spPr>
         <p:txBody>
-          <a:bodyPr wrap="square" rtlCol="0">
-            <a:spAutoFit/>
+          <a:bodyPr>
+            <a:normAutofit/>
           </a:bodyPr>
           <a:lstStyle/>
           <a:p>
+            <a:pPr marL="0" indent="0" algn="just">
+              <a:buNone/>
+            </a:pPr>
             <a:r>
               <a:rPr lang="en-US" sz="2400" dirty="0">
                 <a:latin typeface="Open Sans" pitchFamily="2" charset="0"/>
                 <a:ea typeface="Open Sans" pitchFamily="2" charset="0"/>
                 <a:cs typeface="Open Sans" pitchFamily="2" charset="0"/>
               </a:rPr>
-              <a:t>Body</a:t>
+              <a:t>H</a:t>
             </a:r>
           </a:p>
         </p:txBody>
@@ -4404,791 +4277,7 @@
     </p:spTree>
     <p:extLst>
       <p:ext uri="{BB962C8B-B14F-4D97-AF65-F5344CB8AC3E}">
-        <p14:creationId xmlns:p14="http://schemas.microsoft.com/office/powerpoint/2010/main" val="2786295632"/>
-      </p:ext>
-    </p:extLst>
-  </p:cSld>
-  <p:clrMapOvr>
-    <a:masterClrMapping/>
-  </p:clrMapOvr>
-</p:sld>
-</file>
-
-<file path=ppt/slides/slide13.xml><?xml version="1.0" encoding="utf-8"?>
-<p:sld xmlns:a="http://schemas.openxmlformats.org/drawingml/2006/main" xmlns:r="http://schemas.openxmlformats.org/officeDocument/2006/relationships" xmlns:p="http://schemas.openxmlformats.org/presentationml/2006/main">
-  <p:cSld>
-    <p:spTree>
-      <p:nvGrpSpPr>
-        <p:cNvPr id="1" name="">
-          <a:extLst>
-            <a:ext uri="{FF2B5EF4-FFF2-40B4-BE49-F238E27FC236}">
-              <a16:creationId xmlns:a16="http://schemas.microsoft.com/office/drawing/2014/main" id="{EBF7157D-E79F-5877-E631-8BE4FE376178}"/>
-            </a:ext>
-          </a:extLst>
-        </p:cNvPr>
-        <p:cNvGrpSpPr/>
-        <p:nvPr/>
-      </p:nvGrpSpPr>
-      <p:grpSpPr>
-        <a:xfrm>
-          <a:off x="0" y="0"/>
-          <a:ext cx="0" cy="0"/>
-          <a:chOff x="0" y="0"/>
-          <a:chExt cx="0" cy="0"/>
-        </a:xfrm>
-      </p:grpSpPr>
-      <p:sp>
-        <p:nvSpPr>
-          <p:cNvPr id="5" name="TextBox 4">
-            <a:extLst>
-              <a:ext uri="{FF2B5EF4-FFF2-40B4-BE49-F238E27FC236}">
-                <a16:creationId xmlns:a16="http://schemas.microsoft.com/office/drawing/2014/main" id="{45B0E3E9-81F5-E6C2-FF03-DEAC193685CB}"/>
-              </a:ext>
-            </a:extLst>
-          </p:cNvPr>
-          <p:cNvSpPr txBox="1"/>
-          <p:nvPr/>
-        </p:nvSpPr>
-        <p:spPr>
-          <a:xfrm>
-            <a:off x="1597742" y="403123"/>
-            <a:ext cx="8996516" cy="646331"/>
-          </a:xfrm>
-          <a:prstGeom prst="rect">
-            <a:avLst/>
-          </a:prstGeom>
-          <a:noFill/>
-        </p:spPr>
-        <p:txBody>
-          <a:bodyPr wrap="square" rtlCol="0">
-            <a:spAutoFit/>
-          </a:bodyPr>
-          <a:lstStyle/>
-          <a:p>
-            <a:r>
-              <a:rPr lang="en-US" sz="3600" dirty="0">
-                <a:latin typeface="Bebas Neue" panose="020B0606020202050201" pitchFamily="34" charset="0"/>
-              </a:rPr>
-              <a:t>Heading</a:t>
-            </a:r>
-          </a:p>
-        </p:txBody>
-      </p:sp>
-      <p:sp>
-        <p:nvSpPr>
-          <p:cNvPr id="7" name="TextBox 6">
-            <a:extLst>
-              <a:ext uri="{FF2B5EF4-FFF2-40B4-BE49-F238E27FC236}">
-                <a16:creationId xmlns:a16="http://schemas.microsoft.com/office/drawing/2014/main" id="{0D36C79E-520D-2C49-A110-268F8C229827}"/>
-              </a:ext>
-            </a:extLst>
-          </p:cNvPr>
-          <p:cNvSpPr txBox="1"/>
-          <p:nvPr/>
-        </p:nvSpPr>
-        <p:spPr>
-          <a:xfrm>
-            <a:off x="1597742" y="1894401"/>
-            <a:ext cx="8996516" cy="461665"/>
-          </a:xfrm>
-          <a:prstGeom prst="rect">
-            <a:avLst/>
-          </a:prstGeom>
-          <a:noFill/>
-        </p:spPr>
-        <p:txBody>
-          <a:bodyPr wrap="square" rtlCol="0">
-            <a:spAutoFit/>
-          </a:bodyPr>
-          <a:lstStyle/>
-          <a:p>
-            <a:r>
-              <a:rPr lang="en-US" sz="2400" dirty="0">
-                <a:latin typeface="Open Sans" pitchFamily="2" charset="0"/>
-                <a:ea typeface="Open Sans" pitchFamily="2" charset="0"/>
-                <a:cs typeface="Open Sans" pitchFamily="2" charset="0"/>
-              </a:rPr>
-              <a:t>Body</a:t>
-            </a:r>
-          </a:p>
-        </p:txBody>
-      </p:sp>
-    </p:spTree>
-    <p:extLst>
-      <p:ext uri="{BB962C8B-B14F-4D97-AF65-F5344CB8AC3E}">
-        <p14:creationId xmlns:p14="http://schemas.microsoft.com/office/powerpoint/2010/main" val="2911427837"/>
-      </p:ext>
-    </p:extLst>
-  </p:cSld>
-  <p:clrMapOvr>
-    <a:masterClrMapping/>
-  </p:clrMapOvr>
-</p:sld>
-</file>
-
-<file path=ppt/slides/slide14.xml><?xml version="1.0" encoding="utf-8"?>
-<p:sld xmlns:a="http://schemas.openxmlformats.org/drawingml/2006/main" xmlns:r="http://schemas.openxmlformats.org/officeDocument/2006/relationships" xmlns:p="http://schemas.openxmlformats.org/presentationml/2006/main">
-  <p:cSld>
-    <p:spTree>
-      <p:nvGrpSpPr>
-        <p:cNvPr id="1" name="">
-          <a:extLst>
-            <a:ext uri="{FF2B5EF4-FFF2-40B4-BE49-F238E27FC236}">
-              <a16:creationId xmlns:a16="http://schemas.microsoft.com/office/drawing/2014/main" id="{5FFB2451-A3D4-C948-D66E-3B59A5CDCA8F}"/>
-            </a:ext>
-          </a:extLst>
-        </p:cNvPr>
-        <p:cNvGrpSpPr/>
-        <p:nvPr/>
-      </p:nvGrpSpPr>
-      <p:grpSpPr>
-        <a:xfrm>
-          <a:off x="0" y="0"/>
-          <a:ext cx="0" cy="0"/>
-          <a:chOff x="0" y="0"/>
-          <a:chExt cx="0" cy="0"/>
-        </a:xfrm>
-      </p:grpSpPr>
-      <p:sp>
-        <p:nvSpPr>
-          <p:cNvPr id="5" name="TextBox 4">
-            <a:extLst>
-              <a:ext uri="{FF2B5EF4-FFF2-40B4-BE49-F238E27FC236}">
-                <a16:creationId xmlns:a16="http://schemas.microsoft.com/office/drawing/2014/main" id="{A1C0DD3C-17B0-4F0F-AFCC-9F128041EC90}"/>
-              </a:ext>
-            </a:extLst>
-          </p:cNvPr>
-          <p:cNvSpPr txBox="1"/>
-          <p:nvPr/>
-        </p:nvSpPr>
-        <p:spPr>
-          <a:xfrm>
-            <a:off x="1597742" y="403123"/>
-            <a:ext cx="8996516" cy="646331"/>
-          </a:xfrm>
-          <a:prstGeom prst="rect">
-            <a:avLst/>
-          </a:prstGeom>
-          <a:noFill/>
-        </p:spPr>
-        <p:txBody>
-          <a:bodyPr wrap="square" rtlCol="0">
-            <a:spAutoFit/>
-          </a:bodyPr>
-          <a:lstStyle/>
-          <a:p>
-            <a:r>
-              <a:rPr lang="en-US" sz="3600" dirty="0">
-                <a:latin typeface="Bebas Neue" panose="020B0606020202050201" pitchFamily="34" charset="0"/>
-              </a:rPr>
-              <a:t>Heading</a:t>
-            </a:r>
-          </a:p>
-        </p:txBody>
-      </p:sp>
-      <p:sp>
-        <p:nvSpPr>
-          <p:cNvPr id="7" name="TextBox 6">
-            <a:extLst>
-              <a:ext uri="{FF2B5EF4-FFF2-40B4-BE49-F238E27FC236}">
-                <a16:creationId xmlns:a16="http://schemas.microsoft.com/office/drawing/2014/main" id="{1F70BB40-5B5B-9DC8-83E7-2DAC08F9E493}"/>
-              </a:ext>
-            </a:extLst>
-          </p:cNvPr>
-          <p:cNvSpPr txBox="1"/>
-          <p:nvPr/>
-        </p:nvSpPr>
-        <p:spPr>
-          <a:xfrm>
-            <a:off x="1597742" y="1894401"/>
-            <a:ext cx="8996516" cy="461665"/>
-          </a:xfrm>
-          <a:prstGeom prst="rect">
-            <a:avLst/>
-          </a:prstGeom>
-          <a:noFill/>
-        </p:spPr>
-        <p:txBody>
-          <a:bodyPr wrap="square" rtlCol="0">
-            <a:spAutoFit/>
-          </a:bodyPr>
-          <a:lstStyle/>
-          <a:p>
-            <a:r>
-              <a:rPr lang="en-US" sz="2400" dirty="0">
-                <a:latin typeface="Open Sans" pitchFamily="2" charset="0"/>
-                <a:ea typeface="Open Sans" pitchFamily="2" charset="0"/>
-                <a:cs typeface="Open Sans" pitchFamily="2" charset="0"/>
-              </a:rPr>
-              <a:t>Body</a:t>
-            </a:r>
-          </a:p>
-        </p:txBody>
-      </p:sp>
-    </p:spTree>
-    <p:extLst>
-      <p:ext uri="{BB962C8B-B14F-4D97-AF65-F5344CB8AC3E}">
-        <p14:creationId xmlns:p14="http://schemas.microsoft.com/office/powerpoint/2010/main" val="1345074105"/>
-      </p:ext>
-    </p:extLst>
-  </p:cSld>
-  <p:clrMapOvr>
-    <a:masterClrMapping/>
-  </p:clrMapOvr>
-</p:sld>
-</file>
-
-<file path=ppt/slides/slide15.xml><?xml version="1.0" encoding="utf-8"?>
-<p:sld xmlns:a="http://schemas.openxmlformats.org/drawingml/2006/main" xmlns:r="http://schemas.openxmlformats.org/officeDocument/2006/relationships" xmlns:p="http://schemas.openxmlformats.org/presentationml/2006/main">
-  <p:cSld>
-    <p:spTree>
-      <p:nvGrpSpPr>
-        <p:cNvPr id="1" name="">
-          <a:extLst>
-            <a:ext uri="{FF2B5EF4-FFF2-40B4-BE49-F238E27FC236}">
-              <a16:creationId xmlns:a16="http://schemas.microsoft.com/office/drawing/2014/main" id="{678FEA27-53BB-FC09-511E-97045BF472E4}"/>
-            </a:ext>
-          </a:extLst>
-        </p:cNvPr>
-        <p:cNvGrpSpPr/>
-        <p:nvPr/>
-      </p:nvGrpSpPr>
-      <p:grpSpPr>
-        <a:xfrm>
-          <a:off x="0" y="0"/>
-          <a:ext cx="0" cy="0"/>
-          <a:chOff x="0" y="0"/>
-          <a:chExt cx="0" cy="0"/>
-        </a:xfrm>
-      </p:grpSpPr>
-      <p:sp>
-        <p:nvSpPr>
-          <p:cNvPr id="5" name="TextBox 4">
-            <a:extLst>
-              <a:ext uri="{FF2B5EF4-FFF2-40B4-BE49-F238E27FC236}">
-                <a16:creationId xmlns:a16="http://schemas.microsoft.com/office/drawing/2014/main" id="{F701F787-E47C-375F-157B-36716506BABC}"/>
-              </a:ext>
-            </a:extLst>
-          </p:cNvPr>
-          <p:cNvSpPr txBox="1"/>
-          <p:nvPr/>
-        </p:nvSpPr>
-        <p:spPr>
-          <a:xfrm>
-            <a:off x="1597742" y="403123"/>
-            <a:ext cx="8996516" cy="646331"/>
-          </a:xfrm>
-          <a:prstGeom prst="rect">
-            <a:avLst/>
-          </a:prstGeom>
-          <a:noFill/>
-        </p:spPr>
-        <p:txBody>
-          <a:bodyPr wrap="square" rtlCol="0">
-            <a:spAutoFit/>
-          </a:bodyPr>
-          <a:lstStyle/>
-          <a:p>
-            <a:r>
-              <a:rPr lang="en-US" sz="3600" dirty="0">
-                <a:latin typeface="Bebas Neue" panose="020B0606020202050201" pitchFamily="34" charset="0"/>
-              </a:rPr>
-              <a:t>Heading</a:t>
-            </a:r>
-          </a:p>
-        </p:txBody>
-      </p:sp>
-      <p:sp>
-        <p:nvSpPr>
-          <p:cNvPr id="7" name="TextBox 6">
-            <a:extLst>
-              <a:ext uri="{FF2B5EF4-FFF2-40B4-BE49-F238E27FC236}">
-                <a16:creationId xmlns:a16="http://schemas.microsoft.com/office/drawing/2014/main" id="{4F56F986-C6CC-5E7C-3002-13C6D15258A7}"/>
-              </a:ext>
-            </a:extLst>
-          </p:cNvPr>
-          <p:cNvSpPr txBox="1"/>
-          <p:nvPr/>
-        </p:nvSpPr>
-        <p:spPr>
-          <a:xfrm>
-            <a:off x="1597742" y="1894401"/>
-            <a:ext cx="8996516" cy="461665"/>
-          </a:xfrm>
-          <a:prstGeom prst="rect">
-            <a:avLst/>
-          </a:prstGeom>
-          <a:noFill/>
-        </p:spPr>
-        <p:txBody>
-          <a:bodyPr wrap="square" rtlCol="0">
-            <a:spAutoFit/>
-          </a:bodyPr>
-          <a:lstStyle/>
-          <a:p>
-            <a:r>
-              <a:rPr lang="en-US" sz="2400" dirty="0">
-                <a:latin typeface="Open Sans" pitchFamily="2" charset="0"/>
-                <a:ea typeface="Open Sans" pitchFamily="2" charset="0"/>
-                <a:cs typeface="Open Sans" pitchFamily="2" charset="0"/>
-              </a:rPr>
-              <a:t>Body</a:t>
-            </a:r>
-          </a:p>
-        </p:txBody>
-      </p:sp>
-    </p:spTree>
-    <p:extLst>
-      <p:ext uri="{BB962C8B-B14F-4D97-AF65-F5344CB8AC3E}">
-        <p14:creationId xmlns:p14="http://schemas.microsoft.com/office/powerpoint/2010/main" val="2007949249"/>
-      </p:ext>
-    </p:extLst>
-  </p:cSld>
-  <p:clrMapOvr>
-    <a:masterClrMapping/>
-  </p:clrMapOvr>
-</p:sld>
-</file>
-
-<file path=ppt/slides/slide16.xml><?xml version="1.0" encoding="utf-8"?>
-<p:sld xmlns:a="http://schemas.openxmlformats.org/drawingml/2006/main" xmlns:r="http://schemas.openxmlformats.org/officeDocument/2006/relationships" xmlns:p="http://schemas.openxmlformats.org/presentationml/2006/main">
-  <p:cSld>
-    <p:spTree>
-      <p:nvGrpSpPr>
-        <p:cNvPr id="1" name="">
-          <a:extLst>
-            <a:ext uri="{FF2B5EF4-FFF2-40B4-BE49-F238E27FC236}">
-              <a16:creationId xmlns:a16="http://schemas.microsoft.com/office/drawing/2014/main" id="{11E55EF2-5D70-3190-1FA3-2CB7B11156E2}"/>
-            </a:ext>
-          </a:extLst>
-        </p:cNvPr>
-        <p:cNvGrpSpPr/>
-        <p:nvPr/>
-      </p:nvGrpSpPr>
-      <p:grpSpPr>
-        <a:xfrm>
-          <a:off x="0" y="0"/>
-          <a:ext cx="0" cy="0"/>
-          <a:chOff x="0" y="0"/>
-          <a:chExt cx="0" cy="0"/>
-        </a:xfrm>
-      </p:grpSpPr>
-      <p:sp>
-        <p:nvSpPr>
-          <p:cNvPr id="5" name="TextBox 4">
-            <a:extLst>
-              <a:ext uri="{FF2B5EF4-FFF2-40B4-BE49-F238E27FC236}">
-                <a16:creationId xmlns:a16="http://schemas.microsoft.com/office/drawing/2014/main" id="{A12A8DA3-496A-C471-E445-2CC3F01B6D76}"/>
-              </a:ext>
-            </a:extLst>
-          </p:cNvPr>
-          <p:cNvSpPr txBox="1"/>
-          <p:nvPr/>
-        </p:nvSpPr>
-        <p:spPr>
-          <a:xfrm>
-            <a:off x="1597742" y="403123"/>
-            <a:ext cx="8996516" cy="646331"/>
-          </a:xfrm>
-          <a:prstGeom prst="rect">
-            <a:avLst/>
-          </a:prstGeom>
-          <a:noFill/>
-        </p:spPr>
-        <p:txBody>
-          <a:bodyPr wrap="square" rtlCol="0">
-            <a:spAutoFit/>
-          </a:bodyPr>
-          <a:lstStyle/>
-          <a:p>
-            <a:r>
-              <a:rPr lang="en-US" sz="3600" dirty="0">
-                <a:latin typeface="Bebas Neue" panose="020B0606020202050201" pitchFamily="34" charset="0"/>
-              </a:rPr>
-              <a:t>Heading</a:t>
-            </a:r>
-          </a:p>
-        </p:txBody>
-      </p:sp>
-      <p:sp>
-        <p:nvSpPr>
-          <p:cNvPr id="7" name="TextBox 6">
-            <a:extLst>
-              <a:ext uri="{FF2B5EF4-FFF2-40B4-BE49-F238E27FC236}">
-                <a16:creationId xmlns:a16="http://schemas.microsoft.com/office/drawing/2014/main" id="{F948F25F-376A-AB56-DBCB-FC09FC780ADB}"/>
-              </a:ext>
-            </a:extLst>
-          </p:cNvPr>
-          <p:cNvSpPr txBox="1"/>
-          <p:nvPr/>
-        </p:nvSpPr>
-        <p:spPr>
-          <a:xfrm>
-            <a:off x="1597742" y="1894401"/>
-            <a:ext cx="8996516" cy="461665"/>
-          </a:xfrm>
-          <a:prstGeom prst="rect">
-            <a:avLst/>
-          </a:prstGeom>
-          <a:noFill/>
-        </p:spPr>
-        <p:txBody>
-          <a:bodyPr wrap="square" rtlCol="0">
-            <a:spAutoFit/>
-          </a:bodyPr>
-          <a:lstStyle/>
-          <a:p>
-            <a:r>
-              <a:rPr lang="en-US" sz="2400" dirty="0">
-                <a:latin typeface="Open Sans" pitchFamily="2" charset="0"/>
-                <a:ea typeface="Open Sans" pitchFamily="2" charset="0"/>
-                <a:cs typeface="Open Sans" pitchFamily="2" charset="0"/>
-              </a:rPr>
-              <a:t>Body</a:t>
-            </a:r>
-          </a:p>
-        </p:txBody>
-      </p:sp>
-    </p:spTree>
-    <p:extLst>
-      <p:ext uri="{BB962C8B-B14F-4D97-AF65-F5344CB8AC3E}">
-        <p14:creationId xmlns:p14="http://schemas.microsoft.com/office/powerpoint/2010/main" val="1213910009"/>
-      </p:ext>
-    </p:extLst>
-  </p:cSld>
-  <p:clrMapOvr>
-    <a:masterClrMapping/>
-  </p:clrMapOvr>
-</p:sld>
-</file>
-
-<file path=ppt/slides/slide17.xml><?xml version="1.0" encoding="utf-8"?>
-<p:sld xmlns:a="http://schemas.openxmlformats.org/drawingml/2006/main" xmlns:r="http://schemas.openxmlformats.org/officeDocument/2006/relationships" xmlns:p="http://schemas.openxmlformats.org/presentationml/2006/main">
-  <p:cSld>
-    <p:spTree>
-      <p:nvGrpSpPr>
-        <p:cNvPr id="1" name="">
-          <a:extLst>
-            <a:ext uri="{FF2B5EF4-FFF2-40B4-BE49-F238E27FC236}">
-              <a16:creationId xmlns:a16="http://schemas.microsoft.com/office/drawing/2014/main" id="{D2EB70D9-378D-23C6-DAA3-4315E7B808B5}"/>
-            </a:ext>
-          </a:extLst>
-        </p:cNvPr>
-        <p:cNvGrpSpPr/>
-        <p:nvPr/>
-      </p:nvGrpSpPr>
-      <p:grpSpPr>
-        <a:xfrm>
-          <a:off x="0" y="0"/>
-          <a:ext cx="0" cy="0"/>
-          <a:chOff x="0" y="0"/>
-          <a:chExt cx="0" cy="0"/>
-        </a:xfrm>
-      </p:grpSpPr>
-      <p:sp>
-        <p:nvSpPr>
-          <p:cNvPr id="5" name="TextBox 4">
-            <a:extLst>
-              <a:ext uri="{FF2B5EF4-FFF2-40B4-BE49-F238E27FC236}">
-                <a16:creationId xmlns:a16="http://schemas.microsoft.com/office/drawing/2014/main" id="{2B7BBEFA-149D-B407-96A0-8BC2BDBCD041}"/>
-              </a:ext>
-            </a:extLst>
-          </p:cNvPr>
-          <p:cNvSpPr txBox="1"/>
-          <p:nvPr/>
-        </p:nvSpPr>
-        <p:spPr>
-          <a:xfrm>
-            <a:off x="1597742" y="403123"/>
-            <a:ext cx="8996516" cy="646331"/>
-          </a:xfrm>
-          <a:prstGeom prst="rect">
-            <a:avLst/>
-          </a:prstGeom>
-          <a:noFill/>
-        </p:spPr>
-        <p:txBody>
-          <a:bodyPr wrap="square" rtlCol="0">
-            <a:spAutoFit/>
-          </a:bodyPr>
-          <a:lstStyle/>
-          <a:p>
-            <a:r>
-              <a:rPr lang="en-US" sz="3600" dirty="0">
-                <a:latin typeface="Bebas Neue" panose="020B0606020202050201" pitchFamily="34" charset="0"/>
-              </a:rPr>
-              <a:t>Heading</a:t>
-            </a:r>
-          </a:p>
-        </p:txBody>
-      </p:sp>
-      <p:sp>
-        <p:nvSpPr>
-          <p:cNvPr id="7" name="TextBox 6">
-            <a:extLst>
-              <a:ext uri="{FF2B5EF4-FFF2-40B4-BE49-F238E27FC236}">
-                <a16:creationId xmlns:a16="http://schemas.microsoft.com/office/drawing/2014/main" id="{294737F6-2512-11D1-D01E-170FEA972075}"/>
-              </a:ext>
-            </a:extLst>
-          </p:cNvPr>
-          <p:cNvSpPr txBox="1"/>
-          <p:nvPr/>
-        </p:nvSpPr>
-        <p:spPr>
-          <a:xfrm>
-            <a:off x="1597742" y="1894401"/>
-            <a:ext cx="8996516" cy="461665"/>
-          </a:xfrm>
-          <a:prstGeom prst="rect">
-            <a:avLst/>
-          </a:prstGeom>
-          <a:noFill/>
-        </p:spPr>
-        <p:txBody>
-          <a:bodyPr wrap="square" rtlCol="0">
-            <a:spAutoFit/>
-          </a:bodyPr>
-          <a:lstStyle/>
-          <a:p>
-            <a:r>
-              <a:rPr lang="en-US" sz="2400" dirty="0">
-                <a:latin typeface="Open Sans" pitchFamily="2" charset="0"/>
-                <a:ea typeface="Open Sans" pitchFamily="2" charset="0"/>
-                <a:cs typeface="Open Sans" pitchFamily="2" charset="0"/>
-              </a:rPr>
-              <a:t>Body</a:t>
-            </a:r>
-          </a:p>
-        </p:txBody>
-      </p:sp>
-    </p:spTree>
-    <p:extLst>
-      <p:ext uri="{BB962C8B-B14F-4D97-AF65-F5344CB8AC3E}">
-        <p14:creationId xmlns:p14="http://schemas.microsoft.com/office/powerpoint/2010/main" val="3520665041"/>
-      </p:ext>
-    </p:extLst>
-  </p:cSld>
-  <p:clrMapOvr>
-    <a:masterClrMapping/>
-  </p:clrMapOvr>
-</p:sld>
-</file>
-
-<file path=ppt/slides/slide18.xml><?xml version="1.0" encoding="utf-8"?>
-<p:sld xmlns:a="http://schemas.openxmlformats.org/drawingml/2006/main" xmlns:r="http://schemas.openxmlformats.org/officeDocument/2006/relationships" xmlns:p="http://schemas.openxmlformats.org/presentationml/2006/main">
-  <p:cSld>
-    <p:spTree>
-      <p:nvGrpSpPr>
-        <p:cNvPr id="1" name="">
-          <a:extLst>
-            <a:ext uri="{FF2B5EF4-FFF2-40B4-BE49-F238E27FC236}">
-              <a16:creationId xmlns:a16="http://schemas.microsoft.com/office/drawing/2014/main" id="{C037A0F5-CB37-CEB7-A2AA-ACCAF1C64ABA}"/>
-            </a:ext>
-          </a:extLst>
-        </p:cNvPr>
-        <p:cNvGrpSpPr/>
-        <p:nvPr/>
-      </p:nvGrpSpPr>
-      <p:grpSpPr>
-        <a:xfrm>
-          <a:off x="0" y="0"/>
-          <a:ext cx="0" cy="0"/>
-          <a:chOff x="0" y="0"/>
-          <a:chExt cx="0" cy="0"/>
-        </a:xfrm>
-      </p:grpSpPr>
-      <p:sp>
-        <p:nvSpPr>
-          <p:cNvPr id="5" name="TextBox 4">
-            <a:extLst>
-              <a:ext uri="{FF2B5EF4-FFF2-40B4-BE49-F238E27FC236}">
-                <a16:creationId xmlns:a16="http://schemas.microsoft.com/office/drawing/2014/main" id="{FF8A415A-C9C5-A7FD-C57C-4B4B6BC5F963}"/>
-              </a:ext>
-            </a:extLst>
-          </p:cNvPr>
-          <p:cNvSpPr txBox="1"/>
-          <p:nvPr/>
-        </p:nvSpPr>
-        <p:spPr>
-          <a:xfrm>
-            <a:off x="1597742" y="403123"/>
-            <a:ext cx="8996516" cy="646331"/>
-          </a:xfrm>
-          <a:prstGeom prst="rect">
-            <a:avLst/>
-          </a:prstGeom>
-          <a:noFill/>
-        </p:spPr>
-        <p:txBody>
-          <a:bodyPr wrap="square" rtlCol="0">
-            <a:spAutoFit/>
-          </a:bodyPr>
-          <a:lstStyle/>
-          <a:p>
-            <a:r>
-              <a:rPr lang="en-US" sz="3600" dirty="0">
-                <a:latin typeface="Bebas Neue" panose="020B0606020202050201" pitchFamily="34" charset="0"/>
-              </a:rPr>
-              <a:t>Heading</a:t>
-            </a:r>
-          </a:p>
-        </p:txBody>
-      </p:sp>
-      <p:sp>
-        <p:nvSpPr>
-          <p:cNvPr id="7" name="TextBox 6">
-            <a:extLst>
-              <a:ext uri="{FF2B5EF4-FFF2-40B4-BE49-F238E27FC236}">
-                <a16:creationId xmlns:a16="http://schemas.microsoft.com/office/drawing/2014/main" id="{FF6B732C-D06F-237E-B082-04E66512B2B6}"/>
-              </a:ext>
-            </a:extLst>
-          </p:cNvPr>
-          <p:cNvSpPr txBox="1"/>
-          <p:nvPr/>
-        </p:nvSpPr>
-        <p:spPr>
-          <a:xfrm>
-            <a:off x="1597742" y="1894401"/>
-            <a:ext cx="8996516" cy="461665"/>
-          </a:xfrm>
-          <a:prstGeom prst="rect">
-            <a:avLst/>
-          </a:prstGeom>
-          <a:noFill/>
-        </p:spPr>
-        <p:txBody>
-          <a:bodyPr wrap="square" rtlCol="0">
-            <a:spAutoFit/>
-          </a:bodyPr>
-          <a:lstStyle/>
-          <a:p>
-            <a:r>
-              <a:rPr lang="en-US" sz="2400" dirty="0">
-                <a:latin typeface="Open Sans" pitchFamily="2" charset="0"/>
-                <a:ea typeface="Open Sans" pitchFamily="2" charset="0"/>
-                <a:cs typeface="Open Sans" pitchFamily="2" charset="0"/>
-              </a:rPr>
-              <a:t>Body</a:t>
-            </a:r>
-          </a:p>
-        </p:txBody>
-      </p:sp>
-    </p:spTree>
-    <p:extLst>
-      <p:ext uri="{BB962C8B-B14F-4D97-AF65-F5344CB8AC3E}">
-        <p14:creationId xmlns:p14="http://schemas.microsoft.com/office/powerpoint/2010/main" val="1855519445"/>
-      </p:ext>
-    </p:extLst>
-  </p:cSld>
-  <p:clrMapOvr>
-    <a:masterClrMapping/>
-  </p:clrMapOvr>
-</p:sld>
-</file>
-
-<file path=ppt/slides/slide19.xml><?xml version="1.0" encoding="utf-8"?>
-<p:sld xmlns:a="http://schemas.openxmlformats.org/drawingml/2006/main" xmlns:r="http://schemas.openxmlformats.org/officeDocument/2006/relationships" xmlns:p="http://schemas.openxmlformats.org/presentationml/2006/main">
-  <p:cSld>
-    <p:spTree>
-      <p:nvGrpSpPr>
-        <p:cNvPr id="1" name="">
-          <a:extLst>
-            <a:ext uri="{FF2B5EF4-FFF2-40B4-BE49-F238E27FC236}">
-              <a16:creationId xmlns:a16="http://schemas.microsoft.com/office/drawing/2014/main" id="{627E7536-EEE8-D5C5-9689-422506A2A94F}"/>
-            </a:ext>
-          </a:extLst>
-        </p:cNvPr>
-        <p:cNvGrpSpPr/>
-        <p:nvPr/>
-      </p:nvGrpSpPr>
-      <p:grpSpPr>
-        <a:xfrm>
-          <a:off x="0" y="0"/>
-          <a:ext cx="0" cy="0"/>
-          <a:chOff x="0" y="0"/>
-          <a:chExt cx="0" cy="0"/>
-        </a:xfrm>
-      </p:grpSpPr>
-      <p:sp>
-        <p:nvSpPr>
-          <p:cNvPr id="5" name="TextBox 4">
-            <a:extLst>
-              <a:ext uri="{FF2B5EF4-FFF2-40B4-BE49-F238E27FC236}">
-                <a16:creationId xmlns:a16="http://schemas.microsoft.com/office/drawing/2014/main" id="{6670A1D9-F266-1D34-5DF9-3C29241E3C05}"/>
-              </a:ext>
-            </a:extLst>
-          </p:cNvPr>
-          <p:cNvSpPr txBox="1"/>
-          <p:nvPr/>
-        </p:nvSpPr>
-        <p:spPr>
-          <a:xfrm>
-            <a:off x="1597742" y="403123"/>
-            <a:ext cx="8996516" cy="646331"/>
-          </a:xfrm>
-          <a:prstGeom prst="rect">
-            <a:avLst/>
-          </a:prstGeom>
-          <a:noFill/>
-        </p:spPr>
-        <p:txBody>
-          <a:bodyPr wrap="square" rtlCol="0">
-            <a:spAutoFit/>
-          </a:bodyPr>
-          <a:lstStyle/>
-          <a:p>
-            <a:r>
-              <a:rPr lang="en-US" sz="3600" dirty="0">
-                <a:latin typeface="Bebas Neue" panose="020B0606020202050201" pitchFamily="34" charset="0"/>
-              </a:rPr>
-              <a:t>Heading</a:t>
-            </a:r>
-          </a:p>
-        </p:txBody>
-      </p:sp>
-      <p:sp>
-        <p:nvSpPr>
-          <p:cNvPr id="7" name="TextBox 6">
-            <a:extLst>
-              <a:ext uri="{FF2B5EF4-FFF2-40B4-BE49-F238E27FC236}">
-                <a16:creationId xmlns:a16="http://schemas.microsoft.com/office/drawing/2014/main" id="{54A5C0BA-41C4-D3A9-268B-885A346E9E73}"/>
-              </a:ext>
-            </a:extLst>
-          </p:cNvPr>
-          <p:cNvSpPr txBox="1"/>
-          <p:nvPr/>
-        </p:nvSpPr>
-        <p:spPr>
-          <a:xfrm>
-            <a:off x="1597742" y="1894401"/>
-            <a:ext cx="8996516" cy="461665"/>
-          </a:xfrm>
-          <a:prstGeom prst="rect">
-            <a:avLst/>
-          </a:prstGeom>
-          <a:noFill/>
-        </p:spPr>
-        <p:txBody>
-          <a:bodyPr wrap="square" rtlCol="0">
-            <a:spAutoFit/>
-          </a:bodyPr>
-          <a:lstStyle/>
-          <a:p>
-            <a:r>
-              <a:rPr lang="en-US" sz="2400" dirty="0">
-                <a:latin typeface="Open Sans" pitchFamily="2" charset="0"/>
-                <a:ea typeface="Open Sans" pitchFamily="2" charset="0"/>
-                <a:cs typeface="Open Sans" pitchFamily="2" charset="0"/>
-              </a:rPr>
-              <a:t>Body</a:t>
-            </a:r>
-          </a:p>
-        </p:txBody>
-      </p:sp>
-    </p:spTree>
-    <p:extLst>
-      <p:ext uri="{BB962C8B-B14F-4D97-AF65-F5344CB8AC3E}">
-        <p14:creationId xmlns:p14="http://schemas.microsoft.com/office/powerpoint/2010/main" val="2449039113"/>
+        <p14:creationId xmlns:p14="http://schemas.microsoft.com/office/powerpoint/2010/main" val="1846840860"/>
       </p:ext>
     </p:extLst>
   </p:cSld>
@@ -5206,7 +4295,7 @@
         <p:cNvPr id="1" name="">
           <a:extLst>
             <a:ext uri="{FF2B5EF4-FFF2-40B4-BE49-F238E27FC236}">
-              <a16:creationId xmlns:a16="http://schemas.microsoft.com/office/drawing/2014/main" id="{6630645E-2F96-A430-D0AA-7051E70CF3F6}"/>
+              <a16:creationId xmlns:a16="http://schemas.microsoft.com/office/drawing/2014/main" id="{9FE83CEA-77B7-E291-5978-329EAFCF92D9}"/>
             </a:ext>
           </a:extLst>
         </p:cNvPr>
@@ -5223,29 +4312,29 @@
       </p:grpSpPr>
       <p:sp>
         <p:nvSpPr>
-          <p:cNvPr id="5" name="TextBox 4">
-            <a:extLst>
-              <a:ext uri="{FF2B5EF4-FFF2-40B4-BE49-F238E27FC236}">
-                <a16:creationId xmlns:a16="http://schemas.microsoft.com/office/drawing/2014/main" id="{6FE4E385-2BC8-0CF1-1DBA-BD972C24BCAD}"/>
-              </a:ext>
-            </a:extLst>
-          </p:cNvPr>
-          <p:cNvSpPr txBox="1"/>
-          <p:nvPr/>
+          <p:cNvPr id="2" name="Title 1">
+            <a:extLst>
+              <a:ext uri="{FF2B5EF4-FFF2-40B4-BE49-F238E27FC236}">
+                <a16:creationId xmlns:a16="http://schemas.microsoft.com/office/drawing/2014/main" id="{D43E8ECB-727F-319D-A2D5-6CFD142D6BC5}"/>
+              </a:ext>
+            </a:extLst>
+          </p:cNvPr>
+          <p:cNvSpPr>
+            <a:spLocks noGrp="1"/>
+          </p:cNvSpPr>
+          <p:nvPr>
+            <p:ph type="title"/>
+          </p:nvPr>
         </p:nvSpPr>
         <p:spPr>
           <a:xfrm>
-            <a:off x="1597742" y="403123"/>
-            <a:ext cx="8996516" cy="646331"/>
+            <a:off x="838200" y="365125"/>
+            <a:ext cx="10515600" cy="640080"/>
           </a:xfrm>
-          <a:prstGeom prst="rect">
-            <a:avLst/>
-          </a:prstGeom>
-          <a:noFill/>
         </p:spPr>
         <p:txBody>
-          <a:bodyPr wrap="square" rtlCol="0">
-            <a:spAutoFit/>
+          <a:bodyPr>
+            <a:normAutofit/>
           </a:bodyPr>
           <a:lstStyle/>
           <a:p>
@@ -5261,779 +4350,123 @@
       </p:sp>
       <p:sp>
         <p:nvSpPr>
-          <p:cNvPr id="7" name="TextBox 6">
-            <a:extLst>
-              <a:ext uri="{FF2B5EF4-FFF2-40B4-BE49-F238E27FC236}">
-                <a16:creationId xmlns:a16="http://schemas.microsoft.com/office/drawing/2014/main" id="{71A46438-0CDA-B5DD-37BF-219AA4267D3E}"/>
-              </a:ext>
-            </a:extLst>
-          </p:cNvPr>
-          <p:cNvSpPr txBox="1"/>
-          <p:nvPr/>
+          <p:cNvPr id="3" name="Content Placeholder 2">
+            <a:extLst>
+              <a:ext uri="{FF2B5EF4-FFF2-40B4-BE49-F238E27FC236}">
+                <a16:creationId xmlns:a16="http://schemas.microsoft.com/office/drawing/2014/main" id="{1B3EA53F-817A-FBF9-B3DA-BFD564D4EDCF}"/>
+              </a:ext>
+            </a:extLst>
+          </p:cNvPr>
+          <p:cNvSpPr>
+            <a:spLocks noGrp="1"/>
+          </p:cNvSpPr>
+          <p:nvPr>
+            <p:ph idx="1"/>
+          </p:nvPr>
         </p:nvSpPr>
         <p:spPr>
           <a:xfrm>
-            <a:off x="1597742" y="1049454"/>
-            <a:ext cx="8996516" cy="1938992"/>
+            <a:off x="838200" y="1091381"/>
+            <a:ext cx="10515600" cy="5085582"/>
           </a:xfrm>
-          <a:prstGeom prst="rect">
-            <a:avLst/>
-          </a:prstGeom>
-          <a:noFill/>
         </p:spPr>
         <p:txBody>
-          <a:bodyPr wrap="square" rtlCol="0">
-            <a:spAutoFit/>
+          <a:bodyPr>
+            <a:normAutofit/>
           </a:bodyPr>
           <a:lstStyle/>
           <a:p>
-            <a:pPr marL="342900" indent="-342900">
-              <a:buFont typeface="Arial" panose="020B0604020202020204" pitchFamily="34" charset="0"/>
-              <a:buChar char="•"/>
-            </a:pPr>
+            <a:pPr marL="342900" indent="-342900"/>
             <a:r>
               <a:rPr lang="en-US" sz="2400" dirty="0">
                 <a:latin typeface="Open Sans" pitchFamily="2" charset="0"/>
                 <a:ea typeface="Open Sans" pitchFamily="2" charset="0"/>
                 <a:cs typeface="Open Sans" pitchFamily="2" charset="0"/>
-              </a:rPr>
-              <a:t>Nominal (major)</a:t>
-            </a:r>
-          </a:p>
-          <a:p>
-            <a:pPr marL="342900" indent="-342900">
-              <a:buFont typeface="Arial" panose="020B0604020202020204" pitchFamily="34" charset="0"/>
-              <a:buChar char="•"/>
-            </a:pPr>
+                <a:hlinkClick r:id="rId2" action="ppaction://hlinksldjump"/>
+              </a:rPr>
+              <a:t>Ordinal (major)</a:t>
+            </a:r>
+            <a:endParaRPr lang="en-US" sz="2400" dirty="0">
+              <a:latin typeface="Open Sans" pitchFamily="2" charset="0"/>
+              <a:ea typeface="Open Sans" pitchFamily="2" charset="0"/>
+              <a:cs typeface="Open Sans" pitchFamily="2" charset="0"/>
+              <a:hlinkClick r:id="rId3" action="ppaction://hlinksldjump"/>
+            </a:endParaRPr>
+          </a:p>
+          <a:p>
+            <a:pPr marL="342900" indent="-342900"/>
             <a:r>
               <a:rPr lang="en-US" sz="2400" dirty="0">
                 <a:latin typeface="Open Sans" pitchFamily="2" charset="0"/>
                 <a:ea typeface="Open Sans" pitchFamily="2" charset="0"/>
                 <a:cs typeface="Open Sans" pitchFamily="2" charset="0"/>
-              </a:rPr>
-              <a:t>Ordinal (major)</a:t>
-            </a:r>
-          </a:p>
-          <a:p>
-            <a:pPr marL="342900" indent="-342900">
-              <a:buFont typeface="Arial" panose="020B0604020202020204" pitchFamily="34" charset="0"/>
-              <a:buChar char="•"/>
-            </a:pPr>
+                <a:hlinkClick r:id="rId3" action="ppaction://hlinksldjump"/>
+              </a:rPr>
+              <a:t>Nominal (major)</a:t>
+            </a:r>
+            <a:endParaRPr lang="en-US" sz="2400" dirty="0">
+              <a:latin typeface="Open Sans" pitchFamily="2" charset="0"/>
+              <a:ea typeface="Open Sans" pitchFamily="2" charset="0"/>
+              <a:cs typeface="Open Sans" pitchFamily="2" charset="0"/>
+            </a:endParaRPr>
+          </a:p>
+          <a:p>
+            <a:pPr marL="342900" indent="-342900"/>
             <a:r>
               <a:rPr lang="en-US" sz="2400" dirty="0">
                 <a:latin typeface="Open Sans" pitchFamily="2" charset="0"/>
                 <a:ea typeface="Open Sans" pitchFamily="2" charset="0"/>
                 <a:cs typeface="Open Sans" pitchFamily="2" charset="0"/>
+                <a:hlinkClick r:id="rId4" action="ppaction://hlinksldjump"/>
               </a:rPr>
               <a:t>Binary</a:t>
             </a:r>
-          </a:p>
-          <a:p>
-            <a:pPr marL="342900" indent="-342900">
-              <a:buFont typeface="Arial" panose="020B0604020202020204" pitchFamily="34" charset="0"/>
-              <a:buChar char="•"/>
-            </a:pPr>
+            <a:endParaRPr lang="en-US" sz="2400" dirty="0">
+              <a:latin typeface="Open Sans" pitchFamily="2" charset="0"/>
+              <a:ea typeface="Open Sans" pitchFamily="2" charset="0"/>
+              <a:cs typeface="Open Sans" pitchFamily="2" charset="0"/>
+            </a:endParaRPr>
+          </a:p>
+          <a:p>
+            <a:pPr marL="342900" indent="-342900"/>
             <a:r>
               <a:rPr lang="en-US" sz="2400" dirty="0">
                 <a:latin typeface="Open Sans" pitchFamily="2" charset="0"/>
                 <a:ea typeface="Open Sans" pitchFamily="2" charset="0"/>
                 <a:cs typeface="Open Sans" pitchFamily="2" charset="0"/>
+                <a:hlinkClick r:id="rId5" action="ppaction://hlinksldjump"/>
               </a:rPr>
               <a:t>High-Cardinality</a:t>
             </a:r>
-          </a:p>
-          <a:p>
-            <a:pPr marL="342900" indent="-342900">
-              <a:buFont typeface="Arial" panose="020B0604020202020204" pitchFamily="34" charset="0"/>
-              <a:buChar char="•"/>
-            </a:pPr>
+            <a:endParaRPr lang="en-US" sz="2400" dirty="0">
+              <a:latin typeface="Open Sans" pitchFamily="2" charset="0"/>
+              <a:ea typeface="Open Sans" pitchFamily="2" charset="0"/>
+              <a:cs typeface="Open Sans" pitchFamily="2" charset="0"/>
+            </a:endParaRPr>
+          </a:p>
+          <a:p>
+            <a:pPr marL="342900" indent="-342900"/>
             <a:r>
               <a:rPr lang="en-US" sz="2400" dirty="0">
                 <a:latin typeface="Open Sans" pitchFamily="2" charset="0"/>
                 <a:ea typeface="Open Sans" pitchFamily="2" charset="0"/>
                 <a:cs typeface="Open Sans" pitchFamily="2" charset="0"/>
+                <a:hlinkClick r:id="rId6" action="ppaction://hlinksldjump"/>
               </a:rPr>
               <a:t>Mixed</a:t>
             </a:r>
+            <a:endParaRPr lang="en-US" sz="2400" dirty="0">
+              <a:latin typeface="Open Sans" pitchFamily="2" charset="0"/>
+              <a:ea typeface="Open Sans" pitchFamily="2" charset="0"/>
+              <a:cs typeface="Open Sans" pitchFamily="2" charset="0"/>
+            </a:endParaRPr>
           </a:p>
         </p:txBody>
       </p:sp>
     </p:spTree>
     <p:extLst>
       <p:ext uri="{BB962C8B-B14F-4D97-AF65-F5344CB8AC3E}">
-        <p14:creationId xmlns:p14="http://schemas.microsoft.com/office/powerpoint/2010/main" val="14366142"/>
-      </p:ext>
-    </p:extLst>
-  </p:cSld>
-  <p:clrMapOvr>
-    <a:masterClrMapping/>
-  </p:clrMapOvr>
-</p:sld>
-</file>
-
-<file path=ppt/slides/slide20.xml><?xml version="1.0" encoding="utf-8"?>
-<p:sld xmlns:a="http://schemas.openxmlformats.org/drawingml/2006/main" xmlns:r="http://schemas.openxmlformats.org/officeDocument/2006/relationships" xmlns:p="http://schemas.openxmlformats.org/presentationml/2006/main">
-  <p:cSld>
-    <p:spTree>
-      <p:nvGrpSpPr>
-        <p:cNvPr id="1" name="">
-          <a:extLst>
-            <a:ext uri="{FF2B5EF4-FFF2-40B4-BE49-F238E27FC236}">
-              <a16:creationId xmlns:a16="http://schemas.microsoft.com/office/drawing/2014/main" id="{16BFAE27-3E29-A46E-4704-F34B5726EF32}"/>
-            </a:ext>
-          </a:extLst>
-        </p:cNvPr>
-        <p:cNvGrpSpPr/>
-        <p:nvPr/>
-      </p:nvGrpSpPr>
-      <p:grpSpPr>
-        <a:xfrm>
-          <a:off x="0" y="0"/>
-          <a:ext cx="0" cy="0"/>
-          <a:chOff x="0" y="0"/>
-          <a:chExt cx="0" cy="0"/>
-        </a:xfrm>
-      </p:grpSpPr>
-      <p:sp>
-        <p:nvSpPr>
-          <p:cNvPr id="5" name="TextBox 4">
-            <a:extLst>
-              <a:ext uri="{FF2B5EF4-FFF2-40B4-BE49-F238E27FC236}">
-                <a16:creationId xmlns:a16="http://schemas.microsoft.com/office/drawing/2014/main" id="{4A1A7FC2-4F6B-494B-3E51-2A636A9A7C6C}"/>
-              </a:ext>
-            </a:extLst>
-          </p:cNvPr>
-          <p:cNvSpPr txBox="1"/>
-          <p:nvPr/>
-        </p:nvSpPr>
-        <p:spPr>
-          <a:xfrm>
-            <a:off x="1597742" y="403123"/>
-            <a:ext cx="8996516" cy="646331"/>
-          </a:xfrm>
-          <a:prstGeom prst="rect">
-            <a:avLst/>
-          </a:prstGeom>
-          <a:noFill/>
-        </p:spPr>
-        <p:txBody>
-          <a:bodyPr wrap="square" rtlCol="0">
-            <a:spAutoFit/>
-          </a:bodyPr>
-          <a:lstStyle/>
-          <a:p>
-            <a:r>
-              <a:rPr lang="en-US" sz="3600" dirty="0">
-                <a:latin typeface="Bebas Neue" panose="020B0606020202050201" pitchFamily="34" charset="0"/>
-              </a:rPr>
-              <a:t>Heading</a:t>
-            </a:r>
-          </a:p>
-        </p:txBody>
-      </p:sp>
-      <p:sp>
-        <p:nvSpPr>
-          <p:cNvPr id="7" name="TextBox 6">
-            <a:extLst>
-              <a:ext uri="{FF2B5EF4-FFF2-40B4-BE49-F238E27FC236}">
-                <a16:creationId xmlns:a16="http://schemas.microsoft.com/office/drawing/2014/main" id="{75F8A38F-18B8-672B-E5CA-30ED17B69E6A}"/>
-              </a:ext>
-            </a:extLst>
-          </p:cNvPr>
-          <p:cNvSpPr txBox="1"/>
-          <p:nvPr/>
-        </p:nvSpPr>
-        <p:spPr>
-          <a:xfrm>
-            <a:off x="1597742" y="1894401"/>
-            <a:ext cx="8996516" cy="461665"/>
-          </a:xfrm>
-          <a:prstGeom prst="rect">
-            <a:avLst/>
-          </a:prstGeom>
-          <a:noFill/>
-        </p:spPr>
-        <p:txBody>
-          <a:bodyPr wrap="square" rtlCol="0">
-            <a:spAutoFit/>
-          </a:bodyPr>
-          <a:lstStyle/>
-          <a:p>
-            <a:r>
-              <a:rPr lang="en-US" sz="2400" dirty="0">
-                <a:latin typeface="Open Sans" pitchFamily="2" charset="0"/>
-                <a:ea typeface="Open Sans" pitchFamily="2" charset="0"/>
-                <a:cs typeface="Open Sans" pitchFamily="2" charset="0"/>
-              </a:rPr>
-              <a:t>Body</a:t>
-            </a:r>
-          </a:p>
-        </p:txBody>
-      </p:sp>
-    </p:spTree>
-    <p:extLst>
-      <p:ext uri="{BB962C8B-B14F-4D97-AF65-F5344CB8AC3E}">
-        <p14:creationId xmlns:p14="http://schemas.microsoft.com/office/powerpoint/2010/main" val="3513080241"/>
-      </p:ext>
-    </p:extLst>
-  </p:cSld>
-  <p:clrMapOvr>
-    <a:masterClrMapping/>
-  </p:clrMapOvr>
-</p:sld>
-</file>
-
-<file path=ppt/slides/slide21.xml><?xml version="1.0" encoding="utf-8"?>
-<p:sld xmlns:a="http://schemas.openxmlformats.org/drawingml/2006/main" xmlns:r="http://schemas.openxmlformats.org/officeDocument/2006/relationships" xmlns:p="http://schemas.openxmlformats.org/presentationml/2006/main">
-  <p:cSld>
-    <p:spTree>
-      <p:nvGrpSpPr>
-        <p:cNvPr id="1" name="">
-          <a:extLst>
-            <a:ext uri="{FF2B5EF4-FFF2-40B4-BE49-F238E27FC236}">
-              <a16:creationId xmlns:a16="http://schemas.microsoft.com/office/drawing/2014/main" id="{07A0B184-D3D8-D776-CB95-2B53CDF78A7E}"/>
-            </a:ext>
-          </a:extLst>
-        </p:cNvPr>
-        <p:cNvGrpSpPr/>
-        <p:nvPr/>
-      </p:nvGrpSpPr>
-      <p:grpSpPr>
-        <a:xfrm>
-          <a:off x="0" y="0"/>
-          <a:ext cx="0" cy="0"/>
-          <a:chOff x="0" y="0"/>
-          <a:chExt cx="0" cy="0"/>
-        </a:xfrm>
-      </p:grpSpPr>
-      <p:sp>
-        <p:nvSpPr>
-          <p:cNvPr id="5" name="TextBox 4">
-            <a:extLst>
-              <a:ext uri="{FF2B5EF4-FFF2-40B4-BE49-F238E27FC236}">
-                <a16:creationId xmlns:a16="http://schemas.microsoft.com/office/drawing/2014/main" id="{2B99A276-EC3B-F1BE-E3BE-2661CA7FDB96}"/>
-              </a:ext>
-            </a:extLst>
-          </p:cNvPr>
-          <p:cNvSpPr txBox="1"/>
-          <p:nvPr/>
-        </p:nvSpPr>
-        <p:spPr>
-          <a:xfrm>
-            <a:off x="1597742" y="403123"/>
-            <a:ext cx="8996516" cy="646331"/>
-          </a:xfrm>
-          <a:prstGeom prst="rect">
-            <a:avLst/>
-          </a:prstGeom>
-          <a:noFill/>
-        </p:spPr>
-        <p:txBody>
-          <a:bodyPr wrap="square" rtlCol="0">
-            <a:spAutoFit/>
-          </a:bodyPr>
-          <a:lstStyle/>
-          <a:p>
-            <a:r>
-              <a:rPr lang="en-US" sz="3600" dirty="0">
-                <a:latin typeface="Bebas Neue" panose="020B0606020202050201" pitchFamily="34" charset="0"/>
-              </a:rPr>
-              <a:t>Heading</a:t>
-            </a:r>
-          </a:p>
-        </p:txBody>
-      </p:sp>
-      <p:sp>
-        <p:nvSpPr>
-          <p:cNvPr id="7" name="TextBox 6">
-            <a:extLst>
-              <a:ext uri="{FF2B5EF4-FFF2-40B4-BE49-F238E27FC236}">
-                <a16:creationId xmlns:a16="http://schemas.microsoft.com/office/drawing/2014/main" id="{72983AB5-B04B-B5A2-530E-E49F531C6564}"/>
-              </a:ext>
-            </a:extLst>
-          </p:cNvPr>
-          <p:cNvSpPr txBox="1"/>
-          <p:nvPr/>
-        </p:nvSpPr>
-        <p:spPr>
-          <a:xfrm>
-            <a:off x="1597742" y="1894401"/>
-            <a:ext cx="8996516" cy="461665"/>
-          </a:xfrm>
-          <a:prstGeom prst="rect">
-            <a:avLst/>
-          </a:prstGeom>
-          <a:noFill/>
-        </p:spPr>
-        <p:txBody>
-          <a:bodyPr wrap="square" rtlCol="0">
-            <a:spAutoFit/>
-          </a:bodyPr>
-          <a:lstStyle/>
-          <a:p>
-            <a:r>
-              <a:rPr lang="en-US" sz="2400" dirty="0">
-                <a:latin typeface="Open Sans" pitchFamily="2" charset="0"/>
-                <a:ea typeface="Open Sans" pitchFamily="2" charset="0"/>
-                <a:cs typeface="Open Sans" pitchFamily="2" charset="0"/>
-              </a:rPr>
-              <a:t>Body</a:t>
-            </a:r>
-          </a:p>
-        </p:txBody>
-      </p:sp>
-    </p:spTree>
-    <p:extLst>
-      <p:ext uri="{BB962C8B-B14F-4D97-AF65-F5344CB8AC3E}">
-        <p14:creationId xmlns:p14="http://schemas.microsoft.com/office/powerpoint/2010/main" val="4174024908"/>
-      </p:ext>
-    </p:extLst>
-  </p:cSld>
-  <p:clrMapOvr>
-    <a:masterClrMapping/>
-  </p:clrMapOvr>
-</p:sld>
-</file>
-
-<file path=ppt/slides/slide22.xml><?xml version="1.0" encoding="utf-8"?>
-<p:sld xmlns:a="http://schemas.openxmlformats.org/drawingml/2006/main" xmlns:r="http://schemas.openxmlformats.org/officeDocument/2006/relationships" xmlns:p="http://schemas.openxmlformats.org/presentationml/2006/main">
-  <p:cSld>
-    <p:spTree>
-      <p:nvGrpSpPr>
-        <p:cNvPr id="1" name="">
-          <a:extLst>
-            <a:ext uri="{FF2B5EF4-FFF2-40B4-BE49-F238E27FC236}">
-              <a16:creationId xmlns:a16="http://schemas.microsoft.com/office/drawing/2014/main" id="{CC371B66-CB7B-2FA4-275D-727D607B3D77}"/>
-            </a:ext>
-          </a:extLst>
-        </p:cNvPr>
-        <p:cNvGrpSpPr/>
-        <p:nvPr/>
-      </p:nvGrpSpPr>
-      <p:grpSpPr>
-        <a:xfrm>
-          <a:off x="0" y="0"/>
-          <a:ext cx="0" cy="0"/>
-          <a:chOff x="0" y="0"/>
-          <a:chExt cx="0" cy="0"/>
-        </a:xfrm>
-      </p:grpSpPr>
-      <p:sp>
-        <p:nvSpPr>
-          <p:cNvPr id="5" name="TextBox 4">
-            <a:extLst>
-              <a:ext uri="{FF2B5EF4-FFF2-40B4-BE49-F238E27FC236}">
-                <a16:creationId xmlns:a16="http://schemas.microsoft.com/office/drawing/2014/main" id="{8C547845-375D-257F-8DB1-750A91ED39C8}"/>
-              </a:ext>
-            </a:extLst>
-          </p:cNvPr>
-          <p:cNvSpPr txBox="1"/>
-          <p:nvPr/>
-        </p:nvSpPr>
-        <p:spPr>
-          <a:xfrm>
-            <a:off x="1597742" y="403123"/>
-            <a:ext cx="8996516" cy="646331"/>
-          </a:xfrm>
-          <a:prstGeom prst="rect">
-            <a:avLst/>
-          </a:prstGeom>
-          <a:noFill/>
-        </p:spPr>
-        <p:txBody>
-          <a:bodyPr wrap="square" rtlCol="0">
-            <a:spAutoFit/>
-          </a:bodyPr>
-          <a:lstStyle/>
-          <a:p>
-            <a:r>
-              <a:rPr lang="en-US" sz="3600" dirty="0">
-                <a:latin typeface="Bebas Neue" panose="020B0606020202050201" pitchFamily="34" charset="0"/>
-              </a:rPr>
-              <a:t>Heading</a:t>
-            </a:r>
-          </a:p>
-        </p:txBody>
-      </p:sp>
-      <p:sp>
-        <p:nvSpPr>
-          <p:cNvPr id="7" name="TextBox 6">
-            <a:extLst>
-              <a:ext uri="{FF2B5EF4-FFF2-40B4-BE49-F238E27FC236}">
-                <a16:creationId xmlns:a16="http://schemas.microsoft.com/office/drawing/2014/main" id="{4FCB4D28-D1CD-D28D-4C34-DBB40CBCC680}"/>
-              </a:ext>
-            </a:extLst>
-          </p:cNvPr>
-          <p:cNvSpPr txBox="1"/>
-          <p:nvPr/>
-        </p:nvSpPr>
-        <p:spPr>
-          <a:xfrm>
-            <a:off x="1597742" y="1894401"/>
-            <a:ext cx="8996516" cy="461665"/>
-          </a:xfrm>
-          <a:prstGeom prst="rect">
-            <a:avLst/>
-          </a:prstGeom>
-          <a:noFill/>
-        </p:spPr>
-        <p:txBody>
-          <a:bodyPr wrap="square" rtlCol="0">
-            <a:spAutoFit/>
-          </a:bodyPr>
-          <a:lstStyle/>
-          <a:p>
-            <a:r>
-              <a:rPr lang="en-US" sz="2400" dirty="0">
-                <a:latin typeface="Open Sans" pitchFamily="2" charset="0"/>
-                <a:ea typeface="Open Sans" pitchFamily="2" charset="0"/>
-                <a:cs typeface="Open Sans" pitchFamily="2" charset="0"/>
-              </a:rPr>
-              <a:t>Body</a:t>
-            </a:r>
-          </a:p>
-        </p:txBody>
-      </p:sp>
-    </p:spTree>
-    <p:extLst>
-      <p:ext uri="{BB962C8B-B14F-4D97-AF65-F5344CB8AC3E}">
-        <p14:creationId xmlns:p14="http://schemas.microsoft.com/office/powerpoint/2010/main" val="4012331797"/>
-      </p:ext>
-    </p:extLst>
-  </p:cSld>
-  <p:clrMapOvr>
-    <a:masterClrMapping/>
-  </p:clrMapOvr>
-</p:sld>
-</file>
-
-<file path=ppt/slides/slide23.xml><?xml version="1.0" encoding="utf-8"?>
-<p:sld xmlns:a="http://schemas.openxmlformats.org/drawingml/2006/main" xmlns:r="http://schemas.openxmlformats.org/officeDocument/2006/relationships" xmlns:p="http://schemas.openxmlformats.org/presentationml/2006/main">
-  <p:cSld>
-    <p:spTree>
-      <p:nvGrpSpPr>
-        <p:cNvPr id="1" name="">
-          <a:extLst>
-            <a:ext uri="{FF2B5EF4-FFF2-40B4-BE49-F238E27FC236}">
-              <a16:creationId xmlns:a16="http://schemas.microsoft.com/office/drawing/2014/main" id="{3BE0F261-95DA-200F-2D0E-DE95D6F61B62}"/>
-            </a:ext>
-          </a:extLst>
-        </p:cNvPr>
-        <p:cNvGrpSpPr/>
-        <p:nvPr/>
-      </p:nvGrpSpPr>
-      <p:grpSpPr>
-        <a:xfrm>
-          <a:off x="0" y="0"/>
-          <a:ext cx="0" cy="0"/>
-          <a:chOff x="0" y="0"/>
-          <a:chExt cx="0" cy="0"/>
-        </a:xfrm>
-      </p:grpSpPr>
-      <p:sp>
-        <p:nvSpPr>
-          <p:cNvPr id="5" name="TextBox 4">
-            <a:extLst>
-              <a:ext uri="{FF2B5EF4-FFF2-40B4-BE49-F238E27FC236}">
-                <a16:creationId xmlns:a16="http://schemas.microsoft.com/office/drawing/2014/main" id="{2AEC1A7F-07D2-13E3-713E-CCECB310A0B9}"/>
-              </a:ext>
-            </a:extLst>
-          </p:cNvPr>
-          <p:cNvSpPr txBox="1"/>
-          <p:nvPr/>
-        </p:nvSpPr>
-        <p:spPr>
-          <a:xfrm>
-            <a:off x="1597742" y="403123"/>
-            <a:ext cx="8996516" cy="646331"/>
-          </a:xfrm>
-          <a:prstGeom prst="rect">
-            <a:avLst/>
-          </a:prstGeom>
-          <a:noFill/>
-        </p:spPr>
-        <p:txBody>
-          <a:bodyPr wrap="square" rtlCol="0">
-            <a:spAutoFit/>
-          </a:bodyPr>
-          <a:lstStyle/>
-          <a:p>
-            <a:r>
-              <a:rPr lang="en-US" sz="3600" dirty="0">
-                <a:latin typeface="Bebas Neue" panose="020B0606020202050201" pitchFamily="34" charset="0"/>
-              </a:rPr>
-              <a:t>Heading</a:t>
-            </a:r>
-          </a:p>
-        </p:txBody>
-      </p:sp>
-      <p:sp>
-        <p:nvSpPr>
-          <p:cNvPr id="7" name="TextBox 6">
-            <a:extLst>
-              <a:ext uri="{FF2B5EF4-FFF2-40B4-BE49-F238E27FC236}">
-                <a16:creationId xmlns:a16="http://schemas.microsoft.com/office/drawing/2014/main" id="{44A3FBAB-4AF7-3C01-4B55-94A28E3863DB}"/>
-              </a:ext>
-            </a:extLst>
-          </p:cNvPr>
-          <p:cNvSpPr txBox="1"/>
-          <p:nvPr/>
-        </p:nvSpPr>
-        <p:spPr>
-          <a:xfrm>
-            <a:off x="1597742" y="1894401"/>
-            <a:ext cx="8996516" cy="461665"/>
-          </a:xfrm>
-          <a:prstGeom prst="rect">
-            <a:avLst/>
-          </a:prstGeom>
-          <a:noFill/>
-        </p:spPr>
-        <p:txBody>
-          <a:bodyPr wrap="square" rtlCol="0">
-            <a:spAutoFit/>
-          </a:bodyPr>
-          <a:lstStyle/>
-          <a:p>
-            <a:r>
-              <a:rPr lang="en-US" sz="2400" dirty="0">
-                <a:latin typeface="Open Sans" pitchFamily="2" charset="0"/>
-                <a:ea typeface="Open Sans" pitchFamily="2" charset="0"/>
-                <a:cs typeface="Open Sans" pitchFamily="2" charset="0"/>
-              </a:rPr>
-              <a:t>Body</a:t>
-            </a:r>
-          </a:p>
-        </p:txBody>
-      </p:sp>
-    </p:spTree>
-    <p:extLst>
-      <p:ext uri="{BB962C8B-B14F-4D97-AF65-F5344CB8AC3E}">
-        <p14:creationId xmlns:p14="http://schemas.microsoft.com/office/powerpoint/2010/main" val="1328829187"/>
-      </p:ext>
-    </p:extLst>
-  </p:cSld>
-  <p:clrMapOvr>
-    <a:masterClrMapping/>
-  </p:clrMapOvr>
-</p:sld>
-</file>
-
-<file path=ppt/slides/slide24.xml><?xml version="1.0" encoding="utf-8"?>
-<p:sld xmlns:a="http://schemas.openxmlformats.org/drawingml/2006/main" xmlns:r="http://schemas.openxmlformats.org/officeDocument/2006/relationships" xmlns:p="http://schemas.openxmlformats.org/presentationml/2006/main">
-  <p:cSld>
-    <p:spTree>
-      <p:nvGrpSpPr>
-        <p:cNvPr id="1" name="">
-          <a:extLst>
-            <a:ext uri="{FF2B5EF4-FFF2-40B4-BE49-F238E27FC236}">
-              <a16:creationId xmlns:a16="http://schemas.microsoft.com/office/drawing/2014/main" id="{5D4EC634-DB7D-6311-86E2-FBA0E67D4FE0}"/>
-            </a:ext>
-          </a:extLst>
-        </p:cNvPr>
-        <p:cNvGrpSpPr/>
-        <p:nvPr/>
-      </p:nvGrpSpPr>
-      <p:grpSpPr>
-        <a:xfrm>
-          <a:off x="0" y="0"/>
-          <a:ext cx="0" cy="0"/>
-          <a:chOff x="0" y="0"/>
-          <a:chExt cx="0" cy="0"/>
-        </a:xfrm>
-      </p:grpSpPr>
-      <p:sp>
-        <p:nvSpPr>
-          <p:cNvPr id="5" name="TextBox 4">
-            <a:extLst>
-              <a:ext uri="{FF2B5EF4-FFF2-40B4-BE49-F238E27FC236}">
-                <a16:creationId xmlns:a16="http://schemas.microsoft.com/office/drawing/2014/main" id="{437069D6-D69D-5C4E-7C5A-FC528259A48B}"/>
-              </a:ext>
-            </a:extLst>
-          </p:cNvPr>
-          <p:cNvSpPr txBox="1"/>
-          <p:nvPr/>
-        </p:nvSpPr>
-        <p:spPr>
-          <a:xfrm>
-            <a:off x="1597742" y="403123"/>
-            <a:ext cx="8996516" cy="646331"/>
-          </a:xfrm>
-          <a:prstGeom prst="rect">
-            <a:avLst/>
-          </a:prstGeom>
-          <a:noFill/>
-        </p:spPr>
-        <p:txBody>
-          <a:bodyPr wrap="square" rtlCol="0">
-            <a:spAutoFit/>
-          </a:bodyPr>
-          <a:lstStyle/>
-          <a:p>
-            <a:r>
-              <a:rPr lang="en-US" sz="3600" dirty="0">
-                <a:latin typeface="Bebas Neue" panose="020B0606020202050201" pitchFamily="34" charset="0"/>
-              </a:rPr>
-              <a:t>Heading</a:t>
-            </a:r>
-          </a:p>
-        </p:txBody>
-      </p:sp>
-      <p:sp>
-        <p:nvSpPr>
-          <p:cNvPr id="7" name="TextBox 6">
-            <a:extLst>
-              <a:ext uri="{FF2B5EF4-FFF2-40B4-BE49-F238E27FC236}">
-                <a16:creationId xmlns:a16="http://schemas.microsoft.com/office/drawing/2014/main" id="{39EBC74D-D2B2-88ED-46B0-A13AC94CC897}"/>
-              </a:ext>
-            </a:extLst>
-          </p:cNvPr>
-          <p:cNvSpPr txBox="1"/>
-          <p:nvPr/>
-        </p:nvSpPr>
-        <p:spPr>
-          <a:xfrm>
-            <a:off x="1597742" y="1894401"/>
-            <a:ext cx="8996516" cy="461665"/>
-          </a:xfrm>
-          <a:prstGeom prst="rect">
-            <a:avLst/>
-          </a:prstGeom>
-          <a:noFill/>
-        </p:spPr>
-        <p:txBody>
-          <a:bodyPr wrap="square" rtlCol="0">
-            <a:spAutoFit/>
-          </a:bodyPr>
-          <a:lstStyle/>
-          <a:p>
-            <a:r>
-              <a:rPr lang="en-US" sz="2400" dirty="0">
-                <a:latin typeface="Open Sans" pitchFamily="2" charset="0"/>
-                <a:ea typeface="Open Sans" pitchFamily="2" charset="0"/>
-                <a:cs typeface="Open Sans" pitchFamily="2" charset="0"/>
-              </a:rPr>
-              <a:t>Body</a:t>
-            </a:r>
-          </a:p>
-        </p:txBody>
-      </p:sp>
-    </p:spTree>
-    <p:extLst>
-      <p:ext uri="{BB962C8B-B14F-4D97-AF65-F5344CB8AC3E}">
-        <p14:creationId xmlns:p14="http://schemas.microsoft.com/office/powerpoint/2010/main" val="1806059776"/>
-      </p:ext>
-    </p:extLst>
-  </p:cSld>
-  <p:clrMapOvr>
-    <a:masterClrMapping/>
-  </p:clrMapOvr>
-</p:sld>
-</file>
-
-<file path=ppt/slides/slide25.xml><?xml version="1.0" encoding="utf-8"?>
-<p:sld xmlns:a="http://schemas.openxmlformats.org/drawingml/2006/main" xmlns:r="http://schemas.openxmlformats.org/officeDocument/2006/relationships" xmlns:p="http://schemas.openxmlformats.org/presentationml/2006/main">
-  <p:cSld>
-    <p:spTree>
-      <p:nvGrpSpPr>
-        <p:cNvPr id="1" name="">
-          <a:extLst>
-            <a:ext uri="{FF2B5EF4-FFF2-40B4-BE49-F238E27FC236}">
-              <a16:creationId xmlns:a16="http://schemas.microsoft.com/office/drawing/2014/main" id="{5EDBC2D8-03C6-9943-3F3F-7777F0ECF905}"/>
-            </a:ext>
-          </a:extLst>
-        </p:cNvPr>
-        <p:cNvGrpSpPr/>
-        <p:nvPr/>
-      </p:nvGrpSpPr>
-      <p:grpSpPr>
-        <a:xfrm>
-          <a:off x="0" y="0"/>
-          <a:ext cx="0" cy="0"/>
-          <a:chOff x="0" y="0"/>
-          <a:chExt cx="0" cy="0"/>
-        </a:xfrm>
-      </p:grpSpPr>
-      <p:sp>
-        <p:nvSpPr>
-          <p:cNvPr id="5" name="TextBox 4">
-            <a:extLst>
-              <a:ext uri="{FF2B5EF4-FFF2-40B4-BE49-F238E27FC236}">
-                <a16:creationId xmlns:a16="http://schemas.microsoft.com/office/drawing/2014/main" id="{FAB6FC5A-3B93-ADA6-0639-636BD81D5F81}"/>
-              </a:ext>
-            </a:extLst>
-          </p:cNvPr>
-          <p:cNvSpPr txBox="1"/>
-          <p:nvPr/>
-        </p:nvSpPr>
-        <p:spPr>
-          <a:xfrm>
-            <a:off x="1597742" y="403123"/>
-            <a:ext cx="8996516" cy="646331"/>
-          </a:xfrm>
-          <a:prstGeom prst="rect">
-            <a:avLst/>
-          </a:prstGeom>
-          <a:noFill/>
-        </p:spPr>
-        <p:txBody>
-          <a:bodyPr wrap="square" rtlCol="0">
-            <a:spAutoFit/>
-          </a:bodyPr>
-          <a:lstStyle/>
-          <a:p>
-            <a:r>
-              <a:rPr lang="en-US" sz="3600" dirty="0">
-                <a:latin typeface="Bebas Neue" panose="020B0606020202050201" pitchFamily="34" charset="0"/>
-              </a:rPr>
-              <a:t>Heading</a:t>
-            </a:r>
-          </a:p>
-        </p:txBody>
-      </p:sp>
-      <p:sp>
-        <p:nvSpPr>
-          <p:cNvPr id="7" name="TextBox 6">
-            <a:extLst>
-              <a:ext uri="{FF2B5EF4-FFF2-40B4-BE49-F238E27FC236}">
-                <a16:creationId xmlns:a16="http://schemas.microsoft.com/office/drawing/2014/main" id="{E2CA4531-874D-B469-B731-5DB977D88C4D}"/>
-              </a:ext>
-            </a:extLst>
-          </p:cNvPr>
-          <p:cNvSpPr txBox="1"/>
-          <p:nvPr/>
-        </p:nvSpPr>
-        <p:spPr>
-          <a:xfrm>
-            <a:off x="1597742" y="1894401"/>
-            <a:ext cx="8996516" cy="461665"/>
-          </a:xfrm>
-          <a:prstGeom prst="rect">
-            <a:avLst/>
-          </a:prstGeom>
-          <a:noFill/>
-        </p:spPr>
-        <p:txBody>
-          <a:bodyPr wrap="square" rtlCol="0">
-            <a:spAutoFit/>
-          </a:bodyPr>
-          <a:lstStyle/>
-          <a:p>
-            <a:r>
-              <a:rPr lang="en-US" sz="2400" dirty="0">
-                <a:latin typeface="Open Sans" pitchFamily="2" charset="0"/>
-                <a:ea typeface="Open Sans" pitchFamily="2" charset="0"/>
-                <a:cs typeface="Open Sans" pitchFamily="2" charset="0"/>
-              </a:rPr>
-              <a:t>Body</a:t>
-            </a:r>
-          </a:p>
-        </p:txBody>
-      </p:sp>
-    </p:spTree>
-    <p:extLst>
-      <p:ext uri="{BB962C8B-B14F-4D97-AF65-F5344CB8AC3E}">
-        <p14:creationId xmlns:p14="http://schemas.microsoft.com/office/powerpoint/2010/main" val="1450471700"/>
+        <p14:creationId xmlns:p14="http://schemas.microsoft.com/office/powerpoint/2010/main" val="1611200230"/>
       </p:ext>
     </p:extLst>
   </p:cSld>
@@ -6051,7 +4484,7 @@
         <p:cNvPr id="1" name="">
           <a:extLst>
             <a:ext uri="{FF2B5EF4-FFF2-40B4-BE49-F238E27FC236}">
-              <a16:creationId xmlns:a16="http://schemas.microsoft.com/office/drawing/2014/main" id="{F631ED5F-32AC-F5CA-A524-4BF28A8ABB9A}"/>
+              <a16:creationId xmlns:a16="http://schemas.microsoft.com/office/drawing/2014/main" id="{07276BB6-603A-6ECB-6A2F-2E3C1BAD114B}"/>
             </a:ext>
           </a:extLst>
         </p:cNvPr>
@@ -6068,29 +4501,29 @@
       </p:grpSpPr>
       <p:sp>
         <p:nvSpPr>
-          <p:cNvPr id="5" name="TextBox 4">
-            <a:extLst>
-              <a:ext uri="{FF2B5EF4-FFF2-40B4-BE49-F238E27FC236}">
-                <a16:creationId xmlns:a16="http://schemas.microsoft.com/office/drawing/2014/main" id="{D18CFC42-D3E8-3637-D8B4-22DF60AF2A81}"/>
-              </a:ext>
-            </a:extLst>
-          </p:cNvPr>
-          <p:cNvSpPr txBox="1"/>
-          <p:nvPr/>
+          <p:cNvPr id="2" name="Title 1">
+            <a:extLst>
+              <a:ext uri="{FF2B5EF4-FFF2-40B4-BE49-F238E27FC236}">
+                <a16:creationId xmlns:a16="http://schemas.microsoft.com/office/drawing/2014/main" id="{B61AD060-F6CE-E76E-0454-C164EF04157C}"/>
+              </a:ext>
+            </a:extLst>
+          </p:cNvPr>
+          <p:cNvSpPr>
+            <a:spLocks noGrp="1"/>
+          </p:cNvSpPr>
+          <p:nvPr>
+            <p:ph type="title"/>
+          </p:nvPr>
         </p:nvSpPr>
         <p:spPr>
           <a:xfrm>
-            <a:off x="1597742" y="403123"/>
-            <a:ext cx="8996516" cy="646331"/>
+            <a:off x="838200" y="365125"/>
+            <a:ext cx="10515600" cy="640080"/>
           </a:xfrm>
-          <a:prstGeom prst="rect">
-            <a:avLst/>
-          </a:prstGeom>
-          <a:noFill/>
         </p:spPr>
         <p:txBody>
-          <a:bodyPr wrap="square" rtlCol="0">
-            <a:spAutoFit/>
+          <a:bodyPr>
+            <a:normAutofit/>
           </a:bodyPr>
           <a:lstStyle/>
           <a:p>
@@ -6099,36 +4532,238 @@
               <a:rPr lang="en-US" sz="3600" dirty="0">
                 <a:latin typeface="Bebas Neue" panose="020B0606020202050201" pitchFamily="34" charset="0"/>
               </a:rPr>
-              <a:t>Nominal Data</a:t>
-            </a:r>
-          </a:p>
-        </p:txBody>
-      </p:sp>
-      <p:sp>
-        <p:nvSpPr>
-          <p:cNvPr id="7" name="TextBox 6">
-            <a:extLst>
-              <a:ext uri="{FF2B5EF4-FFF2-40B4-BE49-F238E27FC236}">
-                <a16:creationId xmlns:a16="http://schemas.microsoft.com/office/drawing/2014/main" id="{7ACA47CB-135B-4AA2-DA9D-9C19F2FE009E}"/>
-              </a:ext>
-            </a:extLst>
-          </p:cNvPr>
-          <p:cNvSpPr txBox="1"/>
-          <p:nvPr/>
+              <a:t>Types of encoding method</a:t>
+            </a:r>
+          </a:p>
+        </p:txBody>
+      </p:sp>
+      <p:sp>
+        <p:nvSpPr>
+          <p:cNvPr id="3" name="Content Placeholder 2">
+            <a:extLst>
+              <a:ext uri="{FF2B5EF4-FFF2-40B4-BE49-F238E27FC236}">
+                <a16:creationId xmlns:a16="http://schemas.microsoft.com/office/drawing/2014/main" id="{FF71BDAE-9A0A-7EE4-2CB8-C26ACD2D63C9}"/>
+              </a:ext>
+            </a:extLst>
+          </p:cNvPr>
+          <p:cNvSpPr>
+            <a:spLocks noGrp="1"/>
+          </p:cNvSpPr>
+          <p:nvPr>
+            <p:ph idx="1"/>
+          </p:nvPr>
         </p:nvSpPr>
         <p:spPr>
           <a:xfrm>
-            <a:off x="1597742" y="1049454"/>
-            <a:ext cx="8996516" cy="1569660"/>
+            <a:off x="838200" y="1091381"/>
+            <a:ext cx="10515600" cy="5085582"/>
           </a:xfrm>
-          <a:prstGeom prst="rect">
-            <a:avLst/>
-          </a:prstGeom>
-          <a:noFill/>
         </p:spPr>
         <p:txBody>
-          <a:bodyPr wrap="square" rtlCol="0">
-            <a:spAutoFit/>
+          <a:bodyPr>
+            <a:normAutofit/>
+          </a:bodyPr>
+          <a:lstStyle/>
+          <a:p>
+            <a:pPr lvl="1"/>
+            <a:r>
+              <a:rPr lang="en-US" dirty="0">
+                <a:latin typeface="Open Sans" pitchFamily="2" charset="0"/>
+                <a:ea typeface="Open Sans" pitchFamily="2" charset="0"/>
+                <a:cs typeface="Open Sans" pitchFamily="2" charset="0"/>
+              </a:rPr>
+              <a:t>Label Encoding</a:t>
+            </a:r>
+          </a:p>
+          <a:p>
+            <a:pPr lvl="1"/>
+            <a:r>
+              <a:rPr lang="en-US" dirty="0">
+                <a:latin typeface="Open Sans" pitchFamily="2" charset="0"/>
+                <a:ea typeface="Open Sans" pitchFamily="2" charset="0"/>
+                <a:cs typeface="Open Sans" pitchFamily="2" charset="0"/>
+              </a:rPr>
+              <a:t>Ordinal Encoding</a:t>
+            </a:r>
+          </a:p>
+          <a:p>
+            <a:pPr lvl="1"/>
+            <a:r>
+              <a:rPr lang="en-US" dirty="0">
+                <a:latin typeface="Open Sans" pitchFamily="2" charset="0"/>
+                <a:ea typeface="Open Sans" pitchFamily="2" charset="0"/>
+                <a:cs typeface="Open Sans" pitchFamily="2" charset="0"/>
+              </a:rPr>
+              <a:t>Custom Mapping (manual ranking)</a:t>
+            </a:r>
+          </a:p>
+          <a:p>
+            <a:pPr lvl="1"/>
+            <a:r>
+              <a:rPr lang="en-US" dirty="0">
+                <a:latin typeface="Open Sans" pitchFamily="2" charset="0"/>
+                <a:ea typeface="Open Sans" pitchFamily="2" charset="0"/>
+                <a:cs typeface="Open Sans" pitchFamily="2" charset="0"/>
+              </a:rPr>
+              <a:t>Target Encoding (sometimes)</a:t>
+            </a:r>
+          </a:p>
+          <a:p>
+            <a:pPr lvl="1"/>
+            <a:r>
+              <a:rPr lang="en-US" dirty="0">
+                <a:latin typeface="Open Sans" pitchFamily="2" charset="0"/>
+                <a:ea typeface="Open Sans" pitchFamily="2" charset="0"/>
+                <a:cs typeface="Open Sans" pitchFamily="2" charset="0"/>
+              </a:rPr>
+              <a:t>One-Hot Encoding</a:t>
+            </a:r>
+          </a:p>
+          <a:p>
+            <a:pPr lvl="1"/>
+            <a:r>
+              <a:rPr lang="en-US" dirty="0">
+                <a:latin typeface="Open Sans" pitchFamily="2" charset="0"/>
+                <a:ea typeface="Open Sans" pitchFamily="2" charset="0"/>
+                <a:cs typeface="Open Sans" pitchFamily="2" charset="0"/>
+              </a:rPr>
+              <a:t>Dummy Variable Encoding</a:t>
+            </a:r>
+          </a:p>
+          <a:p>
+            <a:pPr lvl="1"/>
+            <a:r>
+              <a:rPr lang="en-US" dirty="0">
+                <a:latin typeface="Open Sans" pitchFamily="2" charset="0"/>
+                <a:ea typeface="Open Sans" pitchFamily="2" charset="0"/>
+                <a:cs typeface="Open Sans" pitchFamily="2" charset="0"/>
+              </a:rPr>
+              <a:t>Binary Encoding</a:t>
+            </a:r>
+          </a:p>
+          <a:p>
+            <a:pPr lvl="1"/>
+            <a:r>
+              <a:rPr lang="en-US" dirty="0">
+                <a:latin typeface="Open Sans" pitchFamily="2" charset="0"/>
+                <a:ea typeface="Open Sans" pitchFamily="2" charset="0"/>
+                <a:cs typeface="Open Sans" pitchFamily="2" charset="0"/>
+              </a:rPr>
+              <a:t>Hash Encoding</a:t>
+            </a:r>
+          </a:p>
+          <a:p>
+            <a:pPr lvl="1"/>
+            <a:r>
+              <a:rPr lang="en-US" dirty="0">
+                <a:latin typeface="Open Sans" pitchFamily="2" charset="0"/>
+                <a:ea typeface="Open Sans" pitchFamily="2" charset="0"/>
+                <a:cs typeface="Open Sans" pitchFamily="2" charset="0"/>
+              </a:rPr>
+              <a:t>Frequency Encoding</a:t>
+            </a:r>
+          </a:p>
+        </p:txBody>
+      </p:sp>
+    </p:spTree>
+    <p:extLst>
+      <p:ext uri="{BB962C8B-B14F-4D97-AF65-F5344CB8AC3E}">
+        <p14:creationId xmlns:p14="http://schemas.microsoft.com/office/powerpoint/2010/main" val="1846263270"/>
+      </p:ext>
+    </p:extLst>
+  </p:cSld>
+  <p:clrMapOvr>
+    <a:masterClrMapping/>
+  </p:clrMapOvr>
+</p:sld>
+</file>
+
+<file path=ppt/slides/slide4.xml><?xml version="1.0" encoding="utf-8"?>
+<p:sld xmlns:a="http://schemas.openxmlformats.org/drawingml/2006/main" xmlns:r="http://schemas.openxmlformats.org/officeDocument/2006/relationships" xmlns:p="http://schemas.openxmlformats.org/presentationml/2006/main">
+  <p:cSld>
+    <p:spTree>
+      <p:nvGrpSpPr>
+        <p:cNvPr id="1" name="">
+          <a:extLst>
+            <a:ext uri="{FF2B5EF4-FFF2-40B4-BE49-F238E27FC236}">
+              <a16:creationId xmlns:a16="http://schemas.microsoft.com/office/drawing/2014/main" id="{95CED7BE-E3FE-F12D-BD68-BFF6526ED4A5}"/>
+            </a:ext>
+          </a:extLst>
+        </p:cNvPr>
+        <p:cNvGrpSpPr/>
+        <p:nvPr/>
+      </p:nvGrpSpPr>
+      <p:grpSpPr>
+        <a:xfrm>
+          <a:off x="0" y="0"/>
+          <a:ext cx="0" cy="0"/>
+          <a:chOff x="0" y="0"/>
+          <a:chExt cx="0" cy="0"/>
+        </a:xfrm>
+      </p:grpSpPr>
+      <p:sp>
+        <p:nvSpPr>
+          <p:cNvPr id="2" name="Title 1">
+            <a:extLst>
+              <a:ext uri="{FF2B5EF4-FFF2-40B4-BE49-F238E27FC236}">
+                <a16:creationId xmlns:a16="http://schemas.microsoft.com/office/drawing/2014/main" id="{7800FC91-6956-0A56-BDAB-EA9A5C768CDA}"/>
+              </a:ext>
+            </a:extLst>
+          </p:cNvPr>
+          <p:cNvSpPr>
+            <a:spLocks noGrp="1"/>
+          </p:cNvSpPr>
+          <p:nvPr>
+            <p:ph type="title"/>
+          </p:nvPr>
+        </p:nvSpPr>
+        <p:spPr>
+          <a:xfrm>
+            <a:off x="838200" y="365125"/>
+            <a:ext cx="10515600" cy="640080"/>
+          </a:xfrm>
+        </p:spPr>
+        <p:txBody>
+          <a:bodyPr>
+            <a:normAutofit/>
+          </a:bodyPr>
+          <a:lstStyle/>
+          <a:p>
+            <a:pPr algn="ctr"/>
+            <a:r>
+              <a:rPr lang="en-US" sz="3600" dirty="0">
+                <a:latin typeface="Bebas Neue" panose="020B0606020202050201" pitchFamily="34" charset="0"/>
+              </a:rPr>
+              <a:t>Nominal Data</a:t>
+            </a:r>
+          </a:p>
+        </p:txBody>
+      </p:sp>
+      <p:sp>
+        <p:nvSpPr>
+          <p:cNvPr id="3" name="Content Placeholder 2">
+            <a:extLst>
+              <a:ext uri="{FF2B5EF4-FFF2-40B4-BE49-F238E27FC236}">
+                <a16:creationId xmlns:a16="http://schemas.microsoft.com/office/drawing/2014/main" id="{B106E220-42CD-0C25-BC6E-2644540C9D9D}"/>
+              </a:ext>
+            </a:extLst>
+          </p:cNvPr>
+          <p:cNvSpPr>
+            <a:spLocks noGrp="1"/>
+          </p:cNvSpPr>
+          <p:nvPr>
+            <p:ph idx="1"/>
+          </p:nvPr>
+        </p:nvSpPr>
+        <p:spPr>
+          <a:xfrm>
+            <a:off x="838200" y="1091381"/>
+            <a:ext cx="10515600" cy="5085582"/>
+          </a:xfrm>
+        </p:spPr>
+        <p:txBody>
+          <a:bodyPr>
+            <a:normAutofit/>
           </a:bodyPr>
           <a:lstStyle/>
           <a:p>
@@ -6162,7 +4797,7 @@
       </p:sp>
       <p:graphicFrame>
         <p:nvGraphicFramePr>
-          <p:cNvPr id="2" name="Table 1">
+          <p:cNvPr id="4" name="Table 3">
             <a:extLst>
               <a:ext uri="{FF2B5EF4-FFF2-40B4-BE49-F238E27FC236}">
                 <a16:creationId xmlns:a16="http://schemas.microsoft.com/office/drawing/2014/main" id="{BAA08A66-5EA6-98E8-85D9-B284BBC4E457}"/>
@@ -6175,13 +4810,13 @@
           <p:nvPr>
             <p:extLst>
               <p:ext uri="{D42A27DB-BD31-4B8C-83A1-F6EECF244321}">
-                <p14:modId xmlns:p14="http://schemas.microsoft.com/office/powerpoint/2010/main" val="1441340389"/>
+                <p14:modId xmlns:p14="http://schemas.microsoft.com/office/powerpoint/2010/main" val="2439937094"/>
               </p:ext>
             </p:extLst>
           </p:nvPr>
         </p:nvGraphicFramePr>
         <p:xfrm>
-          <a:off x="1666568" y="2619114"/>
+          <a:off x="2032000" y="2767031"/>
           <a:ext cx="8128000" cy="2286000"/>
         </p:xfrm>
         <a:graphic>
@@ -6236,7 +4871,7 @@
                         <a:buNone/>
                       </a:pPr>
                       <a:r>
-                        <a:rPr lang="en-US" sz="2400">
+                        <a:rPr lang="en-US" sz="2400" dirty="0">
                           <a:latin typeface="Open Sans" pitchFamily="2" charset="0"/>
                           <a:ea typeface="Open Sans" pitchFamily="2" charset="0"/>
                           <a:cs typeface="Open Sans" pitchFamily="2" charset="0"/>
@@ -6310,7 +4945,7 @@
                         <a:buNone/>
                       </a:pPr>
                       <a:r>
-                        <a:rPr lang="en-US" sz="2400">
+                        <a:rPr lang="en-US" sz="2400" dirty="0">
                           <a:latin typeface="Open Sans" pitchFamily="2" charset="0"/>
                           <a:ea typeface="Open Sans" pitchFamily="2" charset="0"/>
                           <a:cs typeface="Open Sans" pitchFamily="2" charset="0"/>
@@ -6448,284 +5083,7 @@
     </p:spTree>
     <p:extLst>
       <p:ext uri="{BB962C8B-B14F-4D97-AF65-F5344CB8AC3E}">
-        <p14:creationId xmlns:p14="http://schemas.microsoft.com/office/powerpoint/2010/main" val="1647294021"/>
-      </p:ext>
-    </p:extLst>
-  </p:cSld>
-  <p:clrMapOvr>
-    <a:masterClrMapping/>
-  </p:clrMapOvr>
-</p:sld>
-</file>
-
-<file path=ppt/slides/slide4.xml><?xml version="1.0" encoding="utf-8"?>
-<p:sld xmlns:a="http://schemas.openxmlformats.org/drawingml/2006/main" xmlns:r="http://schemas.openxmlformats.org/officeDocument/2006/relationships" xmlns:p="http://schemas.openxmlformats.org/presentationml/2006/main">
-  <p:cSld>
-    <p:spTree>
-      <p:nvGrpSpPr>
-        <p:cNvPr id="1" name="">
-          <a:extLst>
-            <a:ext uri="{FF2B5EF4-FFF2-40B4-BE49-F238E27FC236}">
-              <a16:creationId xmlns:a16="http://schemas.microsoft.com/office/drawing/2014/main" id="{EA3C3401-5563-7975-7583-FEBC9B9D2D3E}"/>
-            </a:ext>
-          </a:extLst>
-        </p:cNvPr>
-        <p:cNvGrpSpPr/>
-        <p:nvPr/>
-      </p:nvGrpSpPr>
-      <p:grpSpPr>
-        <a:xfrm>
-          <a:off x="0" y="0"/>
-          <a:ext cx="0" cy="0"/>
-          <a:chOff x="0" y="0"/>
-          <a:chExt cx="0" cy="0"/>
-        </a:xfrm>
-      </p:grpSpPr>
-      <p:sp>
-        <p:nvSpPr>
-          <p:cNvPr id="5" name="TextBox 4">
-            <a:extLst>
-              <a:ext uri="{FF2B5EF4-FFF2-40B4-BE49-F238E27FC236}">
-                <a16:creationId xmlns:a16="http://schemas.microsoft.com/office/drawing/2014/main" id="{E26CEA0F-1B48-6505-DEBC-F85FCD217B88}"/>
-              </a:ext>
-            </a:extLst>
-          </p:cNvPr>
-          <p:cNvSpPr txBox="1"/>
-          <p:nvPr/>
-        </p:nvSpPr>
-        <p:spPr>
-          <a:xfrm>
-            <a:off x="1597742" y="403123"/>
-            <a:ext cx="8996516" cy="646331"/>
-          </a:xfrm>
-          <a:prstGeom prst="rect">
-            <a:avLst/>
-          </a:prstGeom>
-          <a:noFill/>
-        </p:spPr>
-        <p:txBody>
-          <a:bodyPr wrap="square" rtlCol="0">
-            <a:spAutoFit/>
-          </a:bodyPr>
-          <a:lstStyle/>
-          <a:p>
-            <a:pPr algn="ctr"/>
-            <a:r>
-              <a:rPr lang="en-US" sz="3600" dirty="0">
-                <a:latin typeface="Bebas Neue" panose="020B0606020202050201" pitchFamily="34" charset="0"/>
-              </a:rPr>
-              <a:t>Nominal Data</a:t>
-            </a:r>
-          </a:p>
-        </p:txBody>
-      </p:sp>
-      <p:sp>
-        <p:nvSpPr>
-          <p:cNvPr id="7" name="TextBox 6">
-            <a:extLst>
-              <a:ext uri="{FF2B5EF4-FFF2-40B4-BE49-F238E27FC236}">
-                <a16:creationId xmlns:a16="http://schemas.microsoft.com/office/drawing/2014/main" id="{597DC695-824B-3360-8B35-C4DA96EF54BB}"/>
-              </a:ext>
-            </a:extLst>
-          </p:cNvPr>
-          <p:cNvSpPr txBox="1"/>
-          <p:nvPr/>
-        </p:nvSpPr>
-        <p:spPr>
-          <a:xfrm>
-            <a:off x="1597742" y="1049454"/>
-            <a:ext cx="8996516" cy="4524315"/>
-          </a:xfrm>
-          <a:prstGeom prst="rect">
-            <a:avLst/>
-          </a:prstGeom>
-          <a:noFill/>
-        </p:spPr>
-        <p:txBody>
-          <a:bodyPr wrap="square" rtlCol="0">
-            <a:spAutoFit/>
-          </a:bodyPr>
-          <a:lstStyle/>
-          <a:p>
-            <a:r>
-              <a:rPr lang="en-US" sz="2400" b="1" dirty="0">
-                <a:latin typeface="Open Sans" pitchFamily="2" charset="0"/>
-                <a:ea typeface="Open Sans" pitchFamily="2" charset="0"/>
-                <a:cs typeface="Open Sans" pitchFamily="2" charset="0"/>
-              </a:rPr>
-              <a:t>Key Points:</a:t>
-            </a:r>
-            <a:endParaRPr lang="en-US" sz="2400" dirty="0">
-              <a:latin typeface="Open Sans" pitchFamily="2" charset="0"/>
-              <a:ea typeface="Open Sans" pitchFamily="2" charset="0"/>
-              <a:cs typeface="Open Sans" pitchFamily="2" charset="0"/>
-            </a:endParaRPr>
-          </a:p>
-          <a:p>
-            <a:pPr marL="800100" lvl="1" indent="-342900">
-              <a:buFont typeface="Arial" panose="020B0604020202020204" pitchFamily="34" charset="0"/>
-              <a:buChar char="•"/>
-            </a:pPr>
-            <a:r>
-              <a:rPr lang="en-US" sz="2400" dirty="0">
-                <a:latin typeface="Open Sans" pitchFamily="2" charset="0"/>
-                <a:ea typeface="Open Sans" pitchFamily="2" charset="0"/>
-                <a:cs typeface="Open Sans" pitchFamily="2" charset="0"/>
-              </a:rPr>
-              <a:t>No “greater than” or “less than” meaning.</a:t>
-            </a:r>
-          </a:p>
-          <a:p>
-            <a:pPr marL="800100" lvl="1" indent="-342900">
-              <a:buFont typeface="Arial" panose="020B0604020202020204" pitchFamily="34" charset="0"/>
-              <a:buChar char="•"/>
-            </a:pPr>
-            <a:r>
-              <a:rPr lang="en-US" sz="2400" dirty="0">
-                <a:latin typeface="Open Sans" pitchFamily="2" charset="0"/>
-                <a:ea typeface="Open Sans" pitchFamily="2" charset="0"/>
-                <a:cs typeface="Open Sans" pitchFamily="2" charset="0"/>
-              </a:rPr>
-              <a:t>You can only check </a:t>
-            </a:r>
-            <a:r>
-              <a:rPr lang="en-US" sz="2400" b="1" dirty="0">
-                <a:latin typeface="Open Sans" pitchFamily="2" charset="0"/>
-                <a:ea typeface="Open Sans" pitchFamily="2" charset="0"/>
-                <a:cs typeface="Open Sans" pitchFamily="2" charset="0"/>
-              </a:rPr>
-              <a:t>equality or difference</a:t>
-            </a:r>
-            <a:r>
-              <a:rPr lang="en-US" sz="2400" dirty="0">
-                <a:latin typeface="Open Sans" pitchFamily="2" charset="0"/>
-                <a:ea typeface="Open Sans" pitchFamily="2" charset="0"/>
-                <a:cs typeface="Open Sans" pitchFamily="2" charset="0"/>
-              </a:rPr>
-              <a:t> (e.g., “Red ≠ Blue”).</a:t>
-            </a:r>
-          </a:p>
-          <a:p>
-            <a:pPr marL="800100" lvl="1" indent="-342900">
-              <a:buFont typeface="Arial" panose="020B0604020202020204" pitchFamily="34" charset="0"/>
-              <a:buChar char="•"/>
-            </a:pPr>
-            <a:r>
-              <a:rPr lang="en-US" sz="2400" b="1" dirty="0">
-                <a:latin typeface="Open Sans" pitchFamily="2" charset="0"/>
-                <a:ea typeface="Open Sans" pitchFamily="2" charset="0"/>
-                <a:cs typeface="Open Sans" pitchFamily="2" charset="0"/>
-              </a:rPr>
-              <a:t>Mean/median</a:t>
-            </a:r>
-            <a:r>
-              <a:rPr lang="en-US" sz="2400" dirty="0">
-                <a:latin typeface="Open Sans" pitchFamily="2" charset="0"/>
-                <a:ea typeface="Open Sans" pitchFamily="2" charset="0"/>
-                <a:cs typeface="Open Sans" pitchFamily="2" charset="0"/>
-              </a:rPr>
-              <a:t> are meaningless here.</a:t>
-            </a:r>
-          </a:p>
-          <a:p>
-            <a:pPr lvl="1"/>
-            <a:endParaRPr lang="en-US" sz="2400" dirty="0">
-              <a:latin typeface="Open Sans" pitchFamily="2" charset="0"/>
-              <a:ea typeface="Open Sans" pitchFamily="2" charset="0"/>
-              <a:cs typeface="Open Sans" pitchFamily="2" charset="0"/>
-            </a:endParaRPr>
-          </a:p>
-          <a:p>
-            <a:r>
-              <a:rPr lang="en-US" sz="2400" b="1" dirty="0">
-                <a:latin typeface="Open Sans" pitchFamily="2" charset="0"/>
-                <a:ea typeface="Open Sans" pitchFamily="2" charset="0"/>
-                <a:cs typeface="Open Sans" pitchFamily="2" charset="0"/>
-              </a:rPr>
-              <a:t>Encoding Methods:</a:t>
-            </a:r>
-            <a:endParaRPr lang="en-US" sz="2400" dirty="0">
-              <a:latin typeface="Open Sans" pitchFamily="2" charset="0"/>
-              <a:ea typeface="Open Sans" pitchFamily="2" charset="0"/>
-              <a:cs typeface="Open Sans" pitchFamily="2" charset="0"/>
-            </a:endParaRPr>
-          </a:p>
-          <a:p>
-            <a:pPr marL="800100" lvl="1" indent="-342900">
-              <a:buFont typeface="Arial" panose="020B0604020202020204" pitchFamily="34" charset="0"/>
-              <a:buChar char="•"/>
-            </a:pPr>
-            <a:r>
-              <a:rPr lang="en-US" sz="2400" dirty="0">
-                <a:latin typeface="Open Sans" pitchFamily="2" charset="0"/>
-                <a:ea typeface="Open Sans" pitchFamily="2" charset="0"/>
-                <a:cs typeface="Open Sans" pitchFamily="2" charset="0"/>
-              </a:rPr>
-              <a:t>One-Hot Encoding</a:t>
-            </a:r>
-          </a:p>
-          <a:p>
-            <a:pPr marL="800100" lvl="1" indent="-342900">
-              <a:buFont typeface="Arial" panose="020B0604020202020204" pitchFamily="34" charset="0"/>
-              <a:buChar char="•"/>
-            </a:pPr>
-            <a:r>
-              <a:rPr lang="en-US" sz="2400" dirty="0">
-                <a:latin typeface="Open Sans" pitchFamily="2" charset="0"/>
-                <a:ea typeface="Open Sans" pitchFamily="2" charset="0"/>
-                <a:cs typeface="Open Sans" pitchFamily="2" charset="0"/>
-              </a:rPr>
-              <a:t>Dummy Variable Encoding</a:t>
-            </a:r>
-          </a:p>
-          <a:p>
-            <a:pPr marL="800100" lvl="1" indent="-342900">
-              <a:buFont typeface="Arial" panose="020B0604020202020204" pitchFamily="34" charset="0"/>
-              <a:buChar char="•"/>
-            </a:pPr>
-            <a:r>
-              <a:rPr lang="en-US" sz="2400" dirty="0">
-                <a:latin typeface="Open Sans" pitchFamily="2" charset="0"/>
-                <a:ea typeface="Open Sans" pitchFamily="2" charset="0"/>
-                <a:cs typeface="Open Sans" pitchFamily="2" charset="0"/>
-              </a:rPr>
-              <a:t>Binary Encoding</a:t>
-            </a:r>
-          </a:p>
-          <a:p>
-            <a:pPr marL="800100" lvl="1" indent="-342900">
-              <a:buFont typeface="Arial" panose="020B0604020202020204" pitchFamily="34" charset="0"/>
-              <a:buChar char="•"/>
-            </a:pPr>
-            <a:r>
-              <a:rPr lang="en-US" sz="2400" dirty="0">
-                <a:latin typeface="Open Sans" pitchFamily="2" charset="0"/>
-                <a:ea typeface="Open Sans" pitchFamily="2" charset="0"/>
-                <a:cs typeface="Open Sans" pitchFamily="2" charset="0"/>
-              </a:rPr>
-              <a:t>Hash Encoding</a:t>
-            </a:r>
-          </a:p>
-          <a:p>
-            <a:pPr marL="800100" lvl="1" indent="-342900">
-              <a:buFont typeface="Arial" panose="020B0604020202020204" pitchFamily="34" charset="0"/>
-              <a:buChar char="•"/>
-            </a:pPr>
-            <a:r>
-              <a:rPr lang="en-US" sz="2400" dirty="0">
-                <a:latin typeface="Open Sans" pitchFamily="2" charset="0"/>
-                <a:ea typeface="Open Sans" pitchFamily="2" charset="0"/>
-                <a:cs typeface="Open Sans" pitchFamily="2" charset="0"/>
-              </a:rPr>
-              <a:t>Frequency Encoding</a:t>
-            </a:r>
-          </a:p>
-        </p:txBody>
-      </p:sp>
-    </p:spTree>
-    <p:extLst>
-      <p:ext uri="{BB962C8B-B14F-4D97-AF65-F5344CB8AC3E}">
-        <p14:creationId xmlns:p14="http://schemas.microsoft.com/office/powerpoint/2010/main" val="1661422026"/>
+        <p14:creationId xmlns:p14="http://schemas.microsoft.com/office/powerpoint/2010/main" val="4180451808"/>
       </p:ext>
     </p:extLst>
   </p:cSld>
@@ -6743,7 +5101,7 @@
         <p:cNvPr id="1" name="">
           <a:extLst>
             <a:ext uri="{FF2B5EF4-FFF2-40B4-BE49-F238E27FC236}">
-              <a16:creationId xmlns:a16="http://schemas.microsoft.com/office/drawing/2014/main" id="{7F09AA21-4B36-0CCF-6BB2-2992AA50408A}"/>
+              <a16:creationId xmlns:a16="http://schemas.microsoft.com/office/drawing/2014/main" id="{EF7E6F21-3633-006A-4209-DBC8D059D843}"/>
             </a:ext>
           </a:extLst>
         </p:cNvPr>
@@ -6760,29 +5118,29 @@
       </p:grpSpPr>
       <p:sp>
         <p:nvSpPr>
-          <p:cNvPr id="5" name="TextBox 4">
-            <a:extLst>
-              <a:ext uri="{FF2B5EF4-FFF2-40B4-BE49-F238E27FC236}">
-                <a16:creationId xmlns:a16="http://schemas.microsoft.com/office/drawing/2014/main" id="{6F05B6F4-B8CC-9A55-08B6-BC1CB5E98D84}"/>
-              </a:ext>
-            </a:extLst>
-          </p:cNvPr>
-          <p:cNvSpPr txBox="1"/>
-          <p:nvPr/>
+          <p:cNvPr id="2" name="Title 1">
+            <a:extLst>
+              <a:ext uri="{FF2B5EF4-FFF2-40B4-BE49-F238E27FC236}">
+                <a16:creationId xmlns:a16="http://schemas.microsoft.com/office/drawing/2014/main" id="{C4729A93-8732-7EF6-7002-3AACA2027B3E}"/>
+              </a:ext>
+            </a:extLst>
+          </p:cNvPr>
+          <p:cNvSpPr>
+            <a:spLocks noGrp="1"/>
+          </p:cNvSpPr>
+          <p:nvPr>
+            <p:ph type="title"/>
+          </p:nvPr>
         </p:nvSpPr>
         <p:spPr>
           <a:xfrm>
-            <a:off x="1597742" y="403123"/>
-            <a:ext cx="8996516" cy="646331"/>
+            <a:off x="838200" y="365125"/>
+            <a:ext cx="10515600" cy="640080"/>
           </a:xfrm>
-          <a:prstGeom prst="rect">
-            <a:avLst/>
-          </a:prstGeom>
-          <a:noFill/>
         </p:spPr>
         <p:txBody>
-          <a:bodyPr wrap="square" rtlCol="0">
-            <a:spAutoFit/>
+          <a:bodyPr>
+            <a:normAutofit/>
           </a:bodyPr>
           <a:lstStyle/>
           <a:p>
@@ -6791,81 +5149,47 @@
               <a:rPr lang="en-US" sz="3600" dirty="0">
                 <a:latin typeface="Bebas Neue" panose="020B0606020202050201" pitchFamily="34" charset="0"/>
               </a:rPr>
-              <a:t>Ordinal Data (Ordered Categories)</a:t>
-            </a:r>
-          </a:p>
-        </p:txBody>
-      </p:sp>
-      <p:sp>
-        <p:nvSpPr>
-          <p:cNvPr id="7" name="TextBox 6">
-            <a:extLst>
-              <a:ext uri="{FF2B5EF4-FFF2-40B4-BE49-F238E27FC236}">
-                <a16:creationId xmlns:a16="http://schemas.microsoft.com/office/drawing/2014/main" id="{BD021271-E391-5D24-5C8B-0BA26E6C4365}"/>
-              </a:ext>
-            </a:extLst>
-          </p:cNvPr>
-          <p:cNvSpPr txBox="1"/>
-          <p:nvPr/>
+              <a:t>Nominal Data</a:t>
+            </a:r>
+          </a:p>
+        </p:txBody>
+      </p:sp>
+      <p:sp>
+        <p:nvSpPr>
+          <p:cNvPr id="3" name="Content Placeholder 2">
+            <a:extLst>
+              <a:ext uri="{FF2B5EF4-FFF2-40B4-BE49-F238E27FC236}">
+                <a16:creationId xmlns:a16="http://schemas.microsoft.com/office/drawing/2014/main" id="{5864C946-DF90-6FC7-72C1-8620B90B0157}"/>
+              </a:ext>
+            </a:extLst>
+          </p:cNvPr>
+          <p:cNvSpPr>
+            <a:spLocks noGrp="1"/>
+          </p:cNvSpPr>
+          <p:nvPr>
+            <p:ph idx="1"/>
+          </p:nvPr>
         </p:nvSpPr>
         <p:spPr>
           <a:xfrm>
-            <a:off x="1597742" y="1049454"/>
-            <a:ext cx="8996516" cy="1569660"/>
+            <a:off x="838200" y="1091381"/>
+            <a:ext cx="10515600" cy="5085582"/>
           </a:xfrm>
-          <a:prstGeom prst="rect">
-            <a:avLst/>
-          </a:prstGeom>
-          <a:noFill/>
         </p:spPr>
         <p:txBody>
-          <a:bodyPr wrap="square" rtlCol="0">
-            <a:spAutoFit/>
+          <a:bodyPr>
+            <a:normAutofit/>
           </a:bodyPr>
           <a:lstStyle/>
           <a:p>
-            <a:r>
-              <a:rPr lang="en-US" sz="2400" dirty="0">
-                <a:latin typeface="Open Sans" pitchFamily="2" charset="0"/>
-                <a:ea typeface="Open Sans" pitchFamily="2" charset="0"/>
-                <a:cs typeface="Open Sans" pitchFamily="2" charset="0"/>
-              </a:rPr>
-              <a:t>Categories that have a </a:t>
-            </a:r>
             <a:r>
               <a:rPr lang="en-US" sz="2400" b="1" dirty="0">
                 <a:latin typeface="Open Sans" pitchFamily="2" charset="0"/>
                 <a:ea typeface="Open Sans" pitchFamily="2" charset="0"/>
                 <a:cs typeface="Open Sans" pitchFamily="2" charset="0"/>
               </a:rPr>
-              <a:t>natural order or ranking</a:t>
-            </a:r>
-            <a:r>
-              <a:rPr lang="en-US" sz="2400" dirty="0">
-                <a:latin typeface="Open Sans" pitchFamily="2" charset="0"/>
-                <a:ea typeface="Open Sans" pitchFamily="2" charset="0"/>
-                <a:cs typeface="Open Sans" pitchFamily="2" charset="0"/>
-              </a:rPr>
-              <a:t>, but </a:t>
-            </a:r>
-            <a:r>
-              <a:rPr lang="en-US" sz="2400" b="1" dirty="0">
-                <a:latin typeface="Open Sans" pitchFamily="2" charset="0"/>
-                <a:ea typeface="Open Sans" pitchFamily="2" charset="0"/>
-                <a:cs typeface="Open Sans" pitchFamily="2" charset="0"/>
-              </a:rPr>
-              <a:t>difference between levels is not numeric</a:t>
-            </a:r>
-            <a:r>
-              <a:rPr lang="en-US" sz="2400" dirty="0">
-                <a:latin typeface="Open Sans" pitchFamily="2" charset="0"/>
-                <a:ea typeface="Open Sans" pitchFamily="2" charset="0"/>
-                <a:cs typeface="Open Sans" pitchFamily="2" charset="0"/>
-              </a:rPr>
-              <a:t>.</a:t>
-            </a:r>
-          </a:p>
-          <a:p>
+              <a:t>Key Points:</a:t>
+            </a:r>
             <a:endParaRPr lang="en-US" sz="2400" dirty="0">
               <a:latin typeface="Open Sans" pitchFamily="2" charset="0"/>
               <a:ea typeface="Open Sans" pitchFamily="2" charset="0"/>
@@ -6873,12 +5197,292 @@
             </a:endParaRPr>
           </a:p>
           <a:p>
+            <a:pPr marL="800100" lvl="1" indent="-342900"/>
+            <a:r>
+              <a:rPr lang="en-US" dirty="0">
+                <a:latin typeface="Open Sans" pitchFamily="2" charset="0"/>
+                <a:ea typeface="Open Sans" pitchFamily="2" charset="0"/>
+                <a:cs typeface="Open Sans" pitchFamily="2" charset="0"/>
+              </a:rPr>
+              <a:t>No “greater than” or “less than” meaning.</a:t>
+            </a:r>
+          </a:p>
+          <a:p>
+            <a:pPr marL="800100" lvl="1" indent="-342900"/>
+            <a:r>
+              <a:rPr lang="en-US" dirty="0">
+                <a:latin typeface="Open Sans" pitchFamily="2" charset="0"/>
+                <a:ea typeface="Open Sans" pitchFamily="2" charset="0"/>
+                <a:cs typeface="Open Sans" pitchFamily="2" charset="0"/>
+              </a:rPr>
+              <a:t>You can only check </a:t>
+            </a:r>
+            <a:r>
+              <a:rPr lang="en-US" b="1" dirty="0">
+                <a:latin typeface="Open Sans" pitchFamily="2" charset="0"/>
+                <a:ea typeface="Open Sans" pitchFamily="2" charset="0"/>
+                <a:cs typeface="Open Sans" pitchFamily="2" charset="0"/>
+              </a:rPr>
+              <a:t>equality or difference</a:t>
+            </a:r>
+            <a:r>
+              <a:rPr lang="en-US" dirty="0">
+                <a:latin typeface="Open Sans" pitchFamily="2" charset="0"/>
+                <a:ea typeface="Open Sans" pitchFamily="2" charset="0"/>
+                <a:cs typeface="Open Sans" pitchFamily="2" charset="0"/>
+              </a:rPr>
+              <a:t> (e.g., “Red ≠ Blue”).</a:t>
+            </a:r>
+          </a:p>
+          <a:p>
+            <a:pPr marL="800100" lvl="1" indent="-342900"/>
+            <a:r>
+              <a:rPr lang="en-US" b="1" dirty="0">
+                <a:latin typeface="Open Sans" pitchFamily="2" charset="0"/>
+                <a:ea typeface="Open Sans" pitchFamily="2" charset="0"/>
+                <a:cs typeface="Open Sans" pitchFamily="2" charset="0"/>
+              </a:rPr>
+              <a:t>Mean/median</a:t>
+            </a:r>
+            <a:r>
+              <a:rPr lang="en-US" dirty="0">
+                <a:latin typeface="Open Sans" pitchFamily="2" charset="0"/>
+                <a:ea typeface="Open Sans" pitchFamily="2" charset="0"/>
+                <a:cs typeface="Open Sans" pitchFamily="2" charset="0"/>
+              </a:rPr>
+              <a:t> are meaningless here.</a:t>
+            </a:r>
+          </a:p>
+          <a:p>
+            <a:pPr lvl="1"/>
+            <a:endParaRPr lang="en-US" dirty="0">
+              <a:latin typeface="Open Sans" pitchFamily="2" charset="0"/>
+              <a:ea typeface="Open Sans" pitchFamily="2" charset="0"/>
+              <a:cs typeface="Open Sans" pitchFamily="2" charset="0"/>
+            </a:endParaRPr>
+          </a:p>
+          <a:p>
             <a:r>
               <a:rPr lang="en-US" sz="2400" b="1" dirty="0">
                 <a:latin typeface="Open Sans" pitchFamily="2" charset="0"/>
                 <a:ea typeface="Open Sans" pitchFamily="2" charset="0"/>
                 <a:cs typeface="Open Sans" pitchFamily="2" charset="0"/>
               </a:rPr>
+              <a:t>Encoding Methods:</a:t>
+            </a:r>
+            <a:endParaRPr lang="en-US" sz="2400" dirty="0">
+              <a:latin typeface="Open Sans" pitchFamily="2" charset="0"/>
+              <a:ea typeface="Open Sans" pitchFamily="2" charset="0"/>
+              <a:cs typeface="Open Sans" pitchFamily="2" charset="0"/>
+            </a:endParaRPr>
+          </a:p>
+          <a:p>
+            <a:pPr marL="800100" lvl="1" indent="-342900"/>
+            <a:r>
+              <a:rPr lang="en-US" dirty="0">
+                <a:latin typeface="Open Sans" pitchFamily="2" charset="0"/>
+                <a:ea typeface="Open Sans" pitchFamily="2" charset="0"/>
+                <a:cs typeface="Open Sans" pitchFamily="2" charset="0"/>
+              </a:rPr>
+              <a:t>One-Hot Encoding</a:t>
+            </a:r>
+          </a:p>
+          <a:p>
+            <a:pPr marL="800100" lvl="1" indent="-342900"/>
+            <a:r>
+              <a:rPr lang="en-US" dirty="0">
+                <a:latin typeface="Open Sans" pitchFamily="2" charset="0"/>
+                <a:ea typeface="Open Sans" pitchFamily="2" charset="0"/>
+                <a:cs typeface="Open Sans" pitchFamily="2" charset="0"/>
+              </a:rPr>
+              <a:t>Dummy Variable Encoding</a:t>
+            </a:r>
+          </a:p>
+          <a:p>
+            <a:pPr marL="800100" lvl="1" indent="-342900"/>
+            <a:r>
+              <a:rPr lang="en-US" dirty="0">
+                <a:latin typeface="Open Sans" pitchFamily="2" charset="0"/>
+                <a:ea typeface="Open Sans" pitchFamily="2" charset="0"/>
+                <a:cs typeface="Open Sans" pitchFamily="2" charset="0"/>
+              </a:rPr>
+              <a:t>Binary Encoding</a:t>
+            </a:r>
+          </a:p>
+          <a:p>
+            <a:pPr marL="800100" lvl="1" indent="-342900"/>
+            <a:r>
+              <a:rPr lang="en-US" dirty="0">
+                <a:latin typeface="Open Sans" pitchFamily="2" charset="0"/>
+                <a:ea typeface="Open Sans" pitchFamily="2" charset="0"/>
+                <a:cs typeface="Open Sans" pitchFamily="2" charset="0"/>
+              </a:rPr>
+              <a:t>Hash Encoding</a:t>
+            </a:r>
+          </a:p>
+          <a:p>
+            <a:pPr marL="800100" lvl="1" indent="-342900"/>
+            <a:r>
+              <a:rPr lang="en-US" dirty="0">
+                <a:latin typeface="Open Sans" pitchFamily="2" charset="0"/>
+                <a:ea typeface="Open Sans" pitchFamily="2" charset="0"/>
+                <a:cs typeface="Open Sans" pitchFamily="2" charset="0"/>
+              </a:rPr>
+              <a:t>Frequency Encoding</a:t>
+            </a:r>
+          </a:p>
+        </p:txBody>
+      </p:sp>
+    </p:spTree>
+    <p:extLst>
+      <p:ext uri="{BB962C8B-B14F-4D97-AF65-F5344CB8AC3E}">
+        <p14:creationId xmlns:p14="http://schemas.microsoft.com/office/powerpoint/2010/main" val="943231768"/>
+      </p:ext>
+    </p:extLst>
+  </p:cSld>
+  <p:clrMapOvr>
+    <a:masterClrMapping/>
+  </p:clrMapOvr>
+</p:sld>
+</file>
+
+<file path=ppt/slides/slide6.xml><?xml version="1.0" encoding="utf-8"?>
+<p:sld xmlns:a="http://schemas.openxmlformats.org/drawingml/2006/main" xmlns:r="http://schemas.openxmlformats.org/officeDocument/2006/relationships" xmlns:p="http://schemas.openxmlformats.org/presentationml/2006/main">
+  <p:cSld>
+    <p:spTree>
+      <p:nvGrpSpPr>
+        <p:cNvPr id="1" name="">
+          <a:extLst>
+            <a:ext uri="{FF2B5EF4-FFF2-40B4-BE49-F238E27FC236}">
+              <a16:creationId xmlns:a16="http://schemas.microsoft.com/office/drawing/2014/main" id="{27F97D7C-FF13-489D-85D5-89FBFD1A3C44}"/>
+            </a:ext>
+          </a:extLst>
+        </p:cNvPr>
+        <p:cNvGrpSpPr/>
+        <p:nvPr/>
+      </p:nvGrpSpPr>
+      <p:grpSpPr>
+        <a:xfrm>
+          <a:off x="0" y="0"/>
+          <a:ext cx="0" cy="0"/>
+          <a:chOff x="0" y="0"/>
+          <a:chExt cx="0" cy="0"/>
+        </a:xfrm>
+      </p:grpSpPr>
+      <p:sp>
+        <p:nvSpPr>
+          <p:cNvPr id="2" name="Title 1">
+            <a:extLst>
+              <a:ext uri="{FF2B5EF4-FFF2-40B4-BE49-F238E27FC236}">
+                <a16:creationId xmlns:a16="http://schemas.microsoft.com/office/drawing/2014/main" id="{917DC35A-443F-0C46-B481-175961DC6451}"/>
+              </a:ext>
+            </a:extLst>
+          </p:cNvPr>
+          <p:cNvSpPr>
+            <a:spLocks noGrp="1"/>
+          </p:cNvSpPr>
+          <p:nvPr>
+            <p:ph type="title"/>
+          </p:nvPr>
+        </p:nvSpPr>
+        <p:spPr>
+          <a:xfrm>
+            <a:off x="838200" y="365125"/>
+            <a:ext cx="10515600" cy="640080"/>
+          </a:xfrm>
+        </p:spPr>
+        <p:txBody>
+          <a:bodyPr>
+            <a:normAutofit/>
+          </a:bodyPr>
+          <a:lstStyle/>
+          <a:p>
+            <a:pPr algn="ctr"/>
+            <a:r>
+              <a:rPr lang="en-US" sz="3600" dirty="0">
+                <a:latin typeface="Bebas Neue" panose="020B0606020202050201" pitchFamily="34" charset="0"/>
+              </a:rPr>
+              <a:t>Ordinal Data (Ordered Categories)</a:t>
+            </a:r>
+          </a:p>
+        </p:txBody>
+      </p:sp>
+      <p:sp>
+        <p:nvSpPr>
+          <p:cNvPr id="3" name="Content Placeholder 2">
+            <a:extLst>
+              <a:ext uri="{FF2B5EF4-FFF2-40B4-BE49-F238E27FC236}">
+                <a16:creationId xmlns:a16="http://schemas.microsoft.com/office/drawing/2014/main" id="{74E3023D-C253-5799-1176-815952CAA09D}"/>
+              </a:ext>
+            </a:extLst>
+          </p:cNvPr>
+          <p:cNvSpPr>
+            <a:spLocks noGrp="1"/>
+          </p:cNvSpPr>
+          <p:nvPr>
+            <p:ph idx="1"/>
+          </p:nvPr>
+        </p:nvSpPr>
+        <p:spPr>
+          <a:xfrm>
+            <a:off x="838200" y="1091381"/>
+            <a:ext cx="10515600" cy="5085582"/>
+          </a:xfrm>
+        </p:spPr>
+        <p:txBody>
+          <a:bodyPr>
+            <a:normAutofit/>
+          </a:bodyPr>
+          <a:lstStyle/>
+          <a:p>
+            <a:r>
+              <a:rPr lang="en-US" sz="2400" dirty="0">
+                <a:latin typeface="Open Sans" pitchFamily="2" charset="0"/>
+                <a:ea typeface="Open Sans" pitchFamily="2" charset="0"/>
+                <a:cs typeface="Open Sans" pitchFamily="2" charset="0"/>
+              </a:rPr>
+              <a:t>Categories that have a </a:t>
+            </a:r>
+            <a:r>
+              <a:rPr lang="en-US" sz="2400" b="1" dirty="0">
+                <a:latin typeface="Open Sans" pitchFamily="2" charset="0"/>
+                <a:ea typeface="Open Sans" pitchFamily="2" charset="0"/>
+                <a:cs typeface="Open Sans" pitchFamily="2" charset="0"/>
+              </a:rPr>
+              <a:t>natural order or ranking</a:t>
+            </a:r>
+            <a:r>
+              <a:rPr lang="en-US" sz="2400" dirty="0">
+                <a:latin typeface="Open Sans" pitchFamily="2" charset="0"/>
+                <a:ea typeface="Open Sans" pitchFamily="2" charset="0"/>
+                <a:cs typeface="Open Sans" pitchFamily="2" charset="0"/>
+              </a:rPr>
+              <a:t>, but </a:t>
+            </a:r>
+            <a:r>
+              <a:rPr lang="en-US" sz="2400" b="1" dirty="0">
+                <a:latin typeface="Open Sans" pitchFamily="2" charset="0"/>
+                <a:ea typeface="Open Sans" pitchFamily="2" charset="0"/>
+                <a:cs typeface="Open Sans" pitchFamily="2" charset="0"/>
+              </a:rPr>
+              <a:t>difference between levels is not numeric</a:t>
+            </a:r>
+            <a:r>
+              <a:rPr lang="en-US" sz="2400" dirty="0">
+                <a:latin typeface="Open Sans" pitchFamily="2" charset="0"/>
+                <a:ea typeface="Open Sans" pitchFamily="2" charset="0"/>
+                <a:cs typeface="Open Sans" pitchFamily="2" charset="0"/>
+              </a:rPr>
+              <a:t>.</a:t>
+            </a:r>
+          </a:p>
+          <a:p>
+            <a:r>
+              <a:rPr lang="en-US" sz="2400" b="1" dirty="0">
+                <a:latin typeface="Open Sans" pitchFamily="2" charset="0"/>
+                <a:ea typeface="Open Sans" pitchFamily="2" charset="0"/>
+                <a:cs typeface="Open Sans" pitchFamily="2" charset="0"/>
+              </a:rPr>
               <a:t>Examples:</a:t>
             </a:r>
           </a:p>
@@ -6886,7 +5490,7 @@
       </p:sp>
       <p:graphicFrame>
         <p:nvGraphicFramePr>
-          <p:cNvPr id="2" name="Table 1">
+          <p:cNvPr id="4" name="Table 3">
             <a:extLst>
               <a:ext uri="{FF2B5EF4-FFF2-40B4-BE49-F238E27FC236}">
                 <a16:creationId xmlns:a16="http://schemas.microsoft.com/office/drawing/2014/main" id="{D64FED75-9B53-BCA8-C562-CE39FFF0939B}"/>
@@ -6899,13 +5503,13 @@
           <p:nvPr>
             <p:extLst>
               <p:ext uri="{D42A27DB-BD31-4B8C-83A1-F6EECF244321}">
-                <p14:modId xmlns:p14="http://schemas.microsoft.com/office/powerpoint/2010/main" val="1754794534"/>
+                <p14:modId xmlns:p14="http://schemas.microsoft.com/office/powerpoint/2010/main" val="1510611381"/>
               </p:ext>
             </p:extLst>
           </p:nvPr>
         </p:nvGraphicFramePr>
         <p:xfrm>
-          <a:off x="1666567" y="2619114"/>
+          <a:off x="1300477" y="2331720"/>
           <a:ext cx="9591046" cy="2194560"/>
         </p:xfrm>
         <a:graphic>
@@ -6940,18 +5544,13 @@
                         <a:buNone/>
                       </a:pPr>
                       <a:r>
-                        <a:rPr lang="en-US" sz="2400">
+                        <a:rPr lang="en-US" sz="2400" dirty="0">
                           <a:latin typeface="Open Sans" pitchFamily="2" charset="0"/>
                           <a:ea typeface="Open Sans" pitchFamily="2" charset="0"/>
                           <a:cs typeface="Open Sans" pitchFamily="2" charset="0"/>
                         </a:rPr>
                         <a:t>Feature</a:t>
                       </a:r>
-                      <a:endParaRPr lang="en-US" sz="2400" dirty="0">
-                        <a:latin typeface="Open Sans" pitchFamily="2" charset="0"/>
-                        <a:ea typeface="Open Sans" pitchFamily="2" charset="0"/>
-                        <a:cs typeface="Open Sans" pitchFamily="2" charset="0"/>
-                      </a:endParaRPr>
                     </a:p>
                   </a:txBody>
                   <a:tcPr anchor="ctr"/>
@@ -7039,7 +5638,7 @@
                         <a:buNone/>
                       </a:pPr>
                       <a:r>
-                        <a:rPr lang="en-US" sz="2400">
+                        <a:rPr lang="en-US" sz="2400" dirty="0">
                           <a:latin typeface="Open Sans" pitchFamily="2" charset="0"/>
                           <a:ea typeface="Open Sans" pitchFamily="2" charset="0"/>
                           <a:cs typeface="Open Sans" pitchFamily="2" charset="0"/>
@@ -7130,262 +5729,7 @@
     </p:spTree>
     <p:extLst>
       <p:ext uri="{BB962C8B-B14F-4D97-AF65-F5344CB8AC3E}">
-        <p14:creationId xmlns:p14="http://schemas.microsoft.com/office/powerpoint/2010/main" val="1638716135"/>
-      </p:ext>
-    </p:extLst>
-  </p:cSld>
-  <p:clrMapOvr>
-    <a:masterClrMapping/>
-  </p:clrMapOvr>
-</p:sld>
-</file>
-
-<file path=ppt/slides/slide6.xml><?xml version="1.0" encoding="utf-8"?>
-<p:sld xmlns:a="http://schemas.openxmlformats.org/drawingml/2006/main" xmlns:r="http://schemas.openxmlformats.org/officeDocument/2006/relationships" xmlns:p="http://schemas.openxmlformats.org/presentationml/2006/main">
-  <p:cSld>
-    <p:spTree>
-      <p:nvGrpSpPr>
-        <p:cNvPr id="1" name="">
-          <a:extLst>
-            <a:ext uri="{FF2B5EF4-FFF2-40B4-BE49-F238E27FC236}">
-              <a16:creationId xmlns:a16="http://schemas.microsoft.com/office/drawing/2014/main" id="{9BAE21F7-CB42-4F91-CE17-FFEAF45AAC3A}"/>
-            </a:ext>
-          </a:extLst>
-        </p:cNvPr>
-        <p:cNvGrpSpPr/>
-        <p:nvPr/>
-      </p:nvGrpSpPr>
-      <p:grpSpPr>
-        <a:xfrm>
-          <a:off x="0" y="0"/>
-          <a:ext cx="0" cy="0"/>
-          <a:chOff x="0" y="0"/>
-          <a:chExt cx="0" cy="0"/>
-        </a:xfrm>
-      </p:grpSpPr>
-      <p:sp>
-        <p:nvSpPr>
-          <p:cNvPr id="5" name="TextBox 4">
-            <a:extLst>
-              <a:ext uri="{FF2B5EF4-FFF2-40B4-BE49-F238E27FC236}">
-                <a16:creationId xmlns:a16="http://schemas.microsoft.com/office/drawing/2014/main" id="{9EA6CB0D-D3FB-1590-E320-7F3677616D32}"/>
-              </a:ext>
-            </a:extLst>
-          </p:cNvPr>
-          <p:cNvSpPr txBox="1"/>
-          <p:nvPr/>
-        </p:nvSpPr>
-        <p:spPr>
-          <a:xfrm>
-            <a:off x="1597742" y="403123"/>
-            <a:ext cx="8996516" cy="646331"/>
-          </a:xfrm>
-          <a:prstGeom prst="rect">
-            <a:avLst/>
-          </a:prstGeom>
-          <a:noFill/>
-        </p:spPr>
-        <p:txBody>
-          <a:bodyPr wrap="square" rtlCol="0">
-            <a:spAutoFit/>
-          </a:bodyPr>
-          <a:lstStyle/>
-          <a:p>
-            <a:pPr algn="ctr"/>
-            <a:r>
-              <a:rPr lang="en-US" sz="3600" dirty="0">
-                <a:latin typeface="Bebas Neue" panose="020B0606020202050201" pitchFamily="34" charset="0"/>
-              </a:rPr>
-              <a:t>Ordinal Data (Ordered Categories)</a:t>
-            </a:r>
-          </a:p>
-        </p:txBody>
-      </p:sp>
-      <p:sp>
-        <p:nvSpPr>
-          <p:cNvPr id="7" name="TextBox 6">
-            <a:extLst>
-              <a:ext uri="{FF2B5EF4-FFF2-40B4-BE49-F238E27FC236}">
-                <a16:creationId xmlns:a16="http://schemas.microsoft.com/office/drawing/2014/main" id="{3921E225-3E6C-5B58-C2DE-906849AD27A5}"/>
-              </a:ext>
-            </a:extLst>
-          </p:cNvPr>
-          <p:cNvSpPr txBox="1"/>
-          <p:nvPr/>
-        </p:nvSpPr>
-        <p:spPr>
-          <a:xfrm>
-            <a:off x="1597742" y="1049454"/>
-            <a:ext cx="8996516" cy="3785652"/>
-          </a:xfrm>
-          <a:prstGeom prst="rect">
-            <a:avLst/>
-          </a:prstGeom>
-          <a:noFill/>
-        </p:spPr>
-        <p:txBody>
-          <a:bodyPr wrap="square" rtlCol="0">
-            <a:spAutoFit/>
-          </a:bodyPr>
-          <a:lstStyle/>
-          <a:p>
-            <a:r>
-              <a:rPr lang="en-US" sz="2400" b="1" dirty="0">
-                <a:latin typeface="Open Sans" pitchFamily="2" charset="0"/>
-                <a:ea typeface="Open Sans" pitchFamily="2" charset="0"/>
-                <a:cs typeface="Open Sans" pitchFamily="2" charset="0"/>
-              </a:rPr>
-              <a:t>Key Points:</a:t>
-            </a:r>
-            <a:endParaRPr lang="en-US" sz="2400" dirty="0">
-              <a:latin typeface="Open Sans" pitchFamily="2" charset="0"/>
-              <a:ea typeface="Open Sans" pitchFamily="2" charset="0"/>
-              <a:cs typeface="Open Sans" pitchFamily="2" charset="0"/>
-            </a:endParaRPr>
-          </a:p>
-          <a:p>
-            <a:pPr marL="800100" lvl="1" indent="-342900">
-              <a:buFont typeface="Arial" panose="020B0604020202020204" pitchFamily="34" charset="0"/>
-              <a:buChar char="•"/>
-            </a:pPr>
-            <a:r>
-              <a:rPr lang="en-US" sz="2400" dirty="0">
-                <a:latin typeface="Open Sans" pitchFamily="2" charset="0"/>
-                <a:ea typeface="Open Sans" pitchFamily="2" charset="0"/>
-                <a:cs typeface="Open Sans" pitchFamily="2" charset="0"/>
-              </a:rPr>
-              <a:t>Order matters.</a:t>
-            </a:r>
-          </a:p>
-          <a:p>
-            <a:pPr marL="800100" lvl="1" indent="-342900">
-              <a:buFont typeface="Arial" panose="020B0604020202020204" pitchFamily="34" charset="0"/>
-              <a:buChar char="•"/>
-            </a:pPr>
-            <a:r>
-              <a:rPr lang="en-US" sz="2400" dirty="0">
-                <a:latin typeface="Open Sans" pitchFamily="2" charset="0"/>
-                <a:ea typeface="Open Sans" pitchFamily="2" charset="0"/>
-                <a:cs typeface="Open Sans" pitchFamily="2" charset="0"/>
-              </a:rPr>
-              <a:t>The </a:t>
-            </a:r>
-            <a:r>
-              <a:rPr lang="en-US" sz="2400" i="1" dirty="0">
-                <a:latin typeface="Open Sans" pitchFamily="2" charset="0"/>
-                <a:ea typeface="Open Sans" pitchFamily="2" charset="0"/>
-                <a:cs typeface="Open Sans" pitchFamily="2" charset="0"/>
-              </a:rPr>
-              <a:t>intervals</a:t>
-            </a:r>
-            <a:r>
-              <a:rPr lang="en-US" sz="2400" dirty="0">
-                <a:latin typeface="Open Sans" pitchFamily="2" charset="0"/>
-                <a:ea typeface="Open Sans" pitchFamily="2" charset="0"/>
-                <a:cs typeface="Open Sans" pitchFamily="2" charset="0"/>
-              </a:rPr>
-              <a:t> between levels may not be equal.</a:t>
-            </a:r>
-          </a:p>
-          <a:p>
-            <a:pPr marL="800100" lvl="1" indent="-342900">
-              <a:buFont typeface="Arial" panose="020B0604020202020204" pitchFamily="34" charset="0"/>
-              <a:buChar char="•"/>
-            </a:pPr>
-            <a:r>
-              <a:rPr lang="en-US" sz="2400" dirty="0">
-                <a:latin typeface="Open Sans" pitchFamily="2" charset="0"/>
-                <a:ea typeface="Open Sans" pitchFamily="2" charset="0"/>
-                <a:cs typeface="Open Sans" pitchFamily="2" charset="0"/>
-              </a:rPr>
-              <a:t>Suitable for encoding as numeric values in order.</a:t>
-            </a:r>
-          </a:p>
-          <a:p>
-            <a:pPr lvl="1"/>
-            <a:endParaRPr lang="en-US" sz="2400" dirty="0">
-              <a:latin typeface="Open Sans" pitchFamily="2" charset="0"/>
-              <a:ea typeface="Open Sans" pitchFamily="2" charset="0"/>
-              <a:cs typeface="Open Sans" pitchFamily="2" charset="0"/>
-            </a:endParaRPr>
-          </a:p>
-          <a:p>
-            <a:r>
-              <a:rPr lang="en-US" sz="2400" b="1" dirty="0">
-                <a:latin typeface="Open Sans" pitchFamily="2" charset="0"/>
-                <a:ea typeface="Open Sans" pitchFamily="2" charset="0"/>
-                <a:cs typeface="Open Sans" pitchFamily="2" charset="0"/>
-              </a:rPr>
-              <a:t>Encoding Methods:</a:t>
-            </a:r>
-            <a:endParaRPr lang="en-US" sz="2400" dirty="0">
-              <a:latin typeface="Open Sans" pitchFamily="2" charset="0"/>
-              <a:ea typeface="Open Sans" pitchFamily="2" charset="0"/>
-              <a:cs typeface="Open Sans" pitchFamily="2" charset="0"/>
-            </a:endParaRPr>
-          </a:p>
-          <a:p>
-            <a:pPr marL="800100" lvl="1" indent="-342900">
-              <a:buFont typeface="Arial" panose="020B0604020202020204" pitchFamily="34" charset="0"/>
-              <a:buChar char="•"/>
-            </a:pPr>
-            <a:r>
-              <a:rPr lang="en-US" sz="2400" dirty="0">
-                <a:latin typeface="Open Sans" pitchFamily="2" charset="0"/>
-                <a:ea typeface="Open Sans" pitchFamily="2" charset="0"/>
-                <a:cs typeface="Open Sans" pitchFamily="2" charset="0"/>
-              </a:rPr>
-              <a:t>Label Encoding</a:t>
-            </a:r>
-          </a:p>
-          <a:p>
-            <a:pPr marL="800100" lvl="1" indent="-342900">
-              <a:buFont typeface="Arial" panose="020B0604020202020204" pitchFamily="34" charset="0"/>
-              <a:buChar char="•"/>
-            </a:pPr>
-            <a:r>
-              <a:rPr lang="en-US" sz="2400" dirty="0">
-                <a:latin typeface="Open Sans" pitchFamily="2" charset="0"/>
-                <a:ea typeface="Open Sans" pitchFamily="2" charset="0"/>
-                <a:cs typeface="Open Sans" pitchFamily="2" charset="0"/>
-              </a:rPr>
-              <a:t>Ordinal Encoding</a:t>
-            </a:r>
-          </a:p>
-          <a:p>
-            <a:pPr marL="800100" lvl="1" indent="-342900">
-              <a:buFont typeface="Arial" panose="020B0604020202020204" pitchFamily="34" charset="0"/>
-              <a:buChar char="•"/>
-            </a:pPr>
-            <a:r>
-              <a:rPr lang="en-US" sz="2400" dirty="0">
-                <a:latin typeface="Open Sans" pitchFamily="2" charset="0"/>
-                <a:ea typeface="Open Sans" pitchFamily="2" charset="0"/>
-                <a:cs typeface="Open Sans" pitchFamily="2" charset="0"/>
-              </a:rPr>
-              <a:t>Custom Mapping (manual ranking)</a:t>
-            </a:r>
-          </a:p>
-          <a:p>
-            <a:pPr marL="800100" lvl="1" indent="-342900">
-              <a:buFont typeface="Arial" panose="020B0604020202020204" pitchFamily="34" charset="0"/>
-              <a:buChar char="•"/>
-            </a:pPr>
-            <a:r>
-              <a:rPr lang="en-US" sz="2400" dirty="0">
-                <a:latin typeface="Open Sans" pitchFamily="2" charset="0"/>
-                <a:ea typeface="Open Sans" pitchFamily="2" charset="0"/>
-                <a:cs typeface="Open Sans" pitchFamily="2" charset="0"/>
-              </a:rPr>
-              <a:t>Target Encoding (sometimes)</a:t>
-            </a:r>
-          </a:p>
-        </p:txBody>
-      </p:sp>
-    </p:spTree>
-    <p:extLst>
-      <p:ext uri="{BB962C8B-B14F-4D97-AF65-F5344CB8AC3E}">
-        <p14:creationId xmlns:p14="http://schemas.microsoft.com/office/powerpoint/2010/main" val="176011089"/>
+        <p14:creationId xmlns:p14="http://schemas.microsoft.com/office/powerpoint/2010/main" val="802377213"/>
       </p:ext>
     </p:extLst>
   </p:cSld>
@@ -7403,7 +5747,7 @@
         <p:cNvPr id="1" name="">
           <a:extLst>
             <a:ext uri="{FF2B5EF4-FFF2-40B4-BE49-F238E27FC236}">
-              <a16:creationId xmlns:a16="http://schemas.microsoft.com/office/drawing/2014/main" id="{2FD548CD-2164-9E8B-835F-4D6B5A1D3433}"/>
+              <a16:creationId xmlns:a16="http://schemas.microsoft.com/office/drawing/2014/main" id="{8FBB846E-EAB0-9257-48BF-F6F10A3AA94D}"/>
             </a:ext>
           </a:extLst>
         </p:cNvPr>
@@ -7420,29 +5764,29 @@
       </p:grpSpPr>
       <p:sp>
         <p:nvSpPr>
-          <p:cNvPr id="5" name="TextBox 4">
-            <a:extLst>
-              <a:ext uri="{FF2B5EF4-FFF2-40B4-BE49-F238E27FC236}">
-                <a16:creationId xmlns:a16="http://schemas.microsoft.com/office/drawing/2014/main" id="{7C47C184-A815-B3A5-DFD3-C7CA4E3F4483}"/>
-              </a:ext>
-            </a:extLst>
-          </p:cNvPr>
-          <p:cNvSpPr txBox="1"/>
-          <p:nvPr/>
+          <p:cNvPr id="2" name="Title 1">
+            <a:extLst>
+              <a:ext uri="{FF2B5EF4-FFF2-40B4-BE49-F238E27FC236}">
+                <a16:creationId xmlns:a16="http://schemas.microsoft.com/office/drawing/2014/main" id="{D8228E71-C070-1558-1328-EE36CD9624A1}"/>
+              </a:ext>
+            </a:extLst>
+          </p:cNvPr>
+          <p:cNvSpPr>
+            <a:spLocks noGrp="1"/>
+          </p:cNvSpPr>
+          <p:nvPr>
+            <p:ph type="title"/>
+          </p:nvPr>
         </p:nvSpPr>
         <p:spPr>
           <a:xfrm>
-            <a:off x="1597742" y="403123"/>
-            <a:ext cx="8996516" cy="646331"/>
+            <a:off x="838200" y="365125"/>
+            <a:ext cx="10515600" cy="640080"/>
           </a:xfrm>
-          <a:prstGeom prst="rect">
-            <a:avLst/>
-          </a:prstGeom>
-          <a:noFill/>
         </p:spPr>
         <p:txBody>
-          <a:bodyPr wrap="square" rtlCol="0">
-            <a:spAutoFit/>
+          <a:bodyPr>
+            <a:normAutofit/>
           </a:bodyPr>
           <a:lstStyle/>
           <a:p>
@@ -7451,46 +5795,167 @@
               <a:rPr lang="en-US" sz="3600" dirty="0">
                 <a:latin typeface="Bebas Neue" panose="020B0606020202050201" pitchFamily="34" charset="0"/>
               </a:rPr>
-              <a:t>Binary Data</a:t>
-            </a:r>
-          </a:p>
-        </p:txBody>
-      </p:sp>
-      <p:sp>
-        <p:nvSpPr>
-          <p:cNvPr id="7" name="TextBox 6">
-            <a:extLst>
-              <a:ext uri="{FF2B5EF4-FFF2-40B4-BE49-F238E27FC236}">
-                <a16:creationId xmlns:a16="http://schemas.microsoft.com/office/drawing/2014/main" id="{9429C094-DDEF-BE88-0702-1E218AD55162}"/>
-              </a:ext>
-            </a:extLst>
-          </p:cNvPr>
-          <p:cNvSpPr txBox="1"/>
-          <p:nvPr/>
+              <a:t>Ordinal Data (Ordered Categories)</a:t>
+            </a:r>
+          </a:p>
+        </p:txBody>
+      </p:sp>
+      <p:sp>
+        <p:nvSpPr>
+          <p:cNvPr id="3" name="Content Placeholder 2">
+            <a:extLst>
+              <a:ext uri="{FF2B5EF4-FFF2-40B4-BE49-F238E27FC236}">
+                <a16:creationId xmlns:a16="http://schemas.microsoft.com/office/drawing/2014/main" id="{D4D3B21B-B6DC-D9F9-661E-08E7AF5BA7FE}"/>
+              </a:ext>
+            </a:extLst>
+          </p:cNvPr>
+          <p:cNvSpPr>
+            <a:spLocks noGrp="1"/>
+          </p:cNvSpPr>
+          <p:nvPr>
+            <p:ph idx="1"/>
+          </p:nvPr>
         </p:nvSpPr>
         <p:spPr>
           <a:xfrm>
-            <a:off x="1597742" y="1894401"/>
-            <a:ext cx="8996516" cy="461665"/>
+            <a:off x="838200" y="1091381"/>
+            <a:ext cx="10515600" cy="5085582"/>
           </a:xfrm>
-          <a:prstGeom prst="rect">
-            <a:avLst/>
-          </a:prstGeom>
-          <a:noFill/>
         </p:spPr>
         <p:txBody>
-          <a:bodyPr wrap="square" rtlCol="0">
-            <a:spAutoFit/>
+          <a:bodyPr>
+            <a:normAutofit/>
           </a:bodyPr>
           <a:lstStyle/>
           <a:p>
             <a:r>
-              <a:rPr lang="en-US" sz="2400" dirty="0">
+              <a:rPr lang="en-US" sz="2400" b="1" dirty="0">
                 <a:latin typeface="Open Sans" pitchFamily="2" charset="0"/>
                 <a:ea typeface="Open Sans" pitchFamily="2" charset="0"/>
                 <a:cs typeface="Open Sans" pitchFamily="2" charset="0"/>
               </a:rPr>
-              <a:t>Body</a:t>
+              <a:t>Key Points:</a:t>
+            </a:r>
+            <a:endParaRPr lang="en-US" sz="2400" dirty="0">
+              <a:latin typeface="Open Sans" pitchFamily="2" charset="0"/>
+              <a:ea typeface="Open Sans" pitchFamily="2" charset="0"/>
+              <a:cs typeface="Open Sans" pitchFamily="2" charset="0"/>
+            </a:endParaRPr>
+          </a:p>
+          <a:p>
+            <a:pPr marL="800100" lvl="1" indent="-342900"/>
+            <a:r>
+              <a:rPr lang="en-US" dirty="0">
+                <a:latin typeface="Open Sans" pitchFamily="2" charset="0"/>
+                <a:ea typeface="Open Sans" pitchFamily="2" charset="0"/>
+                <a:cs typeface="Open Sans" pitchFamily="2" charset="0"/>
+              </a:rPr>
+              <a:t>Order matters.</a:t>
+            </a:r>
+          </a:p>
+          <a:p>
+            <a:pPr marL="800100" lvl="1" indent="-342900"/>
+            <a:r>
+              <a:rPr lang="en-US" dirty="0">
+                <a:latin typeface="Open Sans" pitchFamily="2" charset="0"/>
+                <a:ea typeface="Open Sans" pitchFamily="2" charset="0"/>
+                <a:cs typeface="Open Sans" pitchFamily="2" charset="0"/>
+              </a:rPr>
+              <a:t>The </a:t>
+            </a:r>
+            <a:r>
+              <a:rPr lang="en-US" i="1" dirty="0">
+                <a:latin typeface="Open Sans" pitchFamily="2" charset="0"/>
+                <a:ea typeface="Open Sans" pitchFamily="2" charset="0"/>
+                <a:cs typeface="Open Sans" pitchFamily="2" charset="0"/>
+              </a:rPr>
+              <a:t>intervals</a:t>
+            </a:r>
+            <a:r>
+              <a:rPr lang="en-US" dirty="0">
+                <a:latin typeface="Open Sans" pitchFamily="2" charset="0"/>
+                <a:ea typeface="Open Sans" pitchFamily="2" charset="0"/>
+                <a:cs typeface="Open Sans" pitchFamily="2" charset="0"/>
+              </a:rPr>
+              <a:t> between levels may not be equal.</a:t>
+            </a:r>
+          </a:p>
+          <a:p>
+            <a:pPr marL="800100" lvl="1" indent="-342900"/>
+            <a:r>
+              <a:rPr lang="en-US" dirty="0">
+                <a:latin typeface="Open Sans" pitchFamily="2" charset="0"/>
+                <a:ea typeface="Open Sans" pitchFamily="2" charset="0"/>
+                <a:cs typeface="Open Sans" pitchFamily="2" charset="0"/>
+              </a:rPr>
+              <a:t>Suitable for encoding as numeric values in order.</a:t>
+            </a:r>
+          </a:p>
+          <a:p>
+            <a:pPr lvl="1"/>
+            <a:endParaRPr lang="en-US" dirty="0">
+              <a:latin typeface="Open Sans" pitchFamily="2" charset="0"/>
+              <a:ea typeface="Open Sans" pitchFamily="2" charset="0"/>
+              <a:cs typeface="Open Sans" pitchFamily="2" charset="0"/>
+            </a:endParaRPr>
+          </a:p>
+          <a:p>
+            <a:r>
+              <a:rPr lang="en-US" sz="2400" b="1" dirty="0">
+                <a:latin typeface="Open Sans" pitchFamily="2" charset="0"/>
+                <a:ea typeface="Open Sans" pitchFamily="2" charset="0"/>
+                <a:cs typeface="Open Sans" pitchFamily="2" charset="0"/>
+              </a:rPr>
+              <a:t>Encoding Methods:</a:t>
+            </a:r>
+            <a:endParaRPr lang="en-US" sz="2400" dirty="0">
+              <a:latin typeface="Open Sans" pitchFamily="2" charset="0"/>
+              <a:ea typeface="Open Sans" pitchFamily="2" charset="0"/>
+              <a:cs typeface="Open Sans" pitchFamily="2" charset="0"/>
+            </a:endParaRPr>
+          </a:p>
+          <a:p>
+            <a:pPr marL="800100" lvl="1" indent="-342900"/>
+            <a:r>
+              <a:rPr lang="en-US" dirty="0">
+                <a:latin typeface="Open Sans" pitchFamily="2" charset="0"/>
+                <a:ea typeface="Open Sans" pitchFamily="2" charset="0"/>
+                <a:cs typeface="Open Sans" pitchFamily="2" charset="0"/>
+              </a:rPr>
+              <a:t>Label Encoding</a:t>
+            </a:r>
+          </a:p>
+          <a:p>
+            <a:pPr marL="800100" lvl="1" indent="-342900"/>
+            <a:r>
+              <a:rPr lang="en-US" dirty="0">
+                <a:latin typeface="Open Sans" pitchFamily="2" charset="0"/>
+                <a:ea typeface="Open Sans" pitchFamily="2" charset="0"/>
+                <a:cs typeface="Open Sans" pitchFamily="2" charset="0"/>
+              </a:rPr>
+              <a:t>Ordinal Encoding</a:t>
+            </a:r>
+          </a:p>
+          <a:p>
+            <a:pPr marL="800100" lvl="1" indent="-342900"/>
+            <a:r>
+              <a:rPr lang="en-US" dirty="0">
+                <a:latin typeface="Open Sans" pitchFamily="2" charset="0"/>
+                <a:ea typeface="Open Sans" pitchFamily="2" charset="0"/>
+                <a:cs typeface="Open Sans" pitchFamily="2" charset="0"/>
+              </a:rPr>
+              <a:t>Custom Mapping (manual ranking)</a:t>
+            </a:r>
+          </a:p>
+          <a:p>
+            <a:pPr marL="800100" lvl="1" indent="-342900"/>
+            <a:r>
+              <a:rPr lang="en-US" dirty="0">
+                <a:latin typeface="Open Sans" pitchFamily="2" charset="0"/>
+                <a:ea typeface="Open Sans" pitchFamily="2" charset="0"/>
+                <a:cs typeface="Open Sans" pitchFamily="2" charset="0"/>
+              </a:rPr>
+              <a:t>Target Encoding (sometimes)</a:t>
             </a:r>
           </a:p>
         </p:txBody>
@@ -7498,7 +5963,7 @@
     </p:spTree>
     <p:extLst>
       <p:ext uri="{BB962C8B-B14F-4D97-AF65-F5344CB8AC3E}">
-        <p14:creationId xmlns:p14="http://schemas.microsoft.com/office/powerpoint/2010/main" val="1138356723"/>
+        <p14:creationId xmlns:p14="http://schemas.microsoft.com/office/powerpoint/2010/main" val="2492412610"/>
       </p:ext>
     </p:extLst>
   </p:cSld>
@@ -7516,7 +5981,7 @@
         <p:cNvPr id="1" name="">
           <a:extLst>
             <a:ext uri="{FF2B5EF4-FFF2-40B4-BE49-F238E27FC236}">
-              <a16:creationId xmlns:a16="http://schemas.microsoft.com/office/drawing/2014/main" id="{96D9FBEF-35C0-0ABC-007B-1B8706392F06}"/>
+              <a16:creationId xmlns:a16="http://schemas.microsoft.com/office/drawing/2014/main" id="{00A5B423-E6E3-1B1C-27AF-650E728165AA}"/>
             </a:ext>
           </a:extLst>
         </p:cNvPr>
@@ -7533,29 +5998,29 @@
       </p:grpSpPr>
       <p:sp>
         <p:nvSpPr>
-          <p:cNvPr id="5" name="TextBox 4">
-            <a:extLst>
-              <a:ext uri="{FF2B5EF4-FFF2-40B4-BE49-F238E27FC236}">
-                <a16:creationId xmlns:a16="http://schemas.microsoft.com/office/drawing/2014/main" id="{0B2698CF-21B3-7538-DD07-4FCD39DB01EF}"/>
-              </a:ext>
-            </a:extLst>
-          </p:cNvPr>
-          <p:cNvSpPr txBox="1"/>
-          <p:nvPr/>
+          <p:cNvPr id="2" name="Title 1">
+            <a:extLst>
+              <a:ext uri="{FF2B5EF4-FFF2-40B4-BE49-F238E27FC236}">
+                <a16:creationId xmlns:a16="http://schemas.microsoft.com/office/drawing/2014/main" id="{9290E490-E4C8-D4C2-94AC-83D77FBC61D8}"/>
+              </a:ext>
+            </a:extLst>
+          </p:cNvPr>
+          <p:cNvSpPr>
+            <a:spLocks noGrp="1"/>
+          </p:cNvSpPr>
+          <p:nvPr>
+            <p:ph type="title"/>
+          </p:nvPr>
         </p:nvSpPr>
         <p:spPr>
           <a:xfrm>
-            <a:off x="1597742" y="403123"/>
-            <a:ext cx="8996516" cy="646331"/>
+            <a:off x="838200" y="365125"/>
+            <a:ext cx="10515600" cy="640080"/>
           </a:xfrm>
-          <a:prstGeom prst="rect">
-            <a:avLst/>
-          </a:prstGeom>
-          <a:noFill/>
         </p:spPr>
         <p:txBody>
-          <a:bodyPr wrap="square" rtlCol="0">
-            <a:spAutoFit/>
+          <a:bodyPr>
+            <a:normAutofit/>
           </a:bodyPr>
           <a:lstStyle/>
           <a:p>
@@ -7564,46 +6029,49 @@
               <a:rPr lang="en-US" sz="3600" dirty="0">
                 <a:latin typeface="Bebas Neue" panose="020B0606020202050201" pitchFamily="34" charset="0"/>
               </a:rPr>
-              <a:t>High-cardinality Data</a:t>
-            </a:r>
-          </a:p>
-        </p:txBody>
-      </p:sp>
-      <p:sp>
-        <p:nvSpPr>
-          <p:cNvPr id="7" name="TextBox 6">
-            <a:extLst>
-              <a:ext uri="{FF2B5EF4-FFF2-40B4-BE49-F238E27FC236}">
-                <a16:creationId xmlns:a16="http://schemas.microsoft.com/office/drawing/2014/main" id="{4B16266A-EC8F-03DC-BF0B-05F06A7CE4D8}"/>
-              </a:ext>
-            </a:extLst>
-          </p:cNvPr>
-          <p:cNvSpPr txBox="1"/>
-          <p:nvPr/>
+              <a:t>Binary Data</a:t>
+            </a:r>
+          </a:p>
+        </p:txBody>
+      </p:sp>
+      <p:sp>
+        <p:nvSpPr>
+          <p:cNvPr id="3" name="Content Placeholder 2">
+            <a:extLst>
+              <a:ext uri="{FF2B5EF4-FFF2-40B4-BE49-F238E27FC236}">
+                <a16:creationId xmlns:a16="http://schemas.microsoft.com/office/drawing/2014/main" id="{8EAE7F3E-2D4B-C201-C750-FB794B3F3FA9}"/>
+              </a:ext>
+            </a:extLst>
+          </p:cNvPr>
+          <p:cNvSpPr>
+            <a:spLocks noGrp="1"/>
+          </p:cNvSpPr>
+          <p:nvPr>
+            <p:ph idx="1"/>
+          </p:nvPr>
         </p:nvSpPr>
         <p:spPr>
           <a:xfrm>
-            <a:off x="1597742" y="1894401"/>
-            <a:ext cx="8996516" cy="461665"/>
+            <a:off x="838200" y="1091381"/>
+            <a:ext cx="10515600" cy="5085582"/>
           </a:xfrm>
-          <a:prstGeom prst="rect">
-            <a:avLst/>
-          </a:prstGeom>
-          <a:noFill/>
         </p:spPr>
         <p:txBody>
-          <a:bodyPr wrap="square" rtlCol="0">
-            <a:spAutoFit/>
+          <a:bodyPr>
+            <a:normAutofit/>
           </a:bodyPr>
           <a:lstStyle/>
           <a:p>
+            <a:pPr marL="0" indent="0" algn="just">
+              <a:buNone/>
+            </a:pPr>
             <a:r>
               <a:rPr lang="en-US" sz="2400" dirty="0">
                 <a:latin typeface="Open Sans" pitchFamily="2" charset="0"/>
                 <a:ea typeface="Open Sans" pitchFamily="2" charset="0"/>
                 <a:cs typeface="Open Sans" pitchFamily="2" charset="0"/>
               </a:rPr>
-              <a:t>Body</a:t>
+              <a:t>H</a:t>
             </a:r>
           </a:p>
         </p:txBody>
@@ -7611,7 +6079,7 @@
     </p:spTree>
     <p:extLst>
       <p:ext uri="{BB962C8B-B14F-4D97-AF65-F5344CB8AC3E}">
-        <p14:creationId xmlns:p14="http://schemas.microsoft.com/office/powerpoint/2010/main" val="1614091501"/>
+        <p14:creationId xmlns:p14="http://schemas.microsoft.com/office/powerpoint/2010/main" val="1601626121"/>
       </p:ext>
     </p:extLst>
   </p:cSld>
@@ -7629,7 +6097,7 @@
         <p:cNvPr id="1" name="">
           <a:extLst>
             <a:ext uri="{FF2B5EF4-FFF2-40B4-BE49-F238E27FC236}">
-              <a16:creationId xmlns:a16="http://schemas.microsoft.com/office/drawing/2014/main" id="{8DFF3382-909D-E80C-DEB3-2B7C792B7DCA}"/>
+              <a16:creationId xmlns:a16="http://schemas.microsoft.com/office/drawing/2014/main" id="{F2A2D659-0030-B94E-C19F-43A3C33EE834}"/>
             </a:ext>
           </a:extLst>
         </p:cNvPr>
@@ -7646,29 +6114,29 @@
       </p:grpSpPr>
       <p:sp>
         <p:nvSpPr>
-          <p:cNvPr id="5" name="TextBox 4">
-            <a:extLst>
-              <a:ext uri="{FF2B5EF4-FFF2-40B4-BE49-F238E27FC236}">
-                <a16:creationId xmlns:a16="http://schemas.microsoft.com/office/drawing/2014/main" id="{A2ADD978-08D8-0D76-9C87-B774C53612DB}"/>
-              </a:ext>
-            </a:extLst>
-          </p:cNvPr>
-          <p:cNvSpPr txBox="1"/>
-          <p:nvPr/>
+          <p:cNvPr id="2" name="Title 1">
+            <a:extLst>
+              <a:ext uri="{FF2B5EF4-FFF2-40B4-BE49-F238E27FC236}">
+                <a16:creationId xmlns:a16="http://schemas.microsoft.com/office/drawing/2014/main" id="{3FA4DC17-2E72-C8A6-9154-142E90F5B880}"/>
+              </a:ext>
+            </a:extLst>
+          </p:cNvPr>
+          <p:cNvSpPr>
+            <a:spLocks noGrp="1"/>
+          </p:cNvSpPr>
+          <p:nvPr>
+            <p:ph type="title"/>
+          </p:nvPr>
         </p:nvSpPr>
         <p:spPr>
           <a:xfrm>
-            <a:off x="1597742" y="403123"/>
-            <a:ext cx="8996516" cy="646331"/>
+            <a:off x="838200" y="365125"/>
+            <a:ext cx="10515600" cy="640080"/>
           </a:xfrm>
-          <a:prstGeom prst="rect">
-            <a:avLst/>
-          </a:prstGeom>
-          <a:noFill/>
         </p:spPr>
         <p:txBody>
-          <a:bodyPr wrap="square" rtlCol="0">
-            <a:spAutoFit/>
+          <a:bodyPr>
+            <a:normAutofit/>
           </a:bodyPr>
           <a:lstStyle/>
           <a:p>
@@ -7677,46 +6145,49 @@
               <a:rPr lang="en-US" sz="3600" dirty="0">
                 <a:latin typeface="Bebas Neue" panose="020B0606020202050201" pitchFamily="34" charset="0"/>
               </a:rPr>
-              <a:t>Mixed Data</a:t>
-            </a:r>
-          </a:p>
-        </p:txBody>
-      </p:sp>
-      <p:sp>
-        <p:nvSpPr>
-          <p:cNvPr id="7" name="TextBox 6">
-            <a:extLst>
-              <a:ext uri="{FF2B5EF4-FFF2-40B4-BE49-F238E27FC236}">
-                <a16:creationId xmlns:a16="http://schemas.microsoft.com/office/drawing/2014/main" id="{D9ED9FEA-3CBC-3445-920D-533DBB523EE5}"/>
-              </a:ext>
-            </a:extLst>
-          </p:cNvPr>
-          <p:cNvSpPr txBox="1"/>
-          <p:nvPr/>
+              <a:t>High-cardinality Data</a:t>
+            </a:r>
+          </a:p>
+        </p:txBody>
+      </p:sp>
+      <p:sp>
+        <p:nvSpPr>
+          <p:cNvPr id="3" name="Content Placeholder 2">
+            <a:extLst>
+              <a:ext uri="{FF2B5EF4-FFF2-40B4-BE49-F238E27FC236}">
+                <a16:creationId xmlns:a16="http://schemas.microsoft.com/office/drawing/2014/main" id="{55F41452-6F5C-6371-7E86-C2B0C8DC8F24}"/>
+              </a:ext>
+            </a:extLst>
+          </p:cNvPr>
+          <p:cNvSpPr>
+            <a:spLocks noGrp="1"/>
+          </p:cNvSpPr>
+          <p:nvPr>
+            <p:ph idx="1"/>
+          </p:nvPr>
         </p:nvSpPr>
         <p:spPr>
           <a:xfrm>
-            <a:off x="1597742" y="1894401"/>
-            <a:ext cx="8996516" cy="461665"/>
+            <a:off x="838200" y="1091381"/>
+            <a:ext cx="10515600" cy="5085582"/>
           </a:xfrm>
-          <a:prstGeom prst="rect">
-            <a:avLst/>
-          </a:prstGeom>
-          <a:noFill/>
         </p:spPr>
         <p:txBody>
-          <a:bodyPr wrap="square" rtlCol="0">
-            <a:spAutoFit/>
+          <a:bodyPr>
+            <a:normAutofit/>
           </a:bodyPr>
           <a:lstStyle/>
           <a:p>
+            <a:pPr marL="0" indent="0" algn="just">
+              <a:buNone/>
+            </a:pPr>
             <a:r>
               <a:rPr lang="en-US" sz="2400" dirty="0">
                 <a:latin typeface="Open Sans" pitchFamily="2" charset="0"/>
                 <a:ea typeface="Open Sans" pitchFamily="2" charset="0"/>
                 <a:cs typeface="Open Sans" pitchFamily="2" charset="0"/>
               </a:rPr>
-              <a:t>Body</a:t>
+              <a:t>H</a:t>
             </a:r>
           </a:p>
         </p:txBody>
@@ -7724,7 +6195,7 @@
     </p:spTree>
     <p:extLst>
       <p:ext uri="{BB962C8B-B14F-4D97-AF65-F5344CB8AC3E}">
-        <p14:creationId xmlns:p14="http://schemas.microsoft.com/office/powerpoint/2010/main" val="1883571006"/>
+        <p14:creationId xmlns:p14="http://schemas.microsoft.com/office/powerpoint/2010/main" val="439608215"/>
       </p:ext>
     </p:extLst>
   </p:cSld>

</xml_diff>